<commit_message>
git slides: remot part added.
</commit_message>
<xml_diff>
--- a/git slides.pptx
+++ b/git slides.pptx
@@ -5,10 +5,10 @@
     <p:sldMasterId id="2147483660" r:id="rId4"/>
   </p:sldMasterIdLst>
   <p:notesMasterIdLst>
-    <p:notesMasterId r:id="rId15"/>
+    <p:notesMasterId r:id="rId16"/>
   </p:notesMasterIdLst>
   <p:handoutMasterIdLst>
-    <p:handoutMasterId r:id="rId16"/>
+    <p:handoutMasterId r:id="rId17"/>
   </p:handoutMasterIdLst>
   <p:sldIdLst>
     <p:sldId id="281" r:id="rId5"/>
@@ -21,6 +21,7 @@
     <p:sldId id="286" r:id="rId12"/>
     <p:sldId id="287" r:id="rId13"/>
     <p:sldId id="288" r:id="rId14"/>
+    <p:sldId id="289" r:id="rId15"/>
   </p:sldIdLst>
   <p:sldSz cx="12192000" cy="6858000"/>
   <p:notesSz cx="6858000" cy="9144000"/>
@@ -235,7 +236,7 @@
           <a:p>
             <a:fld id="{7FD03EC1-2B28-42FB-8498-2945B84C90C5}" type="datetimeFigureOut">
               <a:rPr lang="fa-IR" smtClean="0"/>
-              <a:t>09/07/1442</a:t>
+              <a:t>22/07/1442</a:t>
             </a:fld>
             <a:endParaRPr lang="fa-IR"/>
           </a:p>
@@ -412,7 +413,7 @@
           <a:p>
             <a:fld id="{AFD01546-198A-4195-BCF8-F0FF54C90E5E}" type="datetimeFigureOut">
               <a:rPr lang="en-US" smtClean="0"/>
-              <a:t>2/20/2021</a:t>
+              <a:t>3/5/2021</a:t>
             </a:fld>
             <a:endParaRPr lang="en-US" dirty="0"/>
           </a:p>
@@ -4548,6 +4549,246 @@
 </p:notes>
 </file>
 
+<file path=ppt/notesSlides/notesSlide5.xml><?xml version="1.0" encoding="utf-8"?>
+<p:notes xmlns:a="http://schemas.openxmlformats.org/drawingml/2006/main" xmlns:r="http://schemas.openxmlformats.org/officeDocument/2006/relationships" xmlns:p="http://schemas.openxmlformats.org/presentationml/2006/main">
+  <p:cSld>
+    <p:spTree>
+      <p:nvGrpSpPr>
+        <p:cNvPr id="1" name=""/>
+        <p:cNvGrpSpPr/>
+        <p:nvPr/>
+      </p:nvGrpSpPr>
+      <p:grpSpPr>
+        <a:xfrm>
+          <a:off x="0" y="0"/>
+          <a:ext cx="0" cy="0"/>
+          <a:chOff x="0" y="0"/>
+          <a:chExt cx="0" cy="0"/>
+        </a:xfrm>
+      </p:grpSpPr>
+      <p:sp>
+        <p:nvSpPr>
+          <p:cNvPr id="2" name="Slide Image Placeholder 1"/>
+          <p:cNvSpPr>
+            <a:spLocks noGrp="1" noRot="1" noChangeAspect="1"/>
+          </p:cNvSpPr>
+          <p:nvPr>
+            <p:ph type="sldImg"/>
+          </p:nvPr>
+        </p:nvSpPr>
+        <p:spPr/>
+      </p:sp>
+      <p:sp>
+        <p:nvSpPr>
+          <p:cNvPr id="3" name="Notes Placeholder 2"/>
+          <p:cNvSpPr>
+            <a:spLocks noGrp="1"/>
+          </p:cNvSpPr>
+          <p:nvPr>
+            <p:ph type="body" idx="1"/>
+          </p:nvPr>
+        </p:nvSpPr>
+        <p:spPr/>
+        <p:txBody>
+          <a:bodyPr/>
+          <a:lstStyle/>
+          <a:p>
+            <a:pPr algn="r" rtl="1"/>
+            <a:r>
+              <a:rPr lang="fa-IR" dirty="0">
+                <a:cs typeface="B Lotus" panose="00000400000000000000" pitchFamily="2" charset="-78"/>
+              </a:rPr>
+              <a:t>برای اینکه بتوانید در هر </a:t>
+            </a:r>
+            <a:r>
+              <a:rPr lang="fa-IR" dirty="0" err="1">
+                <a:cs typeface="B Lotus" panose="00000400000000000000" pitchFamily="2" charset="-78"/>
+              </a:rPr>
+              <a:t>پروژهٔ</a:t>
+            </a:r>
+            <a:r>
+              <a:rPr lang="fa-IR" dirty="0">
+                <a:cs typeface="B Lotus" panose="00000400000000000000" pitchFamily="2" charset="-78"/>
+              </a:rPr>
+              <a:t> </a:t>
+            </a:r>
+            <a:r>
+              <a:rPr lang="fa-IR" dirty="0" err="1">
+                <a:cs typeface="B Lotus" panose="00000400000000000000" pitchFamily="2" charset="-78"/>
+              </a:rPr>
+              <a:t>گیت</a:t>
+            </a:r>
+            <a:r>
+              <a:rPr lang="fa-IR" dirty="0">
+                <a:cs typeface="B Lotus" panose="00000400000000000000" pitchFamily="2" charset="-78"/>
+              </a:rPr>
+              <a:t> همکاری کنید، دانستن </a:t>
+            </a:r>
+            <a:r>
+              <a:rPr lang="fa-IR" dirty="0" err="1">
+                <a:cs typeface="B Lotus" panose="00000400000000000000" pitchFamily="2" charset="-78"/>
+              </a:rPr>
+              <a:t>شیوهٔ</a:t>
+            </a:r>
+            <a:r>
+              <a:rPr lang="fa-IR" dirty="0">
+                <a:cs typeface="B Lotus" panose="00000400000000000000" pitchFamily="2" charset="-78"/>
+              </a:rPr>
+              <a:t> مدیریت </a:t>
+            </a:r>
+            <a:r>
+              <a:rPr lang="fa-IR" dirty="0" err="1">
+                <a:cs typeface="B Lotus" panose="00000400000000000000" pitchFamily="2" charset="-78"/>
+              </a:rPr>
+              <a:t>مخزن‌های</a:t>
+            </a:r>
+            <a:r>
+              <a:rPr lang="fa-IR" dirty="0">
+                <a:cs typeface="B Lotus" panose="00000400000000000000" pitchFamily="2" charset="-78"/>
+              </a:rPr>
+              <a:t> ریموت لازم است. مخازن ریموت یک نسخه از </a:t>
+            </a:r>
+            <a:r>
+              <a:rPr lang="fa-IR" dirty="0" err="1">
+                <a:cs typeface="B Lotus" panose="00000400000000000000" pitchFamily="2" charset="-78"/>
+              </a:rPr>
+              <a:t>پروژهٔ</a:t>
+            </a:r>
+            <a:r>
+              <a:rPr lang="fa-IR" dirty="0">
+                <a:cs typeface="B Lotus" panose="00000400000000000000" pitchFamily="2" charset="-78"/>
+              </a:rPr>
+              <a:t> شما هستند که در اینترنت یا جایی دیگر در شبکه قرار دارند. </a:t>
+            </a:r>
+            <a:r>
+              <a:rPr lang="fa-IR" dirty="0" err="1">
+                <a:cs typeface="B Lotus" panose="00000400000000000000" pitchFamily="2" charset="-78"/>
+              </a:rPr>
+              <a:t>می‌توانید</a:t>
+            </a:r>
+            <a:r>
+              <a:rPr lang="fa-IR" dirty="0">
+                <a:cs typeface="B Lotus" panose="00000400000000000000" pitchFamily="2" charset="-78"/>
+              </a:rPr>
+              <a:t> چند تا از آنها داشته باشید که معمولاً هر کدام برای شما یا فقط قابل خواندن یا خواندنی/نوشتی هستند. همکاری با دیگران شامل درگیری با مدیریت این مخازن ریموت و پوش و پول کردن داده از و به آنها به هنگام اشتراک کار است. مدیریت مخازن ریموت به مفهوم دانستن نحوه افزودن مخازن ریموت، حذف کردن </a:t>
+            </a:r>
+            <a:r>
+              <a:rPr lang="fa-IR" dirty="0" err="1">
+                <a:cs typeface="B Lotus" panose="00000400000000000000" pitchFamily="2" charset="-78"/>
+              </a:rPr>
+              <a:t>ریموت‌های</a:t>
+            </a:r>
+            <a:r>
+              <a:rPr lang="fa-IR" dirty="0">
+                <a:cs typeface="B Lotus" panose="00000400000000000000" pitchFamily="2" charset="-78"/>
+              </a:rPr>
+              <a:t> </a:t>
+            </a:r>
+            <a:r>
+              <a:rPr lang="fa-IR" dirty="0" err="1">
+                <a:cs typeface="B Lotus" panose="00000400000000000000" pitchFamily="2" charset="-78"/>
+              </a:rPr>
+              <a:t>منقضی</a:t>
+            </a:r>
+            <a:r>
+              <a:rPr lang="fa-IR" dirty="0">
+                <a:cs typeface="B Lotus" panose="00000400000000000000" pitchFamily="2" charset="-78"/>
+              </a:rPr>
+              <a:t>، مدیریت </a:t>
+            </a:r>
+            <a:r>
+              <a:rPr lang="fa-IR" dirty="0" err="1">
+                <a:cs typeface="B Lotus" panose="00000400000000000000" pitchFamily="2" charset="-78"/>
+              </a:rPr>
+              <a:t>شاخه‌های</a:t>
+            </a:r>
+            <a:r>
+              <a:rPr lang="fa-IR" dirty="0">
+                <a:cs typeface="B Lotus" panose="00000400000000000000" pitchFamily="2" charset="-78"/>
+              </a:rPr>
+              <a:t> گوناگون ریموت و تعریف آنها به عنوان </a:t>
+            </a:r>
+            <a:r>
+              <a:rPr lang="fa-IR" dirty="0" err="1">
+                <a:cs typeface="B Lotus" panose="00000400000000000000" pitchFamily="2" charset="-78"/>
+              </a:rPr>
+              <a:t>دنبال‌شده</a:t>
+            </a:r>
+            <a:r>
+              <a:rPr lang="fa-IR" dirty="0">
+                <a:cs typeface="B Lotus" panose="00000400000000000000" pitchFamily="2" charset="-78"/>
+              </a:rPr>
+              <a:t> یا </a:t>
+            </a:r>
+            <a:r>
+              <a:rPr lang="fa-IR" dirty="0" err="1">
+                <a:cs typeface="B Lotus" panose="00000400000000000000" pitchFamily="2" charset="-78"/>
+              </a:rPr>
+              <a:t>دنبال‌شنده</a:t>
+            </a:r>
+            <a:r>
+              <a:rPr lang="fa-IR" dirty="0">
+                <a:cs typeface="B Lotus" panose="00000400000000000000" pitchFamily="2" charset="-78"/>
+              </a:rPr>
+              <a:t> و غیره است. در این بخش ما درباره برخی از مهارت‌‌های مدیریت-ریموت </a:t>
+            </a:r>
+            <a:r>
+              <a:rPr lang="fa-IR" dirty="0" err="1">
+                <a:cs typeface="B Lotus" panose="00000400000000000000" pitchFamily="2" charset="-78"/>
+              </a:rPr>
+              <a:t>صبحت</a:t>
+            </a:r>
+            <a:r>
+              <a:rPr lang="fa-IR" dirty="0">
+                <a:cs typeface="B Lotus" panose="00000400000000000000" pitchFamily="2" charset="-78"/>
+              </a:rPr>
+              <a:t> خواهیم کرد.</a:t>
+            </a:r>
+          </a:p>
+          <a:p>
+            <a:pPr algn="r" rtl="1"/>
+            <a:endParaRPr lang="fa-IR" dirty="0">
+              <a:cs typeface="B Lotus" panose="00000400000000000000" pitchFamily="2" charset="-78"/>
+            </a:endParaRPr>
+          </a:p>
+        </p:txBody>
+      </p:sp>
+      <p:sp>
+        <p:nvSpPr>
+          <p:cNvPr id="4" name="Slide Number Placeholder 3"/>
+          <p:cNvSpPr>
+            <a:spLocks noGrp="1"/>
+          </p:cNvSpPr>
+          <p:nvPr>
+            <p:ph type="sldNum" sz="quarter" idx="5"/>
+          </p:nvPr>
+        </p:nvSpPr>
+        <p:spPr/>
+        <p:txBody>
+          <a:bodyPr/>
+          <a:lstStyle/>
+          <a:p>
+            <a:fld id="{2E6DE88F-1F85-4A27-9D34-D74A50E7B0DA}" type="slidenum">
+              <a:rPr lang="en-US" smtClean="0"/>
+              <a:t>11</a:t>
+            </a:fld>
+            <a:endParaRPr lang="en-US" dirty="0"/>
+          </a:p>
+        </p:txBody>
+      </p:sp>
+    </p:spTree>
+    <p:extLst>
+      <p:ext uri="{BB962C8B-B14F-4D97-AF65-F5344CB8AC3E}">
+        <p14:creationId xmlns:p14="http://schemas.microsoft.com/office/powerpoint/2010/main" val="4252847358"/>
+      </p:ext>
+    </p:extLst>
+  </p:cSld>
+  <p:clrMapOvr>
+    <a:masterClrMapping/>
+  </p:clrMapOvr>
+</p:notes>
+</file>
+
 <file path=ppt/slideLayouts/slideLayout1.xml><?xml version="1.0" encoding="utf-8"?>
 <p:sldLayout xmlns:a="http://schemas.openxmlformats.org/drawingml/2006/main" xmlns:r="http://schemas.openxmlformats.org/officeDocument/2006/relationships" xmlns:p="http://schemas.openxmlformats.org/presentationml/2006/main" type="title" preserve="1">
   <p:cSld name="Title Slide">
@@ -4733,7 +4974,7 @@
           <a:p>
             <a:fld id="{88D38747-4367-4BD2-8D51-C97E202738E2}" type="datetime1">
               <a:rPr lang="en-US" smtClean="0"/>
-              <a:t>2/20/2021</a:t>
+              <a:t>3/5/2021</a:t>
             </a:fld>
             <a:endParaRPr lang="en-US" dirty="0"/>
           </a:p>
@@ -5038,7 +5279,7 @@
           <a:p>
             <a:fld id="{11F1B079-7EF0-44EE-B798-BCC497C9F3B2}" type="datetime1">
               <a:rPr lang="en-US" smtClean="0"/>
-              <a:t>2/20/2021</a:t>
+              <a:t>3/5/2021</a:t>
             </a:fld>
             <a:endParaRPr lang="en-US" dirty="0"/>
           </a:p>
@@ -5232,7 +5473,7 @@
           <a:p>
             <a:fld id="{28FF70A8-1D13-4657-95F0-A9EA54967B8D}" type="datetime1">
               <a:rPr lang="en-US" smtClean="0"/>
-              <a:t>2/20/2021</a:t>
+              <a:t>3/5/2021</a:t>
             </a:fld>
             <a:endParaRPr lang="en-US" dirty="0"/>
           </a:p>
@@ -5495,7 +5736,7 @@
           <a:p>
             <a:fld id="{21EB90AC-71BD-4C7F-8ACA-7B3F18292E63}" type="datetime1">
               <a:rPr lang="en-US" smtClean="0"/>
-              <a:t>2/20/2021</a:t>
+              <a:t>3/5/2021</a:t>
             </a:fld>
             <a:endParaRPr lang="en-US" dirty="0"/>
           </a:p>
@@ -5931,7 +6172,7 @@
           <a:p>
             <a:fld id="{4E6EFC2C-8905-46F0-B443-CE905B76BA01}" type="datetime1">
               <a:rPr lang="en-US" smtClean="0"/>
-              <a:t>2/20/2021</a:t>
+              <a:t>3/5/2021</a:t>
             </a:fld>
             <a:endParaRPr lang="en-US" dirty="0"/>
           </a:p>
@@ -6468,7 +6709,7 @@
           <a:p>
             <a:fld id="{D9079DC3-C9B5-499E-9140-0DC28B7074E2}" type="datetime1">
               <a:rPr lang="en-US" smtClean="0"/>
-              <a:t>2/20/2021</a:t>
+              <a:t>3/5/2021</a:t>
             </a:fld>
             <a:endParaRPr lang="en-US" dirty="0"/>
           </a:p>
@@ -7350,7 +7591,7 @@
           <a:p>
             <a:fld id="{30BB33EA-E472-4D22-9C03-A9C14AA21CED}" type="datetime1">
               <a:rPr lang="en-US" smtClean="0"/>
-              <a:t>2/20/2021</a:t>
+              <a:t>3/5/2021</a:t>
             </a:fld>
             <a:endParaRPr lang="en-US" dirty="0"/>
           </a:p>
@@ -7520,7 +7761,7 @@
           <a:p>
             <a:fld id="{73C55A3C-5767-4844-A0A3-83778C2E5409}" type="datetime1">
               <a:rPr lang="en-US" smtClean="0"/>
-              <a:t>2/20/2021</a:t>
+              <a:t>3/5/2021</a:t>
             </a:fld>
             <a:endParaRPr lang="en-US" dirty="0"/>
           </a:p>
@@ -7764,7 +8005,7 @@
           <a:p>
             <a:fld id="{CAE507A8-A5CF-4D38-AB86-7EDDA87A85D4}" type="datetime1">
               <a:rPr lang="en-US" smtClean="0"/>
-              <a:t>2/20/2021</a:t>
+              <a:t>3/5/2021</a:t>
             </a:fld>
             <a:endParaRPr lang="en-US" dirty="0"/>
           </a:p>
@@ -8006,7 +8247,7 @@
           <a:p>
             <a:fld id="{BDFCD27C-8599-43EF-BA1D-14DDC1946E06}" type="datetime1">
               <a:rPr lang="en-US" smtClean="0"/>
-              <a:t>2/20/2021</a:t>
+              <a:t>3/5/2021</a:t>
             </a:fld>
             <a:endParaRPr lang="en-US" dirty="0"/>
           </a:p>
@@ -8489,7 +8730,7 @@
           <a:p>
             <a:fld id="{49343D99-809A-49C0-96E5-4250D0B498EE}" type="datetime1">
               <a:rPr lang="en-US" smtClean="0"/>
-              <a:t>2/20/2021</a:t>
+              <a:t>3/5/2021</a:t>
             </a:fld>
             <a:endParaRPr lang="en-US" dirty="0"/>
           </a:p>
@@ -8607,7 +8848,7 @@
           <a:p>
             <a:fld id="{A143DE9B-B678-4EFB-BB7D-A4370204A0B0}" type="datetime1">
               <a:rPr lang="en-US" smtClean="0"/>
-              <a:t>2/20/2021</a:t>
+              <a:t>3/5/2021</a:t>
             </a:fld>
             <a:endParaRPr lang="en-US" dirty="0"/>
           </a:p>
@@ -8702,7 +8943,7 @@
           <a:p>
             <a:fld id="{E68812DA-F765-4142-A6A3-A8ED7235E082}" type="datetime1">
               <a:rPr lang="en-US" smtClean="0"/>
-              <a:t>2/20/2021</a:t>
+              <a:t>3/5/2021</a:t>
             </a:fld>
             <a:endParaRPr lang="en-US" dirty="0"/>
           </a:p>
@@ -8957,7 +9198,7 @@
           <a:p>
             <a:fld id="{3E0277FD-7DE6-41D4-930D-AC99F5AFE54E}" type="datetime1">
               <a:rPr lang="en-US" smtClean="0"/>
-              <a:t>2/20/2021</a:t>
+              <a:t>3/5/2021</a:t>
             </a:fld>
             <a:endParaRPr lang="en-US" dirty="0"/>
           </a:p>
@@ -9264,7 +9505,7 @@
           <a:p>
             <a:fld id="{9EA15526-7079-4B7B-987C-1B5FAE11A0FF}" type="datetime1">
               <a:rPr lang="en-US" smtClean="0"/>
-              <a:t>2/20/2021</a:t>
+              <a:t>3/5/2021</a:t>
             </a:fld>
             <a:endParaRPr lang="en-US" dirty="0"/>
           </a:p>
@@ -9499,7 +9740,7 @@
           <a:p>
             <a:fld id="{073ED0CC-082F-4160-86E5-0D6041F12778}" type="datetime1">
               <a:rPr lang="en-US" smtClean="0"/>
-              <a:t>2/20/2021</a:t>
+              <a:t>3/5/2021</a:t>
             </a:fld>
             <a:endParaRPr lang="en-US" dirty="0"/>
           </a:p>
@@ -10392,7 +10633,7 @@
         </p:spPr>
         <p:txBody>
           <a:bodyPr>
-            <a:normAutofit fontScale="85000" lnSpcReduction="20000"/>
+            <a:normAutofit fontScale="77500" lnSpcReduction="20000"/>
           </a:bodyPr>
           <a:lstStyle/>
           <a:p>
@@ -11052,11 +11293,48 @@
               <a:t>use "git restore &lt;file&gt;..." to discard changes in working directory</a:t>
             </a:r>
             <a:r>
-              <a:rPr lang="fa-IR">
+              <a:rPr lang="fa-IR" dirty="0">
                 <a:latin typeface="Times New Roman" panose="02020603050405020304" pitchFamily="18" charset="0"/>
                 <a:cs typeface="B Lotus" panose="00000400000000000000" pitchFamily="2" charset="-78"/>
               </a:rPr>
               <a:t> ».</a:t>
+            </a:r>
+          </a:p>
+          <a:p>
+            <a:r>
+              <a:rPr lang="fa-IR" dirty="0">
+                <a:latin typeface="Times New Roman" panose="02020603050405020304" pitchFamily="18" charset="0"/>
+                <a:cs typeface="B Lotus" panose="00000400000000000000" pitchFamily="2" charset="-78"/>
+              </a:rPr>
+              <a:t>البته </a:t>
+            </a:r>
+            <a:r>
+              <a:rPr lang="fa-IR" dirty="0" err="1">
+                <a:latin typeface="Times New Roman" panose="02020603050405020304" pitchFamily="18" charset="0"/>
+                <a:cs typeface="B Lotus" panose="00000400000000000000" pitchFamily="2" charset="-78"/>
+              </a:rPr>
+              <a:t>ماامکان</a:t>
+            </a:r>
+            <a:r>
+              <a:rPr lang="fa-IR" dirty="0">
+                <a:latin typeface="Times New Roman" panose="02020603050405020304" pitchFamily="18" charset="0"/>
+                <a:cs typeface="B Lotus" panose="00000400000000000000" pitchFamily="2" charset="-78"/>
+              </a:rPr>
+              <a:t> بازگشت به </a:t>
+            </a:r>
+            <a:r>
+              <a:rPr lang="fa-IR" dirty="0" err="1">
+                <a:latin typeface="Times New Roman" panose="02020603050405020304" pitchFamily="18" charset="0"/>
+                <a:cs typeface="B Lotus" panose="00000400000000000000" pitchFamily="2" charset="-78"/>
+              </a:rPr>
+              <a:t>کامیت‌های</a:t>
+            </a:r>
+            <a:r>
+              <a:rPr lang="fa-IR" dirty="0">
+                <a:latin typeface="Times New Roman" panose="02020603050405020304" pitchFamily="18" charset="0"/>
+                <a:cs typeface="B Lotus" panose="00000400000000000000" pitchFamily="2" charset="-78"/>
+              </a:rPr>
+              <a:t> قبلی را نیز داریم که در آینده به آن خواهیم پرداخت.</a:t>
             </a:r>
           </a:p>
           <a:p>
@@ -11071,6 +11349,334 @@
     <p:extLst>
       <p:ext uri="{BB962C8B-B14F-4D97-AF65-F5344CB8AC3E}">
         <p14:creationId xmlns:p14="http://schemas.microsoft.com/office/powerpoint/2010/main" val="1312958527"/>
+      </p:ext>
+    </p:extLst>
+  </p:cSld>
+  <p:clrMapOvr>
+    <a:masterClrMapping/>
+  </p:clrMapOvr>
+</p:sld>
+</file>
+
+<file path=ppt/slides/slide11.xml><?xml version="1.0" encoding="utf-8"?>
+<p:sld xmlns:a="http://schemas.openxmlformats.org/drawingml/2006/main" xmlns:r="http://schemas.openxmlformats.org/officeDocument/2006/relationships" xmlns:p="http://schemas.openxmlformats.org/presentationml/2006/main">
+  <p:cSld>
+    <p:spTree>
+      <p:nvGrpSpPr>
+        <p:cNvPr id="1" name=""/>
+        <p:cNvGrpSpPr/>
+        <p:nvPr/>
+      </p:nvGrpSpPr>
+      <p:grpSpPr>
+        <a:xfrm>
+          <a:off x="0" y="0"/>
+          <a:ext cx="0" cy="0"/>
+          <a:chOff x="0" y="0"/>
+          <a:chExt cx="0" cy="0"/>
+        </a:xfrm>
+      </p:grpSpPr>
+      <p:sp>
+        <p:nvSpPr>
+          <p:cNvPr id="2" name="Title 1">
+            <a:extLst>
+              <a:ext uri="{FF2B5EF4-FFF2-40B4-BE49-F238E27FC236}">
+                <a16:creationId xmlns:a16="http://schemas.microsoft.com/office/drawing/2014/main" id="{BF1C1427-7F9A-423C-B18A-044F79B2834E}"/>
+              </a:ext>
+            </a:extLst>
+          </p:cNvPr>
+          <p:cNvSpPr>
+            <a:spLocks noGrp="1"/>
+          </p:cNvSpPr>
+          <p:nvPr>
+            <p:ph type="title"/>
+          </p:nvPr>
+        </p:nvSpPr>
+        <p:spPr/>
+        <p:txBody>
+          <a:bodyPr/>
+          <a:lstStyle/>
+          <a:p>
+            <a:r>
+              <a:rPr lang="fa-IR" dirty="0"/>
+              <a:t>ریموت</a:t>
+            </a:r>
+          </a:p>
+        </p:txBody>
+      </p:sp>
+      <p:sp>
+        <p:nvSpPr>
+          <p:cNvPr id="3" name="Content Placeholder 2">
+            <a:extLst>
+              <a:ext uri="{FF2B5EF4-FFF2-40B4-BE49-F238E27FC236}">
+                <a16:creationId xmlns:a16="http://schemas.microsoft.com/office/drawing/2014/main" id="{3BB0E2A9-28DC-430D-A183-22754EEB6FEF}"/>
+              </a:ext>
+            </a:extLst>
+          </p:cNvPr>
+          <p:cNvSpPr>
+            <a:spLocks noGrp="1"/>
+          </p:cNvSpPr>
+          <p:nvPr>
+            <p:ph idx="1"/>
+          </p:nvPr>
+        </p:nvSpPr>
+        <p:spPr/>
+        <p:txBody>
+          <a:bodyPr>
+            <a:normAutofit fontScale="85000" lnSpcReduction="20000"/>
+          </a:bodyPr>
+          <a:lstStyle/>
+          <a:p>
+            <a:r>
+              <a:rPr lang="fa-IR" dirty="0"/>
+              <a:t>ریموت چیست؟</a:t>
+            </a:r>
+          </a:p>
+          <a:p>
+            <a:pPr lvl="1"/>
+            <a:r>
+              <a:rPr lang="fa-IR" dirty="0"/>
+              <a:t>مشاهده </a:t>
+            </a:r>
+            <a:r>
+              <a:rPr lang="fa-IR" dirty="0" err="1"/>
+              <a:t>ریموت‌ها</a:t>
+            </a:r>
+            <a:r>
+              <a:rPr lang="fa-IR" dirty="0"/>
+              <a:t>: مشاهده </a:t>
+            </a:r>
+            <a:r>
+              <a:rPr lang="fa-IR" dirty="0" err="1"/>
+              <a:t>ریموت‌ها</a:t>
+            </a:r>
+            <a:r>
+              <a:rPr lang="fa-IR" dirty="0"/>
+              <a:t> به سادگی با دستور </a:t>
+            </a:r>
+            <a:r>
+              <a:rPr lang="en-US" dirty="0"/>
+              <a:t>git remote</a:t>
+            </a:r>
+            <a:r>
+              <a:rPr lang="fa-IR" dirty="0"/>
+              <a:t> امکان پذیر است.</a:t>
+            </a:r>
+          </a:p>
+          <a:p>
+            <a:pPr lvl="1"/>
+            <a:r>
+              <a:rPr lang="fa-IR" dirty="0"/>
+              <a:t>اضافه کردن مخازن ریموت: </a:t>
+            </a:r>
+            <a:r>
+              <a:rPr lang="fa-IR" dirty="0" err="1"/>
+              <a:t>مخازنی</a:t>
+            </a:r>
+            <a:r>
+              <a:rPr lang="fa-IR" dirty="0"/>
+              <a:t> که به وسیله دستور </a:t>
+            </a:r>
+            <a:r>
+              <a:rPr lang="en-US" dirty="0"/>
+              <a:t>git clone</a:t>
+            </a:r>
+            <a:r>
+              <a:rPr lang="fa-IR" dirty="0"/>
+              <a:t> بر روی کامپیوتر خود کپی کردید همواره یک ریموت( </a:t>
+            </a:r>
+            <a:r>
+              <a:rPr lang="fa-IR" dirty="0" err="1"/>
+              <a:t>ریموتی</a:t>
+            </a:r>
+            <a:r>
+              <a:rPr lang="fa-IR" dirty="0"/>
+              <a:t> که کلون از آن صورت گرفته ) دارند اما برای اضافه کردن ریموت جدید به یک مخزن محلی میتوانید از دستور </a:t>
+            </a:r>
+            <a:r>
+              <a:rPr lang="en-US" dirty="0"/>
+              <a:t>git remote add &lt;</a:t>
+            </a:r>
+            <a:r>
+              <a:rPr lang="en-US" dirty="0" err="1"/>
+              <a:t>shortname</a:t>
+            </a:r>
+            <a:r>
+              <a:rPr lang="en-US" dirty="0"/>
+              <a:t>&gt; &lt;</a:t>
+            </a:r>
+            <a:r>
+              <a:rPr lang="en-US" dirty="0" err="1"/>
+              <a:t>url</a:t>
+            </a:r>
+            <a:r>
+              <a:rPr lang="en-US" dirty="0"/>
+              <a:t>&gt;</a:t>
+            </a:r>
+            <a:r>
+              <a:rPr lang="fa-IR" dirty="0"/>
+              <a:t> استفاده کنید که یک ریموت با </a:t>
+            </a:r>
+            <a:r>
+              <a:rPr lang="fa-IR" dirty="0" err="1"/>
+              <a:t>ادرس</a:t>
+            </a:r>
+            <a:r>
+              <a:rPr lang="fa-IR" dirty="0"/>
+              <a:t> نوشته شده و نام دلخواه به مخزن شما اضافه </a:t>
+            </a:r>
+            <a:r>
+              <a:rPr lang="fa-IR" dirty="0" err="1"/>
+              <a:t>می‌کند</a:t>
+            </a:r>
+            <a:r>
+              <a:rPr lang="fa-IR" dirty="0"/>
+              <a:t>.</a:t>
+            </a:r>
+          </a:p>
+          <a:p>
+            <a:pPr lvl="1"/>
+            <a:r>
+              <a:rPr lang="fa-IR" dirty="0" err="1"/>
+              <a:t>فچ</a:t>
+            </a:r>
+            <a:r>
+              <a:rPr lang="fa-IR" dirty="0"/>
+              <a:t> و پول کردن از </a:t>
+            </a:r>
+            <a:r>
+              <a:rPr lang="fa-IR" dirty="0" err="1"/>
+              <a:t>ریموت‌ها</a:t>
+            </a:r>
+            <a:r>
+              <a:rPr lang="fa-IR" dirty="0"/>
+              <a:t>: دستور </a:t>
+            </a:r>
+            <a:r>
+              <a:rPr lang="en-US" dirty="0"/>
+              <a:t>git fetch &lt;remote&gt;</a:t>
+            </a:r>
+            <a:r>
+              <a:rPr lang="fa-IR" dirty="0"/>
+              <a:t> تمام اطلاعات روی ریموت که روی سیستم محلی شما وجود ندارند را روی سیستم محلی شما کپی میکند. دستور </a:t>
+            </a:r>
+            <a:r>
+              <a:rPr lang="en-US" dirty="0"/>
+              <a:t>git pull &lt;remote&gt;</a:t>
+            </a:r>
+            <a:r>
+              <a:rPr lang="fa-IR" dirty="0"/>
+              <a:t> علاوه بر کپی کردن اطلاعات از سرور این اطلاعات را با اطلاعات محلی شما نیز ادغام میکند.</a:t>
+            </a:r>
+          </a:p>
+          <a:p>
+            <a:pPr lvl="1"/>
+            <a:r>
+              <a:rPr lang="fa-IR" dirty="0"/>
+              <a:t>پوش کردن به ریموت: در </a:t>
+            </a:r>
+            <a:r>
+              <a:rPr lang="fa-IR" dirty="0" err="1"/>
+              <a:t>مرحله‌ای</a:t>
+            </a:r>
+            <a:r>
+              <a:rPr lang="fa-IR" dirty="0"/>
+              <a:t> شما نیاز دارید که تغییرات اعمال شده روی نسخه محلی( </a:t>
+            </a:r>
+            <a:r>
+              <a:rPr lang="fa-IR" dirty="0" err="1"/>
+              <a:t>کامیت‌ها</a:t>
+            </a:r>
+            <a:r>
+              <a:rPr lang="fa-IR" dirty="0"/>
+              <a:t> ) را به ریموت خود ارسال کنید، این کار با دستور  </a:t>
+            </a:r>
+            <a:r>
+              <a:rPr lang="en-US" dirty="0"/>
+              <a:t>git push &lt;remote&gt; &lt;branch&gt;</a:t>
+            </a:r>
+            <a:r>
+              <a:rPr lang="fa-IR" dirty="0"/>
+              <a:t> صورت میگیرد که در آینده به موضوع </a:t>
+            </a:r>
+            <a:r>
+              <a:rPr lang="fa-IR" dirty="0" err="1"/>
+              <a:t>برنچ</a:t>
+            </a:r>
+            <a:r>
+              <a:rPr lang="fa-IR" dirty="0"/>
+              <a:t> خواهیم پرداخت.</a:t>
+            </a:r>
+          </a:p>
+          <a:p>
+            <a:pPr lvl="1"/>
+            <a:r>
+              <a:rPr lang="fa-IR" dirty="0"/>
+              <a:t>تغییر نام و حذف ریموت: با دستور </a:t>
+            </a:r>
+            <a:r>
+              <a:rPr lang="fr-FR" dirty="0"/>
+              <a:t>git </a:t>
+            </a:r>
+            <a:r>
+              <a:rPr lang="fr-FR" dirty="0" err="1"/>
+              <a:t>remote</a:t>
+            </a:r>
+            <a:r>
+              <a:rPr lang="fr-FR" dirty="0"/>
+              <a:t> </a:t>
+            </a:r>
+            <a:r>
+              <a:rPr lang="fr-FR" dirty="0" err="1"/>
+              <a:t>rename</a:t>
+            </a:r>
+            <a:r>
+              <a:rPr lang="fr-FR" dirty="0"/>
+              <a:t> </a:t>
+            </a:r>
+            <a:r>
+              <a:rPr lang="en-US" dirty="0"/>
+              <a:t>&lt;old name&gt; &lt;new name&gt;</a:t>
+            </a:r>
+            <a:r>
+              <a:rPr lang="fa-IR" dirty="0"/>
+              <a:t> به سادگی میتوانید نام ریموت را تغییر بدهید و با دستور </a:t>
+            </a:r>
+            <a:r>
+              <a:rPr lang="en-US" dirty="0"/>
+              <a:t>git remote remove &lt;name&gt;</a:t>
+            </a:r>
+            <a:r>
+              <a:rPr lang="fa-IR" dirty="0"/>
+              <a:t> میتوانید ریموت و تمام </a:t>
+            </a:r>
+            <a:r>
+              <a:rPr lang="fa-IR" dirty="0" err="1"/>
+              <a:t>برنچ‌های</a:t>
+            </a:r>
+            <a:r>
+              <a:rPr lang="fa-IR" dirty="0"/>
+              <a:t> پیگیر و </a:t>
+            </a:r>
+            <a:r>
+              <a:rPr lang="fa-IR" dirty="0" err="1"/>
+              <a:t>پیکربندی</a:t>
+            </a:r>
+            <a:r>
+              <a:rPr lang="fa-IR" dirty="0"/>
+              <a:t> </a:t>
+            </a:r>
+            <a:r>
+              <a:rPr lang="fa-IR"/>
+              <a:t>های مربوط به ریموت را پاک کنید.</a:t>
+            </a:r>
+            <a:endParaRPr lang="fa-IR" dirty="0"/>
+          </a:p>
+        </p:txBody>
+      </p:sp>
+    </p:spTree>
+    <p:extLst>
+      <p:ext uri="{BB962C8B-B14F-4D97-AF65-F5344CB8AC3E}">
+        <p14:creationId xmlns:p14="http://schemas.microsoft.com/office/powerpoint/2010/main" val="1261359138"/>
       </p:ext>
     </p:extLst>
   </p:cSld>
@@ -11812,20 +12418,12 @@
               <a:buNone/>
             </a:pPr>
             <a:r>
-              <a:rPr lang="en-US" sz="2000" b="1" dirty="0">
-                <a:effectLst/>
-                <a:latin typeface="Times New Roman" panose="02020603050405020304" pitchFamily="18" charset="0"/>
-                <a:cs typeface="B Lotus" panose="00000400000000000000" pitchFamily="2" charset="-78"/>
-              </a:rPr>
-              <a:t>.</a:t>
-            </a:r>
-            <a:r>
-              <a:rPr lang="en-US" sz="2000" b="1" dirty="0" err="1">
-                <a:effectLst/>
-                <a:latin typeface="Times New Roman" panose="02020603050405020304" pitchFamily="18" charset="0"/>
-                <a:cs typeface="B Lotus" panose="00000400000000000000" pitchFamily="2" charset="-78"/>
-              </a:rPr>
-              <a:t>gitignore</a:t>
+              <a:rPr lang="fa-IR" sz="2000" b="1" dirty="0">
+                <a:effectLst/>
+                <a:latin typeface="Times New Roman" panose="02020603050405020304" pitchFamily="18" charset="0"/>
+                <a:cs typeface="B Lotus" panose="00000400000000000000" pitchFamily="2" charset="-78"/>
+              </a:rPr>
+              <a:t>ریموت</a:t>
             </a:r>
             <a:endParaRPr lang="en-US" sz="2000" b="1" dirty="0">
               <a:effectLst/>
@@ -11843,20 +12441,33 @@
                 <a:latin typeface="Times New Roman" panose="02020603050405020304" pitchFamily="18" charset="0"/>
                 <a:cs typeface="B Lotus" panose="00000400000000000000" pitchFamily="2" charset="-78"/>
               </a:rPr>
+              <a:t>.</a:t>
+            </a:r>
+            <a:r>
+              <a:rPr lang="en-US" sz="2000" b="1" dirty="0" err="1">
+                <a:effectLst/>
+                <a:latin typeface="Times New Roman" panose="02020603050405020304" pitchFamily="18" charset="0"/>
+                <a:cs typeface="B Lotus" panose="00000400000000000000" pitchFamily="2" charset="-78"/>
+              </a:rPr>
+              <a:t>gitignore</a:t>
+            </a:r>
+            <a:endParaRPr lang="en-US" sz="2000" b="1" dirty="0">
+              <a:effectLst/>
+              <a:latin typeface="Times New Roman" panose="02020603050405020304" pitchFamily="18" charset="0"/>
+              <a:cs typeface="B Lotus" panose="00000400000000000000" pitchFamily="2" charset="-78"/>
+            </a:endParaRPr>
+          </a:p>
+          <a:p>
+            <a:pPr marL="36900" indent="0">
+              <a:buNone/>
+            </a:pPr>
+            <a:r>
+              <a:rPr lang="en-US" sz="2000" b="1" dirty="0">
+                <a:effectLst/>
+                <a:latin typeface="Times New Roman" panose="02020603050405020304" pitchFamily="18" charset="0"/>
+                <a:cs typeface="B Lotus" panose="00000400000000000000" pitchFamily="2" charset="-78"/>
+              </a:rPr>
               <a:t>Branch</a:t>
-            </a:r>
-          </a:p>
-          <a:p>
-            <a:pPr marL="36900" indent="0">
-              <a:buNone/>
-            </a:pPr>
-            <a:r>
-              <a:rPr lang="en-US" sz="2000" b="1" dirty="0">
-                <a:effectLst/>
-                <a:latin typeface="Times New Roman" panose="02020603050405020304" pitchFamily="18" charset="0"/>
-                <a:cs typeface="B Lotus" panose="00000400000000000000" pitchFamily="2" charset="-78"/>
-              </a:rPr>
-              <a:t>Remote</a:t>
             </a:r>
           </a:p>
           <a:p>
@@ -16369,6 +16980,15 @@
 </file>
 
 <file path=customXml/item1.xml><?xml version="1.0" encoding="utf-8"?>
+<?mso-contentType ?>
+<FormTemplates xmlns="http://schemas.microsoft.com/sharepoint/v3/contenttype/forms">
+  <Display>DocumentLibraryForm</Display>
+  <Edit>DocumentLibraryForm</Edit>
+  <New>DocumentLibraryForm</New>
+</FormTemplates>
+</file>
+
+<file path=customXml/item2.xml><?xml version="1.0" encoding="utf-8"?>
 <ct:contentTypeSchema xmlns:ct="http://schemas.microsoft.com/office/2006/metadata/contentType" xmlns:ma="http://schemas.microsoft.com/office/2006/metadata/properties/metaAttributes" ct:_="" ma:_="" ma:contentTypeName="Document" ma:contentTypeID="0x01010079F111ED35F8CC479449609E8A0923A6" ma:contentTypeVersion="12" ma:contentTypeDescription="Create a new document." ma:contentTypeScope="" ma:versionID="a410dd7f93c95333ffa1b60ed6adedd1">
   <xsd:schema xmlns:xsd="http://www.w3.org/2001/XMLSchema" xmlns:xs="http://www.w3.org/2001/XMLSchema" xmlns:p="http://schemas.microsoft.com/office/2006/metadata/properties" xmlns:ns2="71af3243-3dd4-4a8d-8c0d-dd76da1f02a5" xmlns:ns3="16c05727-aa75-4e4a-9b5f-8a80a1165891" targetNamespace="http://schemas.microsoft.com/office/2006/metadata/properties" ma:root="true" ma:fieldsID="a936d9baba76aa3866493feff160faab" ns2:_="" ns3:_="">
     <xsd:import namespace="71af3243-3dd4-4a8d-8c0d-dd76da1f02a5"/>
@@ -16589,7 +17209,7 @@
 </ct:contentTypeSchema>
 </file>
 
-<file path=customXml/item2.xml><?xml version="1.0" encoding="utf-8"?>
+<file path=customXml/item3.xml><?xml version="1.0" encoding="utf-8"?>
 <p:properties xmlns:p="http://schemas.microsoft.com/office/2006/metadata/properties" xmlns:xsi="http://www.w3.org/2001/XMLSchema-instance" xmlns:pc="http://schemas.microsoft.com/office/infopath/2007/PartnerControls">
   <documentManagement>
     <Status xmlns="71af3243-3dd4-4a8d-8c0d-dd76da1f02a5">Not started</Status>
@@ -16598,16 +17218,15 @@
 </p:properties>
 </file>
 
-<file path=customXml/item3.xml><?xml version="1.0" encoding="utf-8"?>
-<?mso-contentType ?>
-<FormTemplates xmlns="http://schemas.microsoft.com/sharepoint/v3/contenttype/forms">
-  <Display>DocumentLibraryForm</Display>
-  <Edit>DocumentLibraryForm</Edit>
-  <New>DocumentLibraryForm</New>
-</FormTemplates>
+<file path=customXml/itemProps1.xml><?xml version="1.0" encoding="utf-8"?>
+<ds:datastoreItem xmlns:ds="http://schemas.openxmlformats.org/officeDocument/2006/customXml" ds:itemID="{64B270AB-C138-415C-897E-3C24487DECF1}">
+  <ds:schemaRefs>
+    <ds:schemaRef ds:uri="http://schemas.microsoft.com/sharepoint/v3/contenttype/forms"/>
+  </ds:schemaRefs>
+</ds:datastoreItem>
 </file>
 
-<file path=customXml/itemProps1.xml><?xml version="1.0" encoding="utf-8"?>
+<file path=customXml/itemProps2.xml><?xml version="1.0" encoding="utf-8"?>
 <ds:datastoreItem xmlns:ds="http://schemas.openxmlformats.org/officeDocument/2006/customXml" ds:itemID="{0585E981-8C91-4205-A0C3-C991F42B4C9E}">
   <ds:schemaRefs>
     <ds:schemaRef ds:uri="http://schemas.microsoft.com/office/2006/metadata/contentType"/>
@@ -16626,7 +17245,7 @@
 </ds:datastoreItem>
 </file>
 
-<file path=customXml/itemProps2.xml><?xml version="1.0" encoding="utf-8"?>
+<file path=customXml/itemProps3.xml><?xml version="1.0" encoding="utf-8"?>
 <ds:datastoreItem xmlns:ds="http://schemas.openxmlformats.org/officeDocument/2006/customXml" ds:itemID="{2C4C00F4-06E9-43E3-AD97-88A857CEFA82}">
   <ds:schemaRefs>
     <ds:schemaRef ds:uri="http://schemas.microsoft.com/office/2006/metadata/properties"/>
@@ -16634,12 +17253,4 @@
     <ds:schemaRef ds:uri="71af3243-3dd4-4a8d-8c0d-dd76da1f02a5"/>
   </ds:schemaRefs>
 </ds:datastoreItem>
-</file>
-
-<file path=customXml/itemProps3.xml><?xml version="1.0" encoding="utf-8"?>
-<ds:datastoreItem xmlns:ds="http://schemas.openxmlformats.org/officeDocument/2006/customXml" ds:itemID="{64B270AB-C138-415C-897E-3C24487DECF1}">
-  <ds:schemaRefs>
-    <ds:schemaRef ds:uri="http://schemas.microsoft.com/sharepoint/v3/contenttype/forms"/>
-  </ds:schemaRefs>
-</ds:datastoreItem>
 </file>
</xml_diff>

<commit_message>
final edits for first session.
</commit_message>
<xml_diff>
--- a/git slides.pptx
+++ b/git slides.pptx
@@ -237,7 +237,7 @@
           <a:p>
             <a:fld id="{7FD03EC1-2B28-42FB-8498-2945B84C90C5}" type="datetimeFigureOut">
               <a:rPr lang="fa-IR" smtClean="0"/>
-              <a:t>24/07/1442</a:t>
+              <a:t>26/07/1442</a:t>
             </a:fld>
             <a:endParaRPr lang="fa-IR"/>
           </a:p>
@@ -414,7 +414,7 @@
           <a:p>
             <a:fld id="{AFD01546-198A-4195-BCF8-F0FF54C90E5E}" type="datetimeFigureOut">
               <a:rPr lang="en-US" smtClean="0"/>
-              <a:t>3/7/2021</a:t>
+              <a:t>3/9/2021</a:t>
             </a:fld>
             <a:endParaRPr lang="en-US" dirty="0"/>
           </a:p>
@@ -4975,7 +4975,7 @@
           <a:p>
             <a:fld id="{F69DA16B-231B-482D-AA37-04379E774E41}" type="datetime1">
               <a:rPr lang="en-US" smtClean="0"/>
-              <a:t>3/7/2021</a:t>
+              <a:t>3/9/2021</a:t>
             </a:fld>
             <a:endParaRPr lang="en-US" dirty="0"/>
           </a:p>
@@ -5280,7 +5280,7 @@
           <a:p>
             <a:fld id="{6B87A23E-6D85-42A1-9FCE-A4E4139C6C17}" type="datetime1">
               <a:rPr lang="en-US" smtClean="0"/>
-              <a:t>3/7/2021</a:t>
+              <a:t>3/9/2021</a:t>
             </a:fld>
             <a:endParaRPr lang="en-US" dirty="0"/>
           </a:p>
@@ -5474,7 +5474,7 @@
           <a:p>
             <a:fld id="{51102DFB-B4B6-4780-9A33-C6A670AA20CA}" type="datetime1">
               <a:rPr lang="en-US" smtClean="0"/>
-              <a:t>3/7/2021</a:t>
+              <a:t>3/9/2021</a:t>
             </a:fld>
             <a:endParaRPr lang="en-US" dirty="0"/>
           </a:p>
@@ -5737,7 +5737,7 @@
           <a:p>
             <a:fld id="{0F14DB28-C4AE-4945-8A67-EE7D88CC098D}" type="datetime1">
               <a:rPr lang="en-US" smtClean="0"/>
-              <a:t>3/7/2021</a:t>
+              <a:t>3/9/2021</a:t>
             </a:fld>
             <a:endParaRPr lang="en-US" dirty="0"/>
           </a:p>
@@ -6173,7 +6173,7 @@
           <a:p>
             <a:fld id="{7FE6CF1C-BBA1-4BC1-989A-F1939DCA95BE}" type="datetime1">
               <a:rPr lang="en-US" smtClean="0"/>
-              <a:t>3/7/2021</a:t>
+              <a:t>3/9/2021</a:t>
             </a:fld>
             <a:endParaRPr lang="en-US" dirty="0"/>
           </a:p>
@@ -6710,7 +6710,7 @@
           <a:p>
             <a:fld id="{BE9DBDA7-CBB9-4352-A3E0-31AA369760C6}" type="datetime1">
               <a:rPr lang="en-US" smtClean="0"/>
-              <a:t>3/7/2021</a:t>
+              <a:t>3/9/2021</a:t>
             </a:fld>
             <a:endParaRPr lang="en-US" dirty="0"/>
           </a:p>
@@ -7592,7 +7592,7 @@
           <a:p>
             <a:fld id="{C03B6EC0-93AF-49E2-B665-23BF8B570B6E}" type="datetime1">
               <a:rPr lang="en-US" smtClean="0"/>
-              <a:t>3/7/2021</a:t>
+              <a:t>3/9/2021</a:t>
             </a:fld>
             <a:endParaRPr lang="en-US" dirty="0"/>
           </a:p>
@@ -7803,7 +7803,7 @@
           <a:p>
             <a:fld id="{B5E59FB5-DE1C-440A-ADBA-9491B030D047}" type="datetime1">
               <a:rPr lang="en-US" smtClean="0"/>
-              <a:t>3/7/2021</a:t>
+              <a:t>3/9/2021</a:t>
             </a:fld>
             <a:endParaRPr lang="en-US" dirty="0"/>
           </a:p>
@@ -8056,7 +8056,7 @@
           <a:p>
             <a:fld id="{9376A69F-3D08-47DF-AFC5-4A8D0A483A95}" type="datetime1">
               <a:rPr lang="en-US" smtClean="0"/>
-              <a:t>3/7/2021</a:t>
+              <a:t>3/9/2021</a:t>
             </a:fld>
             <a:endParaRPr lang="en-US" dirty="0"/>
           </a:p>
@@ -8298,7 +8298,7 @@
           <a:p>
             <a:fld id="{522E65B4-4602-468F-9608-73B12AC05567}" type="datetime1">
               <a:rPr lang="en-US" smtClean="0"/>
-              <a:t>3/7/2021</a:t>
+              <a:t>3/9/2021</a:t>
             </a:fld>
             <a:endParaRPr lang="en-US" dirty="0"/>
           </a:p>
@@ -8781,7 +8781,7 @@
           <a:p>
             <a:fld id="{3303A7E3-514F-4065-959A-0A389058DEDF}" type="datetime1">
               <a:rPr lang="en-US" smtClean="0"/>
-              <a:t>3/7/2021</a:t>
+              <a:t>3/9/2021</a:t>
             </a:fld>
             <a:endParaRPr lang="en-US" dirty="0"/>
           </a:p>
@@ -8899,7 +8899,7 @@
           <a:p>
             <a:fld id="{3F0C4CA6-0101-4C6B-8A91-9EB945CCD130}" type="datetime1">
               <a:rPr lang="en-US" smtClean="0"/>
-              <a:t>3/7/2021</a:t>
+              <a:t>3/9/2021</a:t>
             </a:fld>
             <a:endParaRPr lang="en-US" dirty="0"/>
           </a:p>
@@ -8994,7 +8994,7 @@
           <a:p>
             <a:fld id="{822895EA-2C3F-471B-A818-ADC9D631BFD3}" type="datetime1">
               <a:rPr lang="en-US" smtClean="0"/>
-              <a:t>3/7/2021</a:t>
+              <a:t>3/9/2021</a:t>
             </a:fld>
             <a:endParaRPr lang="en-US" dirty="0"/>
           </a:p>
@@ -9249,7 +9249,7 @@
           <a:p>
             <a:fld id="{3F87215C-3807-44F5-93D0-93EF791DB7A6}" type="datetime1">
               <a:rPr lang="en-US" smtClean="0"/>
-              <a:t>3/7/2021</a:t>
+              <a:t>3/9/2021</a:t>
             </a:fld>
             <a:endParaRPr lang="en-US" dirty="0"/>
           </a:p>
@@ -9556,7 +9556,7 @@
           <a:p>
             <a:fld id="{F462F745-7E65-4FD8-8CE3-7E86A8F598A8}" type="datetime1">
               <a:rPr lang="en-US" smtClean="0"/>
-              <a:t>3/7/2021</a:t>
+              <a:t>3/9/2021</a:t>
             </a:fld>
             <a:endParaRPr lang="en-US" dirty="0"/>
           </a:p>
@@ -9791,7 +9791,7 @@
           <a:p>
             <a:fld id="{4F63B90C-B8D9-42C8-AB56-0F22C1FB1A38}" type="datetime1">
               <a:rPr lang="en-US" smtClean="0"/>
-              <a:t>3/7/2021</a:t>
+              <a:t>3/9/2021</a:t>
             </a:fld>
             <a:endParaRPr lang="en-US" dirty="0"/>
           </a:p>
@@ -11716,1645 +11716,6 @@
   <p:clrMapOvr>
     <a:masterClrMapping/>
   </p:clrMapOvr>
-</p:sld>
-</file>
-
-<file path=ppt/slides/slide11.xml><?xml version="1.0" encoding="utf-8"?>
-<p:sld xmlns:a="http://schemas.openxmlformats.org/drawingml/2006/main" xmlns:r="http://schemas.openxmlformats.org/officeDocument/2006/relationships" xmlns:p="http://schemas.openxmlformats.org/presentationml/2006/main">
-  <p:cSld>
-    <p:spTree>
-      <p:nvGrpSpPr>
-        <p:cNvPr id="1" name=""/>
-        <p:cNvGrpSpPr/>
-        <p:nvPr/>
-      </p:nvGrpSpPr>
-      <p:grpSpPr>
-        <a:xfrm>
-          <a:off x="0" y="0"/>
-          <a:ext cx="0" cy="0"/>
-          <a:chOff x="0" y="0"/>
-          <a:chExt cx="0" cy="0"/>
-        </a:xfrm>
-      </p:grpSpPr>
-      <p:sp>
-        <p:nvSpPr>
-          <p:cNvPr id="2" name="Title 1">
-            <a:extLst>
-              <a:ext uri="{FF2B5EF4-FFF2-40B4-BE49-F238E27FC236}">
-                <a16:creationId xmlns:a16="http://schemas.microsoft.com/office/drawing/2014/main" id="{8414E162-7901-4913-91CB-F4396B0648DE}"/>
-              </a:ext>
-            </a:extLst>
-          </p:cNvPr>
-          <p:cNvSpPr>
-            <a:spLocks noGrp="1"/>
-          </p:cNvSpPr>
-          <p:nvPr>
-            <p:ph type="title"/>
-          </p:nvPr>
-        </p:nvSpPr>
-        <p:spPr/>
-        <p:txBody>
-          <a:bodyPr/>
-          <a:lstStyle/>
-          <a:p>
-            <a:r>
-              <a:rPr lang="en-US" dirty="0" err="1"/>
-              <a:t>gitignore</a:t>
-            </a:r>
-            <a:endParaRPr lang="fa-IR" dirty="0"/>
-          </a:p>
-        </p:txBody>
-      </p:sp>
-      <p:sp>
-        <p:nvSpPr>
-          <p:cNvPr id="3" name="Content Placeholder 2">
-            <a:extLst>
-              <a:ext uri="{FF2B5EF4-FFF2-40B4-BE49-F238E27FC236}">
-                <a16:creationId xmlns:a16="http://schemas.microsoft.com/office/drawing/2014/main" id="{A1856185-B4C6-4858-BC4B-05134C909C2C}"/>
-              </a:ext>
-            </a:extLst>
-          </p:cNvPr>
-          <p:cNvSpPr>
-            <a:spLocks noGrp="1"/>
-          </p:cNvSpPr>
-          <p:nvPr>
-            <p:ph idx="1"/>
-          </p:nvPr>
-        </p:nvSpPr>
-        <p:spPr>
-          <a:xfrm>
-            <a:off x="919119" y="1571626"/>
-            <a:ext cx="10353762" cy="3714749"/>
-          </a:xfrm>
-        </p:spPr>
-        <p:txBody>
-          <a:bodyPr anchor="ctr">
-            <a:normAutofit lnSpcReduction="10000"/>
-          </a:bodyPr>
-          <a:lstStyle/>
-          <a:p>
-            <a:r>
-              <a:rPr lang="fa-IR" sz="2400" b="1" dirty="0">
-                <a:effectLst/>
-                <a:latin typeface="Times New Roman" panose="02020603050405020304" pitchFamily="18" charset="0"/>
-                <a:cs typeface="B Lotus" panose="00000400000000000000" pitchFamily="2" charset="-78"/>
-              </a:rPr>
-              <a:t>آیا همه </a:t>
-            </a:r>
-            <a:r>
-              <a:rPr lang="fa-IR" sz="2400" b="1" dirty="0" err="1">
-                <a:effectLst/>
-                <a:latin typeface="Times New Roman" panose="02020603050405020304" pitchFamily="18" charset="0"/>
-                <a:cs typeface="B Lotus" panose="00000400000000000000" pitchFamily="2" charset="-78"/>
-              </a:rPr>
-              <a:t>داده‌ها</a:t>
-            </a:r>
-            <a:r>
-              <a:rPr lang="fa-IR" sz="2400" b="1" dirty="0">
-                <a:effectLst/>
-                <a:latin typeface="Times New Roman" panose="02020603050405020304" pitchFamily="18" charset="0"/>
-                <a:cs typeface="B Lotus" panose="00000400000000000000" pitchFamily="2" charset="-78"/>
-              </a:rPr>
-              <a:t> باید در مخزن ذخیره شوند؟</a:t>
-            </a:r>
-          </a:p>
-          <a:p>
-            <a:pPr marL="450000" lvl="1" indent="0">
-              <a:buNone/>
-            </a:pPr>
-            <a:r>
-              <a:rPr lang="fa-IR" sz="2400" dirty="0" err="1">
-                <a:effectLst/>
-                <a:latin typeface="Times New Roman" panose="02020603050405020304" pitchFamily="18" charset="0"/>
-                <a:cs typeface="B Lotus" panose="00000400000000000000" pitchFamily="2" charset="-78"/>
-              </a:rPr>
-              <a:t>گیت</a:t>
-            </a:r>
-            <a:r>
-              <a:rPr lang="fa-IR" sz="2400" dirty="0">
-                <a:effectLst/>
-                <a:latin typeface="Times New Roman" panose="02020603050405020304" pitchFamily="18" charset="0"/>
-                <a:cs typeface="B Lotus" panose="00000400000000000000" pitchFamily="2" charset="-78"/>
-              </a:rPr>
-              <a:t> امکانی برای نادیده گرفتن برخی </a:t>
-            </a:r>
-            <a:r>
-              <a:rPr lang="fa-IR" sz="2400" dirty="0" err="1">
-                <a:effectLst/>
-                <a:latin typeface="Times New Roman" panose="02020603050405020304" pitchFamily="18" charset="0"/>
-                <a:cs typeface="B Lotus" panose="00000400000000000000" pitchFamily="2" charset="-78"/>
-              </a:rPr>
-              <a:t>داده‌ها</a:t>
-            </a:r>
-            <a:r>
-              <a:rPr lang="fa-IR" sz="2400" dirty="0">
-                <a:effectLst/>
-                <a:latin typeface="Times New Roman" panose="02020603050405020304" pitchFamily="18" charset="0"/>
-                <a:cs typeface="B Lotus" panose="00000400000000000000" pitchFamily="2" charset="-78"/>
-              </a:rPr>
-              <a:t> فراهم کرده است تا کاربر قادر باشد برخی </a:t>
-            </a:r>
-            <a:r>
-              <a:rPr lang="fa-IR" sz="2400" dirty="0" err="1">
-                <a:effectLst/>
-                <a:latin typeface="Times New Roman" panose="02020603050405020304" pitchFamily="18" charset="0"/>
-                <a:cs typeface="B Lotus" panose="00000400000000000000" pitchFamily="2" charset="-78"/>
-              </a:rPr>
-              <a:t>فایل‌ها</a:t>
-            </a:r>
-            <a:r>
-              <a:rPr lang="fa-IR" sz="2400" dirty="0">
-                <a:effectLst/>
-                <a:latin typeface="Times New Roman" panose="02020603050405020304" pitchFamily="18" charset="0"/>
-                <a:cs typeface="B Lotus" panose="00000400000000000000" pitchFamily="2" charset="-78"/>
-              </a:rPr>
-              <a:t> را از دید </a:t>
-            </a:r>
-            <a:r>
-              <a:rPr lang="fa-IR" sz="2400" dirty="0" err="1">
-                <a:effectLst/>
-                <a:latin typeface="Times New Roman" panose="02020603050405020304" pitchFamily="18" charset="0"/>
-                <a:cs typeface="B Lotus" panose="00000400000000000000" pitchFamily="2" charset="-78"/>
-              </a:rPr>
-              <a:t>گیت</a:t>
-            </a:r>
-            <a:r>
-              <a:rPr lang="fa-IR" sz="2400" dirty="0">
-                <a:effectLst/>
-                <a:latin typeface="Times New Roman" panose="02020603050405020304" pitchFamily="18" charset="0"/>
-                <a:cs typeface="B Lotus" panose="00000400000000000000" pitchFamily="2" charset="-78"/>
-              </a:rPr>
-              <a:t> مخفی کند.</a:t>
-            </a:r>
-          </a:p>
-          <a:p>
-            <a:pPr marL="450000" lvl="1" indent="0">
-              <a:buNone/>
-            </a:pPr>
-            <a:r>
-              <a:rPr lang="fa-IR" sz="2400" dirty="0">
-                <a:effectLst/>
-                <a:latin typeface="Times New Roman" panose="02020603050405020304" pitchFamily="18" charset="0"/>
-                <a:cs typeface="B Lotus" panose="00000400000000000000" pitchFamily="2" charset="-78"/>
-              </a:rPr>
-              <a:t>برای انجام این کار کافی است که در مسیری که </a:t>
-            </a:r>
-            <a:r>
-              <a:rPr lang="fa-IR" sz="2400" dirty="0" err="1">
-                <a:effectLst/>
-                <a:latin typeface="Times New Roman" panose="02020603050405020304" pitchFamily="18" charset="0"/>
-                <a:cs typeface="B Lotus" panose="00000400000000000000" pitchFamily="2" charset="-78"/>
-              </a:rPr>
-              <a:t>می‌خواهید</a:t>
-            </a:r>
-            <a:r>
-              <a:rPr lang="fa-IR" sz="2400" dirty="0">
-                <a:effectLst/>
-                <a:latin typeface="Times New Roman" panose="02020603050405020304" pitchFamily="18" charset="0"/>
-                <a:cs typeface="B Lotus" panose="00000400000000000000" pitchFamily="2" charset="-78"/>
-              </a:rPr>
-              <a:t> از در آن اطلاعات را از دید </a:t>
-            </a:r>
-            <a:r>
-              <a:rPr lang="fa-IR" sz="2400" dirty="0" err="1">
-                <a:effectLst/>
-                <a:latin typeface="Times New Roman" panose="02020603050405020304" pitchFamily="18" charset="0"/>
-                <a:cs typeface="B Lotus" panose="00000400000000000000" pitchFamily="2" charset="-78"/>
-              </a:rPr>
-              <a:t>گیت</a:t>
-            </a:r>
-            <a:r>
-              <a:rPr lang="fa-IR" sz="2400" dirty="0">
-                <a:effectLst/>
-                <a:latin typeface="Times New Roman" panose="02020603050405020304" pitchFamily="18" charset="0"/>
-                <a:cs typeface="B Lotus" panose="00000400000000000000" pitchFamily="2" charset="-78"/>
-              </a:rPr>
-              <a:t> مخفی کنید یک فایل با پسوند </a:t>
-            </a:r>
-            <a:r>
-              <a:rPr lang="en-US" sz="2400" dirty="0">
-                <a:effectLst/>
-                <a:latin typeface="Times New Roman" panose="02020603050405020304" pitchFamily="18" charset="0"/>
-                <a:cs typeface="B Lotus" panose="00000400000000000000" pitchFamily="2" charset="-78"/>
-              </a:rPr>
-              <a:t>.</a:t>
-            </a:r>
-            <a:r>
-              <a:rPr lang="en-US" sz="2400" dirty="0" err="1">
-                <a:effectLst/>
-                <a:latin typeface="Times New Roman" panose="02020603050405020304" pitchFamily="18" charset="0"/>
-                <a:cs typeface="B Lotus" panose="00000400000000000000" pitchFamily="2" charset="-78"/>
-              </a:rPr>
-              <a:t>gitignore</a:t>
-            </a:r>
-            <a:r>
-              <a:rPr lang="fa-IR" sz="2400" dirty="0">
-                <a:effectLst/>
-                <a:latin typeface="Times New Roman" panose="02020603050405020304" pitchFamily="18" charset="0"/>
-                <a:cs typeface="B Lotus" panose="00000400000000000000" pitchFamily="2" charset="-78"/>
-              </a:rPr>
-              <a:t> ایجاد کنید و نام فایل( ها ) یا مسیر منتهی به آن( ها ) را در این فایل متنی بنویسید. در صورتی که فایل( های ) مورد نظر در </a:t>
-            </a:r>
-            <a:r>
-              <a:rPr lang="fa-IR" sz="2400" dirty="0" err="1">
-                <a:effectLst/>
-                <a:latin typeface="Times New Roman" panose="02020603050405020304" pitchFamily="18" charset="0"/>
-                <a:cs typeface="B Lotus" panose="00000400000000000000" pitchFamily="2" charset="-78"/>
-              </a:rPr>
-              <a:t>گیت</a:t>
-            </a:r>
-            <a:r>
-              <a:rPr lang="fa-IR" sz="2400" dirty="0">
-                <a:effectLst/>
-                <a:latin typeface="Times New Roman" panose="02020603050405020304" pitchFamily="18" charset="0"/>
-                <a:cs typeface="B Lotus" panose="00000400000000000000" pitchFamily="2" charset="-78"/>
-              </a:rPr>
-              <a:t> ذخیره نشده باشند از این پس نیز توسط </a:t>
-            </a:r>
-            <a:r>
-              <a:rPr lang="fa-IR" sz="2400" dirty="0" err="1">
-                <a:effectLst/>
-                <a:latin typeface="Times New Roman" panose="02020603050405020304" pitchFamily="18" charset="0"/>
-                <a:cs typeface="B Lotus" panose="00000400000000000000" pitchFamily="2" charset="-78"/>
-              </a:rPr>
-              <a:t>گیت</a:t>
-            </a:r>
-            <a:r>
-              <a:rPr lang="fa-IR" sz="2400" dirty="0">
-                <a:effectLst/>
-                <a:latin typeface="Times New Roman" panose="02020603050405020304" pitchFamily="18" charset="0"/>
-                <a:cs typeface="B Lotus" panose="00000400000000000000" pitchFamily="2" charset="-78"/>
-              </a:rPr>
-              <a:t> دنبال </a:t>
-            </a:r>
-            <a:r>
-              <a:rPr lang="fa-IR" sz="2400" dirty="0" err="1">
-                <a:effectLst/>
-                <a:latin typeface="Times New Roman" panose="02020603050405020304" pitchFamily="18" charset="0"/>
-                <a:cs typeface="B Lotus" panose="00000400000000000000" pitchFamily="2" charset="-78"/>
-              </a:rPr>
-              <a:t>نمی‌شوند</a:t>
-            </a:r>
-            <a:r>
-              <a:rPr lang="fa-IR" sz="2400" dirty="0">
-                <a:effectLst/>
-                <a:latin typeface="Times New Roman" panose="02020603050405020304" pitchFamily="18" charset="0"/>
-                <a:cs typeface="B Lotus" panose="00000400000000000000" pitchFamily="2" charset="-78"/>
-              </a:rPr>
-              <a:t>.</a:t>
-            </a:r>
-          </a:p>
-          <a:p>
-            <a:pPr marL="450000" lvl="1" indent="0">
-              <a:buNone/>
-            </a:pPr>
-            <a:r>
-              <a:rPr lang="fa-IR" sz="2400" dirty="0">
-                <a:effectLst/>
-                <a:latin typeface="Times New Roman" panose="02020603050405020304" pitchFamily="18" charset="0"/>
-                <a:cs typeface="B Lotus" panose="00000400000000000000" pitchFamily="2" charset="-78"/>
-              </a:rPr>
-              <a:t>البته در سطح </a:t>
-            </a:r>
-            <a:r>
-              <a:rPr lang="fa-IR" sz="2400" dirty="0" err="1">
-                <a:effectLst/>
-                <a:latin typeface="Times New Roman" panose="02020603050405020304" pitchFamily="18" charset="0"/>
-                <a:cs typeface="B Lotus" panose="00000400000000000000" pitchFamily="2" charset="-78"/>
-              </a:rPr>
-              <a:t>وب</a:t>
-            </a:r>
-            <a:r>
-              <a:rPr lang="fa-IR" sz="2400" dirty="0">
-                <a:effectLst/>
-                <a:latin typeface="Times New Roman" panose="02020603050405020304" pitchFamily="18" charset="0"/>
-                <a:cs typeface="B Lotus" panose="00000400000000000000" pitchFamily="2" charset="-78"/>
-              </a:rPr>
-              <a:t> ابزارهایی برای ایجاد فایل </a:t>
-            </a:r>
-            <a:r>
-              <a:rPr lang="en-US" sz="2400" dirty="0">
-                <a:effectLst/>
-                <a:latin typeface="Times New Roman" panose="02020603050405020304" pitchFamily="18" charset="0"/>
-                <a:cs typeface="B Lotus" panose="00000400000000000000" pitchFamily="2" charset="-78"/>
-              </a:rPr>
-              <a:t>.</a:t>
-            </a:r>
-            <a:r>
-              <a:rPr lang="en-US" sz="2400" dirty="0" err="1">
-                <a:effectLst/>
-                <a:latin typeface="Times New Roman" panose="02020603050405020304" pitchFamily="18" charset="0"/>
-                <a:cs typeface="B Lotus" panose="00000400000000000000" pitchFamily="2" charset="-78"/>
-              </a:rPr>
-              <a:t>gitignore</a:t>
-            </a:r>
-            <a:r>
-              <a:rPr lang="fa-IR" sz="2400" dirty="0">
-                <a:effectLst/>
-                <a:latin typeface="Times New Roman" panose="02020603050405020304" pitchFamily="18" charset="0"/>
-                <a:cs typeface="B Lotus" panose="00000400000000000000" pitchFamily="2" charset="-78"/>
-              </a:rPr>
-              <a:t> با توجه به </a:t>
-            </a:r>
-            <a:r>
-              <a:rPr lang="fa-IR" sz="2400" dirty="0" err="1">
-                <a:effectLst/>
-                <a:latin typeface="Times New Roman" panose="02020603050405020304" pitchFamily="18" charset="0"/>
-                <a:cs typeface="B Lotus" panose="00000400000000000000" pitchFamily="2" charset="-78"/>
-              </a:rPr>
-              <a:t>تکنولوژی‌هایی</a:t>
-            </a:r>
-            <a:r>
-              <a:rPr lang="fa-IR" sz="2400" dirty="0">
-                <a:effectLst/>
-                <a:latin typeface="Times New Roman" panose="02020603050405020304" pitchFamily="18" charset="0"/>
-                <a:cs typeface="B Lotus" panose="00000400000000000000" pitchFamily="2" charset="-78"/>
-              </a:rPr>
-              <a:t> که در پروژه خود استفاده </a:t>
-            </a:r>
-            <a:r>
-              <a:rPr lang="fa-IR" sz="2400" dirty="0" err="1">
-                <a:effectLst/>
-                <a:latin typeface="Times New Roman" panose="02020603050405020304" pitchFamily="18" charset="0"/>
-                <a:cs typeface="B Lotus" panose="00000400000000000000" pitchFamily="2" charset="-78"/>
-              </a:rPr>
-              <a:t>کرده‌اید</a:t>
-            </a:r>
-            <a:r>
-              <a:rPr lang="fa-IR" sz="2400" dirty="0">
-                <a:effectLst/>
-                <a:latin typeface="Times New Roman" panose="02020603050405020304" pitchFamily="18" charset="0"/>
-                <a:cs typeface="B Lotus" panose="00000400000000000000" pitchFamily="2" charset="-78"/>
-              </a:rPr>
-              <a:t> وجود دارد( مثلا </a:t>
-            </a:r>
-            <a:r>
-              <a:rPr lang="en-US" sz="2400" dirty="0">
-                <a:solidFill>
-                  <a:schemeClr val="tx1"/>
-                </a:solidFill>
-                <a:effectLst/>
-                <a:latin typeface="Times New Roman" panose="02020603050405020304" pitchFamily="18" charset="0"/>
-                <a:cs typeface="B Lotus" panose="00000400000000000000" pitchFamily="2" charset="-78"/>
-                <a:hlinkClick r:id="rId2">
-                  <a:extLst>
-                    <a:ext uri="{A12FA001-AC4F-418D-AE19-62706E023703}">
-                      <ahyp:hlinkClr xmlns:ahyp="http://schemas.microsoft.com/office/drawing/2018/hyperlinkcolor" val="tx"/>
-                    </a:ext>
-                  </a:extLst>
-                </a:hlinkClick>
-              </a:rPr>
-              <a:t>https://www.toptal.com/developers/gitignore</a:t>
-            </a:r>
-            <a:r>
-              <a:rPr lang="fa-IR" sz="2400" dirty="0">
-                <a:solidFill>
-                  <a:schemeClr val="tx1"/>
-                </a:solidFill>
-                <a:effectLst/>
-                <a:latin typeface="Times New Roman" panose="02020603050405020304" pitchFamily="18" charset="0"/>
-                <a:cs typeface="B Lotus" panose="00000400000000000000" pitchFamily="2" charset="-78"/>
-              </a:rPr>
-              <a:t> </a:t>
-            </a:r>
-            <a:r>
-              <a:rPr lang="fa-IR" sz="2400" dirty="0">
-                <a:effectLst/>
-                <a:latin typeface="Times New Roman" panose="02020603050405020304" pitchFamily="18" charset="0"/>
-                <a:cs typeface="B Lotus" panose="00000400000000000000" pitchFamily="2" charset="-78"/>
-              </a:rPr>
-              <a:t>).</a:t>
-            </a:r>
-          </a:p>
-        </p:txBody>
-      </p:sp>
-      <p:sp>
-        <p:nvSpPr>
-          <p:cNvPr id="4" name="Slide Number Placeholder 3">
-            <a:extLst>
-              <a:ext uri="{FF2B5EF4-FFF2-40B4-BE49-F238E27FC236}">
-                <a16:creationId xmlns:a16="http://schemas.microsoft.com/office/drawing/2014/main" id="{6AA0F52E-D73D-48DC-B6BC-0570A45BB9E5}"/>
-              </a:ext>
-            </a:extLst>
-          </p:cNvPr>
-          <p:cNvSpPr>
-            <a:spLocks noGrp="1"/>
-          </p:cNvSpPr>
-          <p:nvPr>
-            <p:ph type="sldNum" sz="quarter" idx="12"/>
-          </p:nvPr>
-        </p:nvSpPr>
-        <p:spPr/>
-        <p:txBody>
-          <a:bodyPr/>
-          <a:lstStyle/>
-          <a:p>
-            <a:fld id="{3A98EE3D-8CD1-4C3F-BD1C-C98C9596463C}" type="slidenum">
-              <a:rPr lang="en-US" smtClean="0"/>
-              <a:t>11</a:t>
-            </a:fld>
-            <a:endParaRPr lang="en-US" dirty="0"/>
-          </a:p>
-        </p:txBody>
-      </p:sp>
-    </p:spTree>
-    <p:extLst>
-      <p:ext uri="{BB962C8B-B14F-4D97-AF65-F5344CB8AC3E}">
-        <p14:creationId xmlns:p14="http://schemas.microsoft.com/office/powerpoint/2010/main" val="490033831"/>
-      </p:ext>
-    </p:extLst>
-  </p:cSld>
-  <p:clrMapOvr>
-    <a:masterClrMapping/>
-  </p:clrMapOvr>
-  <p:timing>
-    <p:tnLst>
-      <p:par>
-        <p:cTn id="1" dur="indefinite" restart="never" nodeType="tmRoot">
-          <p:childTnLst>
-            <p:seq concurrent="1" nextAc="seek">
-              <p:cTn id="2" dur="indefinite" nodeType="mainSeq">
-                <p:childTnLst>
-                  <p:par>
-                    <p:cTn id="3" fill="hold">
-                      <p:stCondLst>
-                        <p:cond delay="indefinite"/>
-                      </p:stCondLst>
-                      <p:childTnLst>
-                        <p:par>
-                          <p:cTn id="4" fill="hold">
-                            <p:stCondLst>
-                              <p:cond delay="0"/>
-                            </p:stCondLst>
-                            <p:childTnLst>
-                              <p:par>
-                                <p:cTn id="5" presetID="2" presetClass="entr" presetSubtype="4" fill="hold" nodeType="clickEffect">
-                                  <p:stCondLst>
-                                    <p:cond delay="0"/>
-                                  </p:stCondLst>
-                                  <p:childTnLst>
-                                    <p:set>
-                                      <p:cBhvr>
-                                        <p:cTn id="6" dur="1" fill="hold">
-                                          <p:stCondLst>
-                                            <p:cond delay="0"/>
-                                          </p:stCondLst>
-                                        </p:cTn>
-                                        <p:tgtEl>
-                                          <p:spTgt spid="3">
-                                            <p:txEl>
-                                              <p:pRg st="1" end="1"/>
-                                            </p:txEl>
-                                          </p:spTgt>
-                                        </p:tgtEl>
-                                        <p:attrNameLst>
-                                          <p:attrName>style.visibility</p:attrName>
-                                        </p:attrNameLst>
-                                      </p:cBhvr>
-                                      <p:to>
-                                        <p:strVal val="visible"/>
-                                      </p:to>
-                                    </p:set>
-                                    <p:anim calcmode="lin" valueType="num">
-                                      <p:cBhvr additive="base">
-                                        <p:cTn id="7" dur="500" fill="hold"/>
-                                        <p:tgtEl>
-                                          <p:spTgt spid="3">
-                                            <p:txEl>
-                                              <p:pRg st="1" end="1"/>
-                                            </p:txEl>
-                                          </p:spTgt>
-                                        </p:tgtEl>
-                                        <p:attrNameLst>
-                                          <p:attrName>ppt_x</p:attrName>
-                                        </p:attrNameLst>
-                                      </p:cBhvr>
-                                      <p:tavLst>
-                                        <p:tav tm="0">
-                                          <p:val>
-                                            <p:strVal val="#ppt_x"/>
-                                          </p:val>
-                                        </p:tav>
-                                        <p:tav tm="100000">
-                                          <p:val>
-                                            <p:strVal val="#ppt_x"/>
-                                          </p:val>
-                                        </p:tav>
-                                      </p:tavLst>
-                                    </p:anim>
-                                    <p:anim calcmode="lin" valueType="num">
-                                      <p:cBhvr additive="base">
-                                        <p:cTn id="8" dur="500" fill="hold"/>
-                                        <p:tgtEl>
-                                          <p:spTgt spid="3">
-                                            <p:txEl>
-                                              <p:pRg st="1" end="1"/>
-                                            </p:txEl>
-                                          </p:spTgt>
-                                        </p:tgtEl>
-                                        <p:attrNameLst>
-                                          <p:attrName>ppt_y</p:attrName>
-                                        </p:attrNameLst>
-                                      </p:cBhvr>
-                                      <p:tavLst>
-                                        <p:tav tm="0">
-                                          <p:val>
-                                            <p:strVal val="1+#ppt_h/2"/>
-                                          </p:val>
-                                        </p:tav>
-                                        <p:tav tm="100000">
-                                          <p:val>
-                                            <p:strVal val="#ppt_y"/>
-                                          </p:val>
-                                        </p:tav>
-                                      </p:tavLst>
-                                    </p:anim>
-                                  </p:childTnLst>
-                                </p:cTn>
-                              </p:par>
-                            </p:childTnLst>
-                          </p:cTn>
-                        </p:par>
-                        <p:par>
-                          <p:cTn id="9" fill="hold">
-                            <p:stCondLst>
-                              <p:cond delay="500"/>
-                            </p:stCondLst>
-                            <p:childTnLst>
-                              <p:par>
-                                <p:cTn id="10" presetID="2" presetClass="entr" presetSubtype="4" fill="hold" nodeType="afterEffect">
-                                  <p:stCondLst>
-                                    <p:cond delay="0"/>
-                                  </p:stCondLst>
-                                  <p:childTnLst>
-                                    <p:set>
-                                      <p:cBhvr>
-                                        <p:cTn id="11" dur="1" fill="hold">
-                                          <p:stCondLst>
-                                            <p:cond delay="0"/>
-                                          </p:stCondLst>
-                                        </p:cTn>
-                                        <p:tgtEl>
-                                          <p:spTgt spid="3">
-                                            <p:txEl>
-                                              <p:pRg st="2" end="2"/>
-                                            </p:txEl>
-                                          </p:spTgt>
-                                        </p:tgtEl>
-                                        <p:attrNameLst>
-                                          <p:attrName>style.visibility</p:attrName>
-                                        </p:attrNameLst>
-                                      </p:cBhvr>
-                                      <p:to>
-                                        <p:strVal val="visible"/>
-                                      </p:to>
-                                    </p:set>
-                                    <p:anim calcmode="lin" valueType="num">
-                                      <p:cBhvr additive="base">
-                                        <p:cTn id="12" dur="500" fill="hold"/>
-                                        <p:tgtEl>
-                                          <p:spTgt spid="3">
-                                            <p:txEl>
-                                              <p:pRg st="2" end="2"/>
-                                            </p:txEl>
-                                          </p:spTgt>
-                                        </p:tgtEl>
-                                        <p:attrNameLst>
-                                          <p:attrName>ppt_x</p:attrName>
-                                        </p:attrNameLst>
-                                      </p:cBhvr>
-                                      <p:tavLst>
-                                        <p:tav tm="0">
-                                          <p:val>
-                                            <p:strVal val="#ppt_x"/>
-                                          </p:val>
-                                        </p:tav>
-                                        <p:tav tm="100000">
-                                          <p:val>
-                                            <p:strVal val="#ppt_x"/>
-                                          </p:val>
-                                        </p:tav>
-                                      </p:tavLst>
-                                    </p:anim>
-                                    <p:anim calcmode="lin" valueType="num">
-                                      <p:cBhvr additive="base">
-                                        <p:cTn id="13" dur="500" fill="hold"/>
-                                        <p:tgtEl>
-                                          <p:spTgt spid="3">
-                                            <p:txEl>
-                                              <p:pRg st="2" end="2"/>
-                                            </p:txEl>
-                                          </p:spTgt>
-                                        </p:tgtEl>
-                                        <p:attrNameLst>
-                                          <p:attrName>ppt_y</p:attrName>
-                                        </p:attrNameLst>
-                                      </p:cBhvr>
-                                      <p:tavLst>
-                                        <p:tav tm="0">
-                                          <p:val>
-                                            <p:strVal val="1+#ppt_h/2"/>
-                                          </p:val>
-                                        </p:tav>
-                                        <p:tav tm="100000">
-                                          <p:val>
-                                            <p:strVal val="#ppt_y"/>
-                                          </p:val>
-                                        </p:tav>
-                                      </p:tavLst>
-                                    </p:anim>
-                                  </p:childTnLst>
-                                </p:cTn>
-                              </p:par>
-                            </p:childTnLst>
-                          </p:cTn>
-                        </p:par>
-                        <p:par>
-                          <p:cTn id="14" fill="hold">
-                            <p:stCondLst>
-                              <p:cond delay="1000"/>
-                            </p:stCondLst>
-                            <p:childTnLst>
-                              <p:par>
-                                <p:cTn id="15" presetID="2" presetClass="entr" presetSubtype="4" fill="hold" nodeType="afterEffect">
-                                  <p:stCondLst>
-                                    <p:cond delay="0"/>
-                                  </p:stCondLst>
-                                  <p:childTnLst>
-                                    <p:set>
-                                      <p:cBhvr>
-                                        <p:cTn id="16" dur="1" fill="hold">
-                                          <p:stCondLst>
-                                            <p:cond delay="0"/>
-                                          </p:stCondLst>
-                                        </p:cTn>
-                                        <p:tgtEl>
-                                          <p:spTgt spid="3">
-                                            <p:txEl>
-                                              <p:pRg st="3" end="3"/>
-                                            </p:txEl>
-                                          </p:spTgt>
-                                        </p:tgtEl>
-                                        <p:attrNameLst>
-                                          <p:attrName>style.visibility</p:attrName>
-                                        </p:attrNameLst>
-                                      </p:cBhvr>
-                                      <p:to>
-                                        <p:strVal val="visible"/>
-                                      </p:to>
-                                    </p:set>
-                                    <p:anim calcmode="lin" valueType="num">
-                                      <p:cBhvr additive="base">
-                                        <p:cTn id="17" dur="500" fill="hold"/>
-                                        <p:tgtEl>
-                                          <p:spTgt spid="3">
-                                            <p:txEl>
-                                              <p:pRg st="3" end="3"/>
-                                            </p:txEl>
-                                          </p:spTgt>
-                                        </p:tgtEl>
-                                        <p:attrNameLst>
-                                          <p:attrName>ppt_x</p:attrName>
-                                        </p:attrNameLst>
-                                      </p:cBhvr>
-                                      <p:tavLst>
-                                        <p:tav tm="0">
-                                          <p:val>
-                                            <p:strVal val="#ppt_x"/>
-                                          </p:val>
-                                        </p:tav>
-                                        <p:tav tm="100000">
-                                          <p:val>
-                                            <p:strVal val="#ppt_x"/>
-                                          </p:val>
-                                        </p:tav>
-                                      </p:tavLst>
-                                    </p:anim>
-                                    <p:anim calcmode="lin" valueType="num">
-                                      <p:cBhvr additive="base">
-                                        <p:cTn id="18" dur="500" fill="hold"/>
-                                        <p:tgtEl>
-                                          <p:spTgt spid="3">
-                                            <p:txEl>
-                                              <p:pRg st="3" end="3"/>
-                                            </p:txEl>
-                                          </p:spTgt>
-                                        </p:tgtEl>
-                                        <p:attrNameLst>
-                                          <p:attrName>ppt_y</p:attrName>
-                                        </p:attrNameLst>
-                                      </p:cBhvr>
-                                      <p:tavLst>
-                                        <p:tav tm="0">
-                                          <p:val>
-                                            <p:strVal val="1+#ppt_h/2"/>
-                                          </p:val>
-                                        </p:tav>
-                                        <p:tav tm="100000">
-                                          <p:val>
-                                            <p:strVal val="#ppt_y"/>
-                                          </p:val>
-                                        </p:tav>
-                                      </p:tavLst>
-                                    </p:anim>
-                                  </p:childTnLst>
-                                </p:cTn>
-                              </p:par>
-                            </p:childTnLst>
-                          </p:cTn>
-                        </p:par>
-                      </p:childTnLst>
-                    </p:cTn>
-                  </p:par>
-                </p:childTnLst>
-              </p:cTn>
-              <p:prevCondLst>
-                <p:cond evt="onPrev" delay="0">
-                  <p:tgtEl>
-                    <p:sldTgt/>
-                  </p:tgtEl>
-                </p:cond>
-              </p:prevCondLst>
-              <p:nextCondLst>
-                <p:cond evt="onNext" delay="0">
-                  <p:tgtEl>
-                    <p:sldTgt/>
-                  </p:tgtEl>
-                </p:cond>
-              </p:nextCondLst>
-            </p:seq>
-          </p:childTnLst>
-        </p:cTn>
-      </p:par>
-    </p:tnLst>
-  </p:timing>
-</p:sld>
-</file>
-
-<file path=ppt/slides/slide12.xml><?xml version="1.0" encoding="utf-8"?>
-<p:sld xmlns:a="http://schemas.openxmlformats.org/drawingml/2006/main" xmlns:r="http://schemas.openxmlformats.org/officeDocument/2006/relationships" xmlns:p="http://schemas.openxmlformats.org/presentationml/2006/main">
-  <p:cSld>
-    <p:spTree>
-      <p:nvGrpSpPr>
-        <p:cNvPr id="1" name=""/>
-        <p:cNvGrpSpPr/>
-        <p:nvPr/>
-      </p:nvGrpSpPr>
-      <p:grpSpPr>
-        <a:xfrm>
-          <a:off x="0" y="0"/>
-          <a:ext cx="0" cy="0"/>
-          <a:chOff x="0" y="0"/>
-          <a:chExt cx="0" cy="0"/>
-        </a:xfrm>
-      </p:grpSpPr>
-      <p:sp>
-        <p:nvSpPr>
-          <p:cNvPr id="2" name="Title 1">
-            <a:extLst>
-              <a:ext uri="{FF2B5EF4-FFF2-40B4-BE49-F238E27FC236}">
-                <a16:creationId xmlns:a16="http://schemas.microsoft.com/office/drawing/2014/main" id="{BF1C1427-7F9A-423C-B18A-044F79B2834E}"/>
-              </a:ext>
-            </a:extLst>
-          </p:cNvPr>
-          <p:cNvSpPr>
-            <a:spLocks noGrp="1"/>
-          </p:cNvSpPr>
-          <p:nvPr>
-            <p:ph type="title"/>
-          </p:nvPr>
-        </p:nvSpPr>
-        <p:spPr/>
-        <p:txBody>
-          <a:bodyPr>
-            <a:normAutofit/>
-          </a:bodyPr>
-          <a:lstStyle/>
-          <a:p>
-            <a:r>
-              <a:rPr lang="fa-IR" dirty="0"/>
-              <a:t>ریموت</a:t>
-            </a:r>
-          </a:p>
-        </p:txBody>
-      </p:sp>
-      <p:sp>
-        <p:nvSpPr>
-          <p:cNvPr id="3" name="Content Placeholder 2">
-            <a:extLst>
-              <a:ext uri="{FF2B5EF4-FFF2-40B4-BE49-F238E27FC236}">
-                <a16:creationId xmlns:a16="http://schemas.microsoft.com/office/drawing/2014/main" id="{3BB0E2A9-28DC-430D-A183-22754EEB6FEF}"/>
-              </a:ext>
-            </a:extLst>
-          </p:cNvPr>
-          <p:cNvSpPr>
-            <a:spLocks noGrp="1"/>
-          </p:cNvSpPr>
-          <p:nvPr>
-            <p:ph idx="1"/>
-          </p:nvPr>
-        </p:nvSpPr>
-        <p:spPr>
-          <a:xfrm>
-            <a:off x="913795" y="1023999"/>
-            <a:ext cx="10353762" cy="5911062"/>
-          </a:xfrm>
-        </p:spPr>
-        <p:txBody>
-          <a:bodyPr>
-            <a:normAutofit/>
-          </a:bodyPr>
-          <a:lstStyle/>
-          <a:p>
-            <a:r>
-              <a:rPr lang="fa-IR" sz="2000" b="1" dirty="0">
-                <a:effectLst/>
-                <a:latin typeface="Times New Roman" panose="02020603050405020304" pitchFamily="18" charset="0"/>
-                <a:cs typeface="B Lotus" panose="00000400000000000000" pitchFamily="2" charset="-78"/>
-              </a:rPr>
-              <a:t>ریموت چیست؟</a:t>
-            </a:r>
-          </a:p>
-          <a:p>
-            <a:pPr lvl="1"/>
-            <a:r>
-              <a:rPr lang="fa-IR" sz="1700" dirty="0">
-                <a:effectLst/>
-                <a:latin typeface="Times New Roman" panose="02020603050405020304" pitchFamily="18" charset="0"/>
-                <a:cs typeface="B Lotus" panose="00000400000000000000" pitchFamily="2" charset="-78"/>
-              </a:rPr>
-              <a:t>مشاهده </a:t>
-            </a:r>
-            <a:r>
-              <a:rPr lang="fa-IR" sz="1700" dirty="0" err="1">
-                <a:effectLst/>
-                <a:latin typeface="Times New Roman" panose="02020603050405020304" pitchFamily="18" charset="0"/>
-                <a:cs typeface="B Lotus" panose="00000400000000000000" pitchFamily="2" charset="-78"/>
-              </a:rPr>
-              <a:t>ریموت‌ها</a:t>
-            </a:r>
-            <a:r>
-              <a:rPr lang="fa-IR" sz="1700" dirty="0">
-                <a:effectLst/>
-                <a:latin typeface="Times New Roman" panose="02020603050405020304" pitchFamily="18" charset="0"/>
-                <a:cs typeface="B Lotus" panose="00000400000000000000" pitchFamily="2" charset="-78"/>
-              </a:rPr>
-              <a:t>:</a:t>
-            </a:r>
-          </a:p>
-          <a:p>
-            <a:pPr marL="810000" lvl="2" indent="0">
-              <a:buNone/>
-            </a:pPr>
-            <a:r>
-              <a:rPr lang="fa-IR" sz="1700" b="1" dirty="0">
-                <a:effectLst/>
-                <a:latin typeface="Times New Roman" panose="02020603050405020304" pitchFamily="18" charset="0"/>
-                <a:cs typeface="B Lotus" panose="00000400000000000000" pitchFamily="2" charset="-78"/>
-              </a:rPr>
-              <a:t> </a:t>
-            </a:r>
-            <a:r>
-              <a:rPr lang="fa-IR" sz="1700" dirty="0">
-                <a:effectLst/>
-                <a:latin typeface="Times New Roman" panose="02020603050405020304" pitchFamily="18" charset="0"/>
-                <a:cs typeface="B Lotus" panose="00000400000000000000" pitchFamily="2" charset="-78"/>
-              </a:rPr>
-              <a:t>مشاهده </a:t>
-            </a:r>
-            <a:r>
-              <a:rPr lang="fa-IR" sz="1700" dirty="0" err="1">
-                <a:effectLst/>
-                <a:latin typeface="Times New Roman" panose="02020603050405020304" pitchFamily="18" charset="0"/>
-                <a:cs typeface="B Lotus" panose="00000400000000000000" pitchFamily="2" charset="-78"/>
-              </a:rPr>
-              <a:t>ریموت‌ها</a:t>
-            </a:r>
-            <a:r>
-              <a:rPr lang="fa-IR" sz="1700" dirty="0">
-                <a:effectLst/>
-                <a:latin typeface="Times New Roman" panose="02020603050405020304" pitchFamily="18" charset="0"/>
-                <a:cs typeface="B Lotus" panose="00000400000000000000" pitchFamily="2" charset="-78"/>
-              </a:rPr>
-              <a:t> به سادگی با دستور </a:t>
-            </a:r>
-            <a:r>
-              <a:rPr lang="en-US" sz="1700" dirty="0">
-                <a:solidFill>
-                  <a:srgbClr val="92D050"/>
-                </a:solidFill>
-                <a:effectLst/>
-                <a:latin typeface="Consolas" panose="020B0609020204030204" pitchFamily="49" charset="0"/>
-                <a:cs typeface="B Lotus" panose="00000400000000000000" pitchFamily="2" charset="-78"/>
-              </a:rPr>
-              <a:t>git remote</a:t>
-            </a:r>
-            <a:r>
-              <a:rPr lang="fa-IR" sz="1700" dirty="0">
-                <a:effectLst/>
-                <a:latin typeface="Times New Roman" panose="02020603050405020304" pitchFamily="18" charset="0"/>
-                <a:cs typeface="B Lotus" panose="00000400000000000000" pitchFamily="2" charset="-78"/>
-              </a:rPr>
-              <a:t> امکان پذیر است.</a:t>
-            </a:r>
-          </a:p>
-          <a:p>
-            <a:pPr lvl="1"/>
-            <a:r>
-              <a:rPr lang="fa-IR" sz="1700" dirty="0">
-                <a:effectLst/>
-                <a:latin typeface="Times New Roman" panose="02020603050405020304" pitchFamily="18" charset="0"/>
-                <a:cs typeface="B Lotus" panose="00000400000000000000" pitchFamily="2" charset="-78"/>
-              </a:rPr>
-              <a:t>اضافه کردن مخازن ریموت:</a:t>
-            </a:r>
-          </a:p>
-          <a:p>
-            <a:pPr marL="756000" lvl="2" indent="0">
-              <a:buNone/>
-            </a:pPr>
-            <a:r>
-              <a:rPr lang="fa-IR" sz="1700" dirty="0">
-                <a:effectLst/>
-                <a:latin typeface="Times New Roman" panose="02020603050405020304" pitchFamily="18" charset="0"/>
-                <a:cs typeface="B Lotus" panose="00000400000000000000" pitchFamily="2" charset="-78"/>
-              </a:rPr>
-              <a:t> </a:t>
-            </a:r>
-            <a:r>
-              <a:rPr lang="fa-IR" sz="1700" dirty="0" err="1">
-                <a:effectLst/>
-                <a:latin typeface="Times New Roman" panose="02020603050405020304" pitchFamily="18" charset="0"/>
-                <a:cs typeface="B Lotus" panose="00000400000000000000" pitchFamily="2" charset="-78"/>
-              </a:rPr>
-              <a:t>مخازنی</a:t>
-            </a:r>
-            <a:r>
-              <a:rPr lang="fa-IR" sz="1700" dirty="0">
-                <a:effectLst/>
-                <a:latin typeface="Times New Roman" panose="02020603050405020304" pitchFamily="18" charset="0"/>
-                <a:cs typeface="B Lotus" panose="00000400000000000000" pitchFamily="2" charset="-78"/>
-              </a:rPr>
-              <a:t> که به وسیله دستور </a:t>
-            </a:r>
-            <a:r>
-              <a:rPr lang="en-US" sz="1700" dirty="0">
-                <a:solidFill>
-                  <a:srgbClr val="92D050"/>
-                </a:solidFill>
-                <a:effectLst/>
-                <a:latin typeface="Consolas" panose="020B0609020204030204" pitchFamily="49" charset="0"/>
-                <a:cs typeface="B Lotus" panose="00000400000000000000" pitchFamily="2" charset="-78"/>
-              </a:rPr>
-              <a:t>git clone</a:t>
-            </a:r>
-            <a:r>
-              <a:rPr lang="fa-IR" sz="1700" dirty="0">
-                <a:solidFill>
-                  <a:srgbClr val="92D050"/>
-                </a:solidFill>
-                <a:effectLst/>
-                <a:latin typeface="Consolas" panose="020B0609020204030204" pitchFamily="49" charset="0"/>
-                <a:cs typeface="B Lotus" panose="00000400000000000000" pitchFamily="2" charset="-78"/>
-              </a:rPr>
-              <a:t> </a:t>
-            </a:r>
-            <a:r>
-              <a:rPr lang="fa-IR" sz="1700" dirty="0">
-                <a:effectLst/>
-                <a:latin typeface="Times New Roman" panose="02020603050405020304" pitchFamily="18" charset="0"/>
-                <a:cs typeface="B Lotus" panose="00000400000000000000" pitchFamily="2" charset="-78"/>
-              </a:rPr>
-              <a:t>بر روی کامپیوتر خود کپی کردید همواره یک ریموت( </a:t>
-            </a:r>
-            <a:r>
-              <a:rPr lang="fa-IR" sz="1700" dirty="0" err="1">
-                <a:effectLst/>
-                <a:latin typeface="Times New Roman" panose="02020603050405020304" pitchFamily="18" charset="0"/>
-                <a:cs typeface="B Lotus" panose="00000400000000000000" pitchFamily="2" charset="-78"/>
-              </a:rPr>
-              <a:t>ریموتی</a:t>
-            </a:r>
-            <a:r>
-              <a:rPr lang="fa-IR" sz="1700" dirty="0">
-                <a:effectLst/>
-                <a:latin typeface="Times New Roman" panose="02020603050405020304" pitchFamily="18" charset="0"/>
-                <a:cs typeface="B Lotus" panose="00000400000000000000" pitchFamily="2" charset="-78"/>
-              </a:rPr>
-              <a:t> که کلون از آن صورت گرفته ) دارند اما برای اضافه کردن ریموت جدید به یک مخزن محلی </a:t>
-            </a:r>
-            <a:r>
-              <a:rPr lang="fa-IR" sz="1700" dirty="0" err="1">
-                <a:effectLst/>
-                <a:latin typeface="Times New Roman" panose="02020603050405020304" pitchFamily="18" charset="0"/>
-                <a:cs typeface="B Lotus" panose="00000400000000000000" pitchFamily="2" charset="-78"/>
-              </a:rPr>
-              <a:t>می‌توانید</a:t>
-            </a:r>
-            <a:r>
-              <a:rPr lang="fa-IR" sz="1700" dirty="0">
-                <a:effectLst/>
-                <a:latin typeface="Times New Roman" panose="02020603050405020304" pitchFamily="18" charset="0"/>
-                <a:cs typeface="B Lotus" panose="00000400000000000000" pitchFamily="2" charset="-78"/>
-              </a:rPr>
-              <a:t> از دستور </a:t>
-            </a:r>
-            <a:r>
-              <a:rPr lang="en-US" sz="1700" dirty="0">
-                <a:solidFill>
-                  <a:srgbClr val="92D050"/>
-                </a:solidFill>
-                <a:effectLst/>
-                <a:latin typeface="Consolas" panose="020B0609020204030204" pitchFamily="49" charset="0"/>
-                <a:cs typeface="B Lotus" panose="00000400000000000000" pitchFamily="2" charset="-78"/>
-              </a:rPr>
-              <a:t>git remote add &lt;</a:t>
-            </a:r>
-            <a:r>
-              <a:rPr lang="en-US" sz="1700" dirty="0" err="1">
-                <a:solidFill>
-                  <a:srgbClr val="92D050"/>
-                </a:solidFill>
-                <a:effectLst/>
-                <a:latin typeface="Consolas" panose="020B0609020204030204" pitchFamily="49" charset="0"/>
-                <a:cs typeface="B Lotus" panose="00000400000000000000" pitchFamily="2" charset="-78"/>
-              </a:rPr>
-              <a:t>shortname</a:t>
-            </a:r>
-            <a:r>
-              <a:rPr lang="en-US" sz="1700" dirty="0">
-                <a:solidFill>
-                  <a:srgbClr val="92D050"/>
-                </a:solidFill>
-                <a:effectLst/>
-                <a:latin typeface="Consolas" panose="020B0609020204030204" pitchFamily="49" charset="0"/>
-                <a:cs typeface="B Lotus" panose="00000400000000000000" pitchFamily="2" charset="-78"/>
-              </a:rPr>
-              <a:t>&gt; &lt;</a:t>
-            </a:r>
-            <a:r>
-              <a:rPr lang="en-US" sz="1700" dirty="0" err="1">
-                <a:solidFill>
-                  <a:srgbClr val="92D050"/>
-                </a:solidFill>
-                <a:effectLst/>
-                <a:latin typeface="Consolas" panose="020B0609020204030204" pitchFamily="49" charset="0"/>
-                <a:cs typeface="B Lotus" panose="00000400000000000000" pitchFamily="2" charset="-78"/>
-              </a:rPr>
-              <a:t>url</a:t>
-            </a:r>
-            <a:r>
-              <a:rPr lang="en-US" sz="1700" dirty="0">
-                <a:solidFill>
-                  <a:srgbClr val="92D050"/>
-                </a:solidFill>
-                <a:effectLst/>
-                <a:latin typeface="Consolas" panose="020B0609020204030204" pitchFamily="49" charset="0"/>
-                <a:cs typeface="B Lotus" panose="00000400000000000000" pitchFamily="2" charset="-78"/>
-              </a:rPr>
-              <a:t>&gt;</a:t>
-            </a:r>
-            <a:r>
-              <a:rPr lang="fa-IR" sz="1700" dirty="0">
-                <a:solidFill>
-                  <a:srgbClr val="92D050"/>
-                </a:solidFill>
-                <a:effectLst/>
-                <a:latin typeface="Consolas" panose="020B0609020204030204" pitchFamily="49" charset="0"/>
-                <a:cs typeface="B Lotus" panose="00000400000000000000" pitchFamily="2" charset="-78"/>
-              </a:rPr>
-              <a:t> </a:t>
-            </a:r>
-            <a:r>
-              <a:rPr lang="fa-IR" sz="1700" dirty="0">
-                <a:effectLst/>
-                <a:latin typeface="Times New Roman" panose="02020603050405020304" pitchFamily="18" charset="0"/>
-                <a:cs typeface="B Lotus" panose="00000400000000000000" pitchFamily="2" charset="-78"/>
-              </a:rPr>
-              <a:t>استفاده کنید که یک ریموت با آدرس نوشته شده و نام دلخواه به مخزن شما اضافه </a:t>
-            </a:r>
-            <a:r>
-              <a:rPr lang="fa-IR" sz="1700" dirty="0" err="1">
-                <a:effectLst/>
-                <a:latin typeface="Times New Roman" panose="02020603050405020304" pitchFamily="18" charset="0"/>
-                <a:cs typeface="B Lotus" panose="00000400000000000000" pitchFamily="2" charset="-78"/>
-              </a:rPr>
-              <a:t>می‌کند</a:t>
-            </a:r>
-            <a:r>
-              <a:rPr lang="fa-IR" sz="1700" dirty="0">
-                <a:effectLst/>
-                <a:latin typeface="Times New Roman" panose="02020603050405020304" pitchFamily="18" charset="0"/>
-                <a:cs typeface="B Lotus" panose="00000400000000000000" pitchFamily="2" charset="-78"/>
-              </a:rPr>
-              <a:t>.</a:t>
-            </a:r>
-          </a:p>
-          <a:p>
-            <a:pPr lvl="1"/>
-            <a:r>
-              <a:rPr lang="fa-IR" sz="1700" dirty="0" err="1">
-                <a:effectLst/>
-                <a:latin typeface="Times New Roman" panose="02020603050405020304" pitchFamily="18" charset="0"/>
-                <a:cs typeface="B Lotus" panose="00000400000000000000" pitchFamily="2" charset="-78"/>
-              </a:rPr>
-              <a:t>فچ</a:t>
-            </a:r>
-            <a:r>
-              <a:rPr lang="fa-IR" sz="1700" dirty="0">
-                <a:effectLst/>
-                <a:latin typeface="Times New Roman" panose="02020603050405020304" pitchFamily="18" charset="0"/>
-                <a:cs typeface="B Lotus" panose="00000400000000000000" pitchFamily="2" charset="-78"/>
-              </a:rPr>
-              <a:t> و پول کردن از </a:t>
-            </a:r>
-            <a:r>
-              <a:rPr lang="fa-IR" sz="1700" dirty="0" err="1">
-                <a:effectLst/>
-                <a:latin typeface="Times New Roman" panose="02020603050405020304" pitchFamily="18" charset="0"/>
-                <a:cs typeface="B Lotus" panose="00000400000000000000" pitchFamily="2" charset="-78"/>
-              </a:rPr>
-              <a:t>ریموت‌ها</a:t>
-            </a:r>
-            <a:r>
-              <a:rPr lang="fa-IR" sz="1700" dirty="0">
-                <a:effectLst/>
-                <a:latin typeface="Times New Roman" panose="02020603050405020304" pitchFamily="18" charset="0"/>
-                <a:cs typeface="B Lotus" panose="00000400000000000000" pitchFamily="2" charset="-78"/>
-              </a:rPr>
-              <a:t>:</a:t>
-            </a:r>
-          </a:p>
-          <a:p>
-            <a:pPr marL="810000" lvl="2" indent="0">
-              <a:buNone/>
-            </a:pPr>
-            <a:r>
-              <a:rPr lang="fa-IR" sz="1700" dirty="0">
-                <a:effectLst/>
-                <a:latin typeface="Times New Roman" panose="02020603050405020304" pitchFamily="18" charset="0"/>
-                <a:cs typeface="B Lotus" panose="00000400000000000000" pitchFamily="2" charset="-78"/>
-              </a:rPr>
-              <a:t>دستور </a:t>
-            </a:r>
-            <a:r>
-              <a:rPr lang="en-US" sz="1700" dirty="0">
-                <a:solidFill>
-                  <a:srgbClr val="92D050"/>
-                </a:solidFill>
-                <a:effectLst/>
-                <a:latin typeface="Consolas" panose="020B0609020204030204" pitchFamily="49" charset="0"/>
-                <a:cs typeface="B Lotus" panose="00000400000000000000" pitchFamily="2" charset="-78"/>
-              </a:rPr>
-              <a:t>git fetch &lt;remote&gt;</a:t>
-            </a:r>
-            <a:r>
-              <a:rPr lang="fa-IR" sz="1700" dirty="0">
-                <a:effectLst/>
-                <a:latin typeface="Times New Roman" panose="02020603050405020304" pitchFamily="18" charset="0"/>
-                <a:cs typeface="B Lotus" panose="00000400000000000000" pitchFamily="2" charset="-78"/>
-              </a:rPr>
-              <a:t> تمام اطلاعات ریموت که روی سیستم محلی شما وجود ندارند را به سیستم محلی شما کپی </a:t>
-            </a:r>
-            <a:r>
-              <a:rPr lang="fa-IR" sz="1700" dirty="0" err="1">
-                <a:effectLst/>
-                <a:latin typeface="Times New Roman" panose="02020603050405020304" pitchFamily="18" charset="0"/>
-                <a:cs typeface="B Lotus" panose="00000400000000000000" pitchFamily="2" charset="-78"/>
-              </a:rPr>
-              <a:t>می‌کند</a:t>
-            </a:r>
-            <a:r>
-              <a:rPr lang="fa-IR" sz="1700" dirty="0">
-                <a:effectLst/>
-                <a:latin typeface="Times New Roman" panose="02020603050405020304" pitchFamily="18" charset="0"/>
-                <a:cs typeface="B Lotus" panose="00000400000000000000" pitchFamily="2" charset="-78"/>
-              </a:rPr>
-              <a:t>، اما دستور </a:t>
-            </a:r>
-            <a:r>
-              <a:rPr lang="en-US" sz="1700" dirty="0">
-                <a:solidFill>
-                  <a:srgbClr val="92D050"/>
-                </a:solidFill>
-                <a:effectLst/>
-                <a:latin typeface="Consolas" panose="020B0609020204030204" pitchFamily="49" charset="0"/>
-                <a:cs typeface="B Lotus" panose="00000400000000000000" pitchFamily="2" charset="-78"/>
-              </a:rPr>
-              <a:t>git pull &lt;remote&gt;</a:t>
-            </a:r>
-            <a:r>
-              <a:rPr lang="fa-IR" sz="1700" dirty="0">
-                <a:solidFill>
-                  <a:srgbClr val="92D050"/>
-                </a:solidFill>
-                <a:effectLst/>
-                <a:latin typeface="Consolas" panose="020B0609020204030204" pitchFamily="49" charset="0"/>
-                <a:cs typeface="B Lotus" panose="00000400000000000000" pitchFamily="2" charset="-78"/>
-              </a:rPr>
-              <a:t> </a:t>
-            </a:r>
-            <a:r>
-              <a:rPr lang="fa-IR" sz="1700" dirty="0">
-                <a:effectLst/>
-                <a:latin typeface="Times New Roman" panose="02020603050405020304" pitchFamily="18" charset="0"/>
-                <a:cs typeface="B Lotus" panose="00000400000000000000" pitchFamily="2" charset="-78"/>
-              </a:rPr>
-              <a:t>علاوه بر کپی کردن اطلاعات از سرور این اطلاعات را با اطلاعات محلی شما نیز ادغام </a:t>
-            </a:r>
-            <a:r>
-              <a:rPr lang="fa-IR" sz="1700" dirty="0" err="1">
-                <a:effectLst/>
-                <a:latin typeface="Times New Roman" panose="02020603050405020304" pitchFamily="18" charset="0"/>
-                <a:cs typeface="B Lotus" panose="00000400000000000000" pitchFamily="2" charset="-78"/>
-              </a:rPr>
-              <a:t>می‌کند</a:t>
-            </a:r>
-            <a:r>
-              <a:rPr lang="fa-IR" sz="1700" dirty="0">
-                <a:effectLst/>
-                <a:latin typeface="Times New Roman" panose="02020603050405020304" pitchFamily="18" charset="0"/>
-                <a:cs typeface="B Lotus" panose="00000400000000000000" pitchFamily="2" charset="-78"/>
-              </a:rPr>
-              <a:t>.</a:t>
-            </a:r>
-          </a:p>
-          <a:p>
-            <a:pPr lvl="1"/>
-            <a:r>
-              <a:rPr lang="fa-IR" sz="1700" dirty="0">
-                <a:effectLst/>
-                <a:latin typeface="Times New Roman" panose="02020603050405020304" pitchFamily="18" charset="0"/>
-                <a:cs typeface="B Lotus" panose="00000400000000000000" pitchFamily="2" charset="-78"/>
-              </a:rPr>
-              <a:t>پوش کردن به ریموت:</a:t>
-            </a:r>
-          </a:p>
-          <a:p>
-            <a:pPr marL="756000" lvl="2" indent="0">
-              <a:buNone/>
-            </a:pPr>
-            <a:r>
-              <a:rPr lang="fa-IR" sz="1700" dirty="0">
-                <a:effectLst/>
-                <a:latin typeface="Times New Roman" panose="02020603050405020304" pitchFamily="18" charset="0"/>
-                <a:cs typeface="B Lotus" panose="00000400000000000000" pitchFamily="2" charset="-78"/>
-              </a:rPr>
-              <a:t> در </a:t>
-            </a:r>
-            <a:r>
-              <a:rPr lang="fa-IR" sz="1700" dirty="0" err="1">
-                <a:effectLst/>
-                <a:latin typeface="Times New Roman" panose="02020603050405020304" pitchFamily="18" charset="0"/>
-                <a:cs typeface="B Lotus" panose="00000400000000000000" pitchFamily="2" charset="-78"/>
-              </a:rPr>
-              <a:t>مرحله‌ای</a:t>
-            </a:r>
-            <a:r>
-              <a:rPr lang="fa-IR" sz="1700" dirty="0">
-                <a:effectLst/>
-                <a:latin typeface="Times New Roman" panose="02020603050405020304" pitchFamily="18" charset="0"/>
-                <a:cs typeface="B Lotus" panose="00000400000000000000" pitchFamily="2" charset="-78"/>
-              </a:rPr>
-              <a:t> شما نیاز دارید که تغییرات اعمال شده روی نسخه محلی( </a:t>
-            </a:r>
-            <a:r>
-              <a:rPr lang="fa-IR" sz="1700" dirty="0" err="1">
-                <a:effectLst/>
-                <a:latin typeface="Times New Roman" panose="02020603050405020304" pitchFamily="18" charset="0"/>
-                <a:cs typeface="B Lotus" panose="00000400000000000000" pitchFamily="2" charset="-78"/>
-              </a:rPr>
-              <a:t>کامیت‌ها</a:t>
-            </a:r>
-            <a:r>
-              <a:rPr lang="fa-IR" sz="1700" dirty="0">
-                <a:effectLst/>
-                <a:latin typeface="Times New Roman" panose="02020603050405020304" pitchFamily="18" charset="0"/>
-                <a:cs typeface="B Lotus" panose="00000400000000000000" pitchFamily="2" charset="-78"/>
-              </a:rPr>
-              <a:t> ) را به ریموت خود ارسال کنید، این کار با دستور</a:t>
-            </a:r>
-            <a:br>
-              <a:rPr lang="fa-IR" sz="1700" dirty="0">
-                <a:effectLst/>
-                <a:latin typeface="Times New Roman" panose="02020603050405020304" pitchFamily="18" charset="0"/>
-                <a:cs typeface="B Lotus" panose="00000400000000000000" pitchFamily="2" charset="-78"/>
-              </a:rPr>
-            </a:br>
-            <a:r>
-              <a:rPr lang="fa-IR" sz="1700" dirty="0">
-                <a:solidFill>
-                  <a:srgbClr val="92D050"/>
-                </a:solidFill>
-                <a:effectLst/>
-                <a:latin typeface="Consolas" panose="020B0609020204030204" pitchFamily="49" charset="0"/>
-                <a:cs typeface="B Lotus" panose="00000400000000000000" pitchFamily="2" charset="-78"/>
-              </a:rPr>
-              <a:t>  </a:t>
-            </a:r>
-            <a:r>
-              <a:rPr lang="en-US" sz="1700" dirty="0">
-                <a:solidFill>
-                  <a:srgbClr val="92D050"/>
-                </a:solidFill>
-                <a:effectLst/>
-                <a:latin typeface="Consolas" panose="020B0609020204030204" pitchFamily="49" charset="0"/>
-                <a:cs typeface="B Lotus" panose="00000400000000000000" pitchFamily="2" charset="-78"/>
-              </a:rPr>
-              <a:t>git push &lt;remote&gt; &lt;branch&gt;</a:t>
-            </a:r>
-            <a:r>
-              <a:rPr lang="fa-IR" sz="1700" dirty="0">
-                <a:effectLst/>
-                <a:latin typeface="Times New Roman" panose="02020603050405020304" pitchFamily="18" charset="0"/>
-                <a:cs typeface="B Lotus" panose="00000400000000000000" pitchFamily="2" charset="-78"/>
-              </a:rPr>
-              <a:t> صورت </a:t>
-            </a:r>
-            <a:r>
-              <a:rPr lang="fa-IR" sz="1700" dirty="0" err="1">
-                <a:effectLst/>
-                <a:latin typeface="Times New Roman" panose="02020603050405020304" pitchFamily="18" charset="0"/>
-                <a:cs typeface="B Lotus" panose="00000400000000000000" pitchFamily="2" charset="-78"/>
-              </a:rPr>
-              <a:t>می‌گیرد</a:t>
-            </a:r>
-            <a:r>
-              <a:rPr lang="fa-IR" sz="1700" dirty="0">
-                <a:effectLst/>
-                <a:latin typeface="Times New Roman" panose="02020603050405020304" pitchFamily="18" charset="0"/>
-                <a:cs typeface="B Lotus" panose="00000400000000000000" pitchFamily="2" charset="-78"/>
-              </a:rPr>
-              <a:t> که در آینده به موضوع </a:t>
-            </a:r>
-            <a:r>
-              <a:rPr lang="fa-IR" sz="1700" dirty="0" err="1">
-                <a:effectLst/>
-                <a:latin typeface="Times New Roman" panose="02020603050405020304" pitchFamily="18" charset="0"/>
-                <a:cs typeface="B Lotus" panose="00000400000000000000" pitchFamily="2" charset="-78"/>
-              </a:rPr>
-              <a:t>برنچ</a:t>
-            </a:r>
-            <a:r>
-              <a:rPr lang="fa-IR" sz="1700" dirty="0">
-                <a:effectLst/>
-                <a:latin typeface="Times New Roman" panose="02020603050405020304" pitchFamily="18" charset="0"/>
-                <a:cs typeface="B Lotus" panose="00000400000000000000" pitchFamily="2" charset="-78"/>
-              </a:rPr>
-              <a:t> خواهیم پرداخت.</a:t>
-            </a:r>
-          </a:p>
-          <a:p>
-            <a:pPr lvl="1"/>
-            <a:r>
-              <a:rPr lang="fa-IR" sz="1700" dirty="0">
-                <a:effectLst/>
-                <a:latin typeface="Times New Roman" panose="02020603050405020304" pitchFamily="18" charset="0"/>
-                <a:cs typeface="B Lotus" panose="00000400000000000000" pitchFamily="2" charset="-78"/>
-              </a:rPr>
-              <a:t>تغییر نام و حذف ریموت:</a:t>
-            </a:r>
-          </a:p>
-          <a:p>
-            <a:pPr marL="756000" lvl="2" indent="0">
-              <a:buNone/>
-            </a:pPr>
-            <a:r>
-              <a:rPr lang="fa-IR" sz="1700" dirty="0">
-                <a:effectLst/>
-                <a:latin typeface="Times New Roman" panose="02020603050405020304" pitchFamily="18" charset="0"/>
-                <a:cs typeface="B Lotus" panose="00000400000000000000" pitchFamily="2" charset="-78"/>
-              </a:rPr>
-              <a:t> با دستور </a:t>
-            </a:r>
-            <a:r>
-              <a:rPr lang="fr-FR" sz="1700" dirty="0">
-                <a:solidFill>
-                  <a:srgbClr val="92D050"/>
-                </a:solidFill>
-                <a:effectLst/>
-                <a:latin typeface="Consolas" panose="020B0609020204030204" pitchFamily="49" charset="0"/>
-                <a:cs typeface="B Lotus" panose="00000400000000000000" pitchFamily="2" charset="-78"/>
-              </a:rPr>
-              <a:t>git </a:t>
-            </a:r>
-            <a:r>
-              <a:rPr lang="fr-FR" sz="1700" dirty="0" err="1">
-                <a:solidFill>
-                  <a:srgbClr val="92D050"/>
-                </a:solidFill>
-                <a:effectLst/>
-                <a:latin typeface="Consolas" panose="020B0609020204030204" pitchFamily="49" charset="0"/>
-                <a:cs typeface="B Lotus" panose="00000400000000000000" pitchFamily="2" charset="-78"/>
-              </a:rPr>
-              <a:t>remote</a:t>
-            </a:r>
-            <a:r>
-              <a:rPr lang="fr-FR" sz="1700" dirty="0">
-                <a:solidFill>
-                  <a:srgbClr val="92D050"/>
-                </a:solidFill>
-                <a:effectLst/>
-                <a:latin typeface="Consolas" panose="020B0609020204030204" pitchFamily="49" charset="0"/>
-                <a:cs typeface="B Lotus" panose="00000400000000000000" pitchFamily="2" charset="-78"/>
-              </a:rPr>
-              <a:t> </a:t>
-            </a:r>
-            <a:r>
-              <a:rPr lang="fr-FR" sz="1700" dirty="0" err="1">
-                <a:solidFill>
-                  <a:srgbClr val="92D050"/>
-                </a:solidFill>
-                <a:effectLst/>
-                <a:latin typeface="Consolas" panose="020B0609020204030204" pitchFamily="49" charset="0"/>
-                <a:cs typeface="B Lotus" panose="00000400000000000000" pitchFamily="2" charset="-78"/>
-              </a:rPr>
-              <a:t>rename</a:t>
-            </a:r>
-            <a:r>
-              <a:rPr lang="fr-FR" sz="1700" dirty="0">
-                <a:solidFill>
-                  <a:srgbClr val="92D050"/>
-                </a:solidFill>
-                <a:effectLst/>
-                <a:latin typeface="Consolas" panose="020B0609020204030204" pitchFamily="49" charset="0"/>
-                <a:cs typeface="B Lotus" panose="00000400000000000000" pitchFamily="2" charset="-78"/>
-              </a:rPr>
-              <a:t> </a:t>
-            </a:r>
-            <a:r>
-              <a:rPr lang="en-US" sz="1700" dirty="0">
-                <a:solidFill>
-                  <a:srgbClr val="92D050"/>
-                </a:solidFill>
-                <a:effectLst/>
-                <a:latin typeface="Consolas" panose="020B0609020204030204" pitchFamily="49" charset="0"/>
-                <a:cs typeface="B Lotus" panose="00000400000000000000" pitchFamily="2" charset="-78"/>
-              </a:rPr>
-              <a:t>&lt;old name&gt; &lt;new name&gt;</a:t>
-            </a:r>
-            <a:r>
-              <a:rPr lang="fa-IR" sz="1700" dirty="0">
-                <a:solidFill>
-                  <a:srgbClr val="92D050"/>
-                </a:solidFill>
-                <a:effectLst/>
-                <a:latin typeface="Consolas" panose="020B0609020204030204" pitchFamily="49" charset="0"/>
-                <a:cs typeface="B Lotus" panose="00000400000000000000" pitchFamily="2" charset="-78"/>
-              </a:rPr>
-              <a:t> </a:t>
-            </a:r>
-            <a:r>
-              <a:rPr lang="fa-IR" sz="1700" dirty="0">
-                <a:effectLst/>
-                <a:latin typeface="Times New Roman" panose="02020603050405020304" pitchFamily="18" charset="0"/>
-                <a:cs typeface="B Lotus" panose="00000400000000000000" pitchFamily="2" charset="-78"/>
-              </a:rPr>
-              <a:t>به سادگی </a:t>
-            </a:r>
-            <a:r>
-              <a:rPr lang="fa-IR" sz="1700" dirty="0" err="1">
-                <a:effectLst/>
-                <a:latin typeface="Times New Roman" panose="02020603050405020304" pitchFamily="18" charset="0"/>
-                <a:cs typeface="B Lotus" panose="00000400000000000000" pitchFamily="2" charset="-78"/>
-              </a:rPr>
-              <a:t>می‌توانید</a:t>
-            </a:r>
-            <a:r>
-              <a:rPr lang="fa-IR" sz="1700" dirty="0">
-                <a:effectLst/>
-                <a:latin typeface="Times New Roman" panose="02020603050405020304" pitchFamily="18" charset="0"/>
-                <a:cs typeface="B Lotus" panose="00000400000000000000" pitchFamily="2" charset="-78"/>
-              </a:rPr>
-              <a:t> نام ریموت را تغییر بدهید و با دستور</a:t>
-            </a:r>
-            <a:br>
-              <a:rPr lang="fa-IR" sz="1700" dirty="0">
-                <a:effectLst/>
-                <a:latin typeface="Times New Roman" panose="02020603050405020304" pitchFamily="18" charset="0"/>
-                <a:cs typeface="B Lotus" panose="00000400000000000000" pitchFamily="2" charset="-78"/>
-              </a:rPr>
-            </a:br>
-            <a:r>
-              <a:rPr lang="fa-IR" sz="1700" dirty="0">
-                <a:effectLst/>
-                <a:latin typeface="Times New Roman" panose="02020603050405020304" pitchFamily="18" charset="0"/>
-                <a:cs typeface="B Lotus" panose="00000400000000000000" pitchFamily="2" charset="-78"/>
-              </a:rPr>
-              <a:t> </a:t>
-            </a:r>
-            <a:r>
-              <a:rPr lang="en-US" sz="1700" dirty="0">
-                <a:solidFill>
-                  <a:srgbClr val="92D050"/>
-                </a:solidFill>
-                <a:effectLst/>
-                <a:latin typeface="Consolas" panose="020B0609020204030204" pitchFamily="49" charset="0"/>
-                <a:cs typeface="B Lotus" panose="00000400000000000000" pitchFamily="2" charset="-78"/>
-              </a:rPr>
-              <a:t>git remote remove &lt;name&gt;</a:t>
-            </a:r>
-            <a:r>
-              <a:rPr lang="fa-IR" sz="1700" dirty="0">
-                <a:solidFill>
-                  <a:srgbClr val="92D050"/>
-                </a:solidFill>
-                <a:effectLst/>
-                <a:latin typeface="Consolas" panose="020B0609020204030204" pitchFamily="49" charset="0"/>
-                <a:cs typeface="B Lotus" panose="00000400000000000000" pitchFamily="2" charset="-78"/>
-              </a:rPr>
-              <a:t> </a:t>
-            </a:r>
-            <a:r>
-              <a:rPr lang="fa-IR" sz="1700" dirty="0" err="1">
-                <a:effectLst/>
-                <a:latin typeface="Times New Roman" panose="02020603050405020304" pitchFamily="18" charset="0"/>
-                <a:cs typeface="B Lotus" panose="00000400000000000000" pitchFamily="2" charset="-78"/>
-              </a:rPr>
-              <a:t>می‌توانید</a:t>
-            </a:r>
-            <a:r>
-              <a:rPr lang="fa-IR" sz="1700" dirty="0">
-                <a:effectLst/>
-                <a:latin typeface="Times New Roman" panose="02020603050405020304" pitchFamily="18" charset="0"/>
-                <a:cs typeface="B Lotus" panose="00000400000000000000" pitchFamily="2" charset="-78"/>
-              </a:rPr>
-              <a:t> ریموت و تمام </a:t>
-            </a:r>
-            <a:r>
-              <a:rPr lang="fa-IR" sz="1700" dirty="0" err="1">
-                <a:effectLst/>
-                <a:latin typeface="Times New Roman" panose="02020603050405020304" pitchFamily="18" charset="0"/>
-                <a:cs typeface="B Lotus" panose="00000400000000000000" pitchFamily="2" charset="-78"/>
-              </a:rPr>
-              <a:t>برنچ‌های</a:t>
-            </a:r>
-            <a:r>
-              <a:rPr lang="fa-IR" sz="1700" dirty="0">
-                <a:effectLst/>
-                <a:latin typeface="Times New Roman" panose="02020603050405020304" pitchFamily="18" charset="0"/>
-                <a:cs typeface="B Lotus" panose="00000400000000000000" pitchFamily="2" charset="-78"/>
-              </a:rPr>
-              <a:t> پیگیر و </a:t>
-            </a:r>
-            <a:r>
-              <a:rPr lang="fa-IR" sz="1700" dirty="0" err="1">
-                <a:effectLst/>
-                <a:latin typeface="Times New Roman" panose="02020603050405020304" pitchFamily="18" charset="0"/>
-                <a:cs typeface="B Lotus" panose="00000400000000000000" pitchFamily="2" charset="-78"/>
-              </a:rPr>
-              <a:t>پیکربندی‌های</a:t>
-            </a:r>
-            <a:r>
-              <a:rPr lang="fa-IR" sz="1700" dirty="0">
-                <a:effectLst/>
-                <a:latin typeface="Times New Roman" panose="02020603050405020304" pitchFamily="18" charset="0"/>
-                <a:cs typeface="B Lotus" panose="00000400000000000000" pitchFamily="2" charset="-78"/>
-              </a:rPr>
-              <a:t> مربوط به ریموت را پاک کنید.</a:t>
-            </a:r>
-          </a:p>
-        </p:txBody>
-      </p:sp>
-      <p:sp>
-        <p:nvSpPr>
-          <p:cNvPr id="4" name="Slide Number Placeholder 3">
-            <a:extLst>
-              <a:ext uri="{FF2B5EF4-FFF2-40B4-BE49-F238E27FC236}">
-                <a16:creationId xmlns:a16="http://schemas.microsoft.com/office/drawing/2014/main" id="{7DA29031-9E93-44A1-A5B4-BB313C958CB4}"/>
-              </a:ext>
-            </a:extLst>
-          </p:cNvPr>
-          <p:cNvSpPr>
-            <a:spLocks noGrp="1"/>
-          </p:cNvSpPr>
-          <p:nvPr>
-            <p:ph type="sldNum" sz="quarter" idx="12"/>
-          </p:nvPr>
-        </p:nvSpPr>
-        <p:spPr/>
-        <p:txBody>
-          <a:bodyPr/>
-          <a:lstStyle/>
-          <a:p>
-            <a:fld id="{3A98EE3D-8CD1-4C3F-BD1C-C98C9596463C}" type="slidenum">
-              <a:rPr lang="en-US" smtClean="0"/>
-              <a:t>12</a:t>
-            </a:fld>
-            <a:endParaRPr lang="en-US" dirty="0"/>
-          </a:p>
-        </p:txBody>
-      </p:sp>
-    </p:spTree>
-    <p:extLst>
-      <p:ext uri="{BB962C8B-B14F-4D97-AF65-F5344CB8AC3E}">
-        <p14:creationId xmlns:p14="http://schemas.microsoft.com/office/powerpoint/2010/main" val="1261359138"/>
-      </p:ext>
-    </p:extLst>
-  </p:cSld>
-  <p:clrMapOvr>
-    <a:masterClrMapping/>
-  </p:clrMapOvr>
   <p:timing>
     <p:tnLst>
       <p:par>
@@ -13775,27 +12136,2090 @@
                       </p:childTnLst>
                     </p:cTn>
                   </p:par>
+                </p:childTnLst>
+              </p:cTn>
+              <p:prevCondLst>
+                <p:cond evt="onPrev" delay="0">
+                  <p:tgtEl>
+                    <p:sldTgt/>
+                  </p:tgtEl>
+                </p:cond>
+              </p:prevCondLst>
+              <p:nextCondLst>
+                <p:cond evt="onNext" delay="0">
+                  <p:tgtEl>
+                    <p:sldTgt/>
+                  </p:tgtEl>
+                </p:cond>
+              </p:nextCondLst>
+            </p:seq>
+          </p:childTnLst>
+        </p:cTn>
+      </p:par>
+    </p:tnLst>
+  </p:timing>
+</p:sld>
+</file>
+
+<file path=ppt/slides/slide11.xml><?xml version="1.0" encoding="utf-8"?>
+<p:sld xmlns:a="http://schemas.openxmlformats.org/drawingml/2006/main" xmlns:r="http://schemas.openxmlformats.org/officeDocument/2006/relationships" xmlns:p="http://schemas.openxmlformats.org/presentationml/2006/main">
+  <p:cSld>
+    <p:spTree>
+      <p:nvGrpSpPr>
+        <p:cNvPr id="1" name=""/>
+        <p:cNvGrpSpPr/>
+        <p:nvPr/>
+      </p:nvGrpSpPr>
+      <p:grpSpPr>
+        <a:xfrm>
+          <a:off x="0" y="0"/>
+          <a:ext cx="0" cy="0"/>
+          <a:chOff x="0" y="0"/>
+          <a:chExt cx="0" cy="0"/>
+        </a:xfrm>
+      </p:grpSpPr>
+      <p:sp>
+        <p:nvSpPr>
+          <p:cNvPr id="2" name="Title 1">
+            <a:extLst>
+              <a:ext uri="{FF2B5EF4-FFF2-40B4-BE49-F238E27FC236}">
+                <a16:creationId xmlns:a16="http://schemas.microsoft.com/office/drawing/2014/main" id="{8414E162-7901-4913-91CB-F4396B0648DE}"/>
+              </a:ext>
+            </a:extLst>
+          </p:cNvPr>
+          <p:cNvSpPr>
+            <a:spLocks noGrp="1"/>
+          </p:cNvSpPr>
+          <p:nvPr>
+            <p:ph type="title"/>
+          </p:nvPr>
+        </p:nvSpPr>
+        <p:spPr/>
+        <p:txBody>
+          <a:bodyPr/>
+          <a:lstStyle/>
+          <a:p>
+            <a:r>
+              <a:rPr lang="en-US" dirty="0" err="1"/>
+              <a:t>gitignore</a:t>
+            </a:r>
+            <a:endParaRPr lang="fa-IR" dirty="0"/>
+          </a:p>
+        </p:txBody>
+      </p:sp>
+      <p:sp>
+        <p:nvSpPr>
+          <p:cNvPr id="3" name="Content Placeholder 2">
+            <a:extLst>
+              <a:ext uri="{FF2B5EF4-FFF2-40B4-BE49-F238E27FC236}">
+                <a16:creationId xmlns:a16="http://schemas.microsoft.com/office/drawing/2014/main" id="{A1856185-B4C6-4858-BC4B-05134C909C2C}"/>
+              </a:ext>
+            </a:extLst>
+          </p:cNvPr>
+          <p:cNvSpPr>
+            <a:spLocks noGrp="1"/>
+          </p:cNvSpPr>
+          <p:nvPr>
+            <p:ph idx="1"/>
+          </p:nvPr>
+        </p:nvSpPr>
+        <p:spPr>
+          <a:xfrm>
+            <a:off x="919119" y="1571626"/>
+            <a:ext cx="10353762" cy="3714749"/>
+          </a:xfrm>
+        </p:spPr>
+        <p:txBody>
+          <a:bodyPr anchor="ctr">
+            <a:normAutofit lnSpcReduction="10000"/>
+          </a:bodyPr>
+          <a:lstStyle/>
+          <a:p>
+            <a:r>
+              <a:rPr lang="fa-IR" sz="2400" b="1" dirty="0">
+                <a:effectLst/>
+                <a:latin typeface="Times New Roman" panose="02020603050405020304" pitchFamily="18" charset="0"/>
+                <a:cs typeface="B Lotus" panose="00000400000000000000" pitchFamily="2" charset="-78"/>
+              </a:rPr>
+              <a:t>آیا همه </a:t>
+            </a:r>
+            <a:r>
+              <a:rPr lang="fa-IR" sz="2400" b="1" dirty="0" err="1">
+                <a:effectLst/>
+                <a:latin typeface="Times New Roman" panose="02020603050405020304" pitchFamily="18" charset="0"/>
+                <a:cs typeface="B Lotus" panose="00000400000000000000" pitchFamily="2" charset="-78"/>
+              </a:rPr>
+              <a:t>داده‌ها</a:t>
+            </a:r>
+            <a:r>
+              <a:rPr lang="fa-IR" sz="2400" b="1" dirty="0">
+                <a:effectLst/>
+                <a:latin typeface="Times New Roman" panose="02020603050405020304" pitchFamily="18" charset="0"/>
+                <a:cs typeface="B Lotus" panose="00000400000000000000" pitchFamily="2" charset="-78"/>
+              </a:rPr>
+              <a:t> باید در مخزن ذخیره شوند؟</a:t>
+            </a:r>
+          </a:p>
+          <a:p>
+            <a:pPr marL="450000" lvl="1" indent="0">
+              <a:buNone/>
+            </a:pPr>
+            <a:r>
+              <a:rPr lang="fa-IR" sz="2400" dirty="0" err="1">
+                <a:effectLst/>
+                <a:latin typeface="Times New Roman" panose="02020603050405020304" pitchFamily="18" charset="0"/>
+                <a:cs typeface="B Lotus" panose="00000400000000000000" pitchFamily="2" charset="-78"/>
+              </a:rPr>
+              <a:t>گیت</a:t>
+            </a:r>
+            <a:r>
+              <a:rPr lang="fa-IR" sz="2400" dirty="0">
+                <a:effectLst/>
+                <a:latin typeface="Times New Roman" panose="02020603050405020304" pitchFamily="18" charset="0"/>
+                <a:cs typeface="B Lotus" panose="00000400000000000000" pitchFamily="2" charset="-78"/>
+              </a:rPr>
+              <a:t> امکانی برای نادیده گرفتن برخی </a:t>
+            </a:r>
+            <a:r>
+              <a:rPr lang="fa-IR" sz="2400" dirty="0" err="1">
+                <a:effectLst/>
+                <a:latin typeface="Times New Roman" panose="02020603050405020304" pitchFamily="18" charset="0"/>
+                <a:cs typeface="B Lotus" panose="00000400000000000000" pitchFamily="2" charset="-78"/>
+              </a:rPr>
+              <a:t>داده‌ها</a:t>
+            </a:r>
+            <a:r>
+              <a:rPr lang="fa-IR" sz="2400" dirty="0">
+                <a:effectLst/>
+                <a:latin typeface="Times New Roman" panose="02020603050405020304" pitchFamily="18" charset="0"/>
+                <a:cs typeface="B Lotus" panose="00000400000000000000" pitchFamily="2" charset="-78"/>
+              </a:rPr>
+              <a:t> فراهم کرده است تا کاربر قادر باشد برخی </a:t>
+            </a:r>
+            <a:r>
+              <a:rPr lang="fa-IR" sz="2400" dirty="0" err="1">
+                <a:effectLst/>
+                <a:latin typeface="Times New Roman" panose="02020603050405020304" pitchFamily="18" charset="0"/>
+                <a:cs typeface="B Lotus" panose="00000400000000000000" pitchFamily="2" charset="-78"/>
+              </a:rPr>
+              <a:t>فایل‌ها</a:t>
+            </a:r>
+            <a:r>
+              <a:rPr lang="fa-IR" sz="2400" dirty="0">
+                <a:effectLst/>
+                <a:latin typeface="Times New Roman" panose="02020603050405020304" pitchFamily="18" charset="0"/>
+                <a:cs typeface="B Lotus" panose="00000400000000000000" pitchFamily="2" charset="-78"/>
+              </a:rPr>
+              <a:t> را از دید </a:t>
+            </a:r>
+            <a:r>
+              <a:rPr lang="fa-IR" sz="2400" dirty="0" err="1">
+                <a:effectLst/>
+                <a:latin typeface="Times New Roman" panose="02020603050405020304" pitchFamily="18" charset="0"/>
+                <a:cs typeface="B Lotus" panose="00000400000000000000" pitchFamily="2" charset="-78"/>
+              </a:rPr>
+              <a:t>گیت</a:t>
+            </a:r>
+            <a:r>
+              <a:rPr lang="fa-IR" sz="2400" dirty="0">
+                <a:effectLst/>
+                <a:latin typeface="Times New Roman" panose="02020603050405020304" pitchFamily="18" charset="0"/>
+                <a:cs typeface="B Lotus" panose="00000400000000000000" pitchFamily="2" charset="-78"/>
+              </a:rPr>
+              <a:t> مخفی کند.</a:t>
+            </a:r>
+          </a:p>
+          <a:p>
+            <a:pPr marL="450000" lvl="1" indent="0">
+              <a:buNone/>
+            </a:pPr>
+            <a:r>
+              <a:rPr lang="fa-IR" sz="2400" dirty="0">
+                <a:effectLst/>
+                <a:latin typeface="Times New Roman" panose="02020603050405020304" pitchFamily="18" charset="0"/>
+                <a:cs typeface="B Lotus" panose="00000400000000000000" pitchFamily="2" charset="-78"/>
+              </a:rPr>
+              <a:t>برای انجام این کار کافی است که در مسیری که </a:t>
+            </a:r>
+            <a:r>
+              <a:rPr lang="fa-IR" sz="2400" dirty="0" err="1">
+                <a:effectLst/>
+                <a:latin typeface="Times New Roman" panose="02020603050405020304" pitchFamily="18" charset="0"/>
+                <a:cs typeface="B Lotus" panose="00000400000000000000" pitchFamily="2" charset="-78"/>
+              </a:rPr>
+              <a:t>می‌خواهید</a:t>
+            </a:r>
+            <a:r>
+              <a:rPr lang="fa-IR" sz="2400" dirty="0">
+                <a:effectLst/>
+                <a:latin typeface="Times New Roman" panose="02020603050405020304" pitchFamily="18" charset="0"/>
+                <a:cs typeface="B Lotus" panose="00000400000000000000" pitchFamily="2" charset="-78"/>
+              </a:rPr>
+              <a:t> از در آن اطلاعات را از دید </a:t>
+            </a:r>
+            <a:r>
+              <a:rPr lang="fa-IR" sz="2400" dirty="0" err="1">
+                <a:effectLst/>
+                <a:latin typeface="Times New Roman" panose="02020603050405020304" pitchFamily="18" charset="0"/>
+                <a:cs typeface="B Lotus" panose="00000400000000000000" pitchFamily="2" charset="-78"/>
+              </a:rPr>
+              <a:t>گیت</a:t>
+            </a:r>
+            <a:r>
+              <a:rPr lang="fa-IR" sz="2400" dirty="0">
+                <a:effectLst/>
+                <a:latin typeface="Times New Roman" panose="02020603050405020304" pitchFamily="18" charset="0"/>
+                <a:cs typeface="B Lotus" panose="00000400000000000000" pitchFamily="2" charset="-78"/>
+              </a:rPr>
+              <a:t> مخفی کنید یک فایل با پسوند </a:t>
+            </a:r>
+            <a:r>
+              <a:rPr lang="en-US" sz="2400" dirty="0">
+                <a:effectLst/>
+                <a:latin typeface="Times New Roman" panose="02020603050405020304" pitchFamily="18" charset="0"/>
+                <a:cs typeface="B Lotus" panose="00000400000000000000" pitchFamily="2" charset="-78"/>
+              </a:rPr>
+              <a:t>.</a:t>
+            </a:r>
+            <a:r>
+              <a:rPr lang="en-US" sz="2400" dirty="0" err="1">
+                <a:effectLst/>
+                <a:latin typeface="Times New Roman" panose="02020603050405020304" pitchFamily="18" charset="0"/>
+                <a:cs typeface="B Lotus" panose="00000400000000000000" pitchFamily="2" charset="-78"/>
+              </a:rPr>
+              <a:t>gitignore</a:t>
+            </a:r>
+            <a:r>
+              <a:rPr lang="fa-IR" sz="2400" dirty="0">
+                <a:effectLst/>
+                <a:latin typeface="Times New Roman" panose="02020603050405020304" pitchFamily="18" charset="0"/>
+                <a:cs typeface="B Lotus" panose="00000400000000000000" pitchFamily="2" charset="-78"/>
+              </a:rPr>
+              <a:t> ایجاد کنید و نام فایل( ها ) یا مسیر منتهی به آن( ها ) را در این فایل متنی بنویسید. در صورتی که فایل( های ) مورد نظر در </a:t>
+            </a:r>
+            <a:r>
+              <a:rPr lang="fa-IR" sz="2400" dirty="0" err="1">
+                <a:effectLst/>
+                <a:latin typeface="Times New Roman" panose="02020603050405020304" pitchFamily="18" charset="0"/>
+                <a:cs typeface="B Lotus" panose="00000400000000000000" pitchFamily="2" charset="-78"/>
+              </a:rPr>
+              <a:t>گیت</a:t>
+            </a:r>
+            <a:r>
+              <a:rPr lang="fa-IR" sz="2400" dirty="0">
+                <a:effectLst/>
+                <a:latin typeface="Times New Roman" panose="02020603050405020304" pitchFamily="18" charset="0"/>
+                <a:cs typeface="B Lotus" panose="00000400000000000000" pitchFamily="2" charset="-78"/>
+              </a:rPr>
+              <a:t> ذخیره نشده باشند از این پس نیز توسط </a:t>
+            </a:r>
+            <a:r>
+              <a:rPr lang="fa-IR" sz="2400" dirty="0" err="1">
+                <a:effectLst/>
+                <a:latin typeface="Times New Roman" panose="02020603050405020304" pitchFamily="18" charset="0"/>
+                <a:cs typeface="B Lotus" panose="00000400000000000000" pitchFamily="2" charset="-78"/>
+              </a:rPr>
+              <a:t>گیت</a:t>
+            </a:r>
+            <a:r>
+              <a:rPr lang="fa-IR" sz="2400" dirty="0">
+                <a:effectLst/>
+                <a:latin typeface="Times New Roman" panose="02020603050405020304" pitchFamily="18" charset="0"/>
+                <a:cs typeface="B Lotus" panose="00000400000000000000" pitchFamily="2" charset="-78"/>
+              </a:rPr>
+              <a:t> دنبال </a:t>
+            </a:r>
+            <a:r>
+              <a:rPr lang="fa-IR" sz="2400" dirty="0" err="1">
+                <a:effectLst/>
+                <a:latin typeface="Times New Roman" panose="02020603050405020304" pitchFamily="18" charset="0"/>
+                <a:cs typeface="B Lotus" panose="00000400000000000000" pitchFamily="2" charset="-78"/>
+              </a:rPr>
+              <a:t>نمی‌شوند</a:t>
+            </a:r>
+            <a:r>
+              <a:rPr lang="fa-IR" sz="2400" dirty="0">
+                <a:effectLst/>
+                <a:latin typeface="Times New Roman" panose="02020603050405020304" pitchFamily="18" charset="0"/>
+                <a:cs typeface="B Lotus" panose="00000400000000000000" pitchFamily="2" charset="-78"/>
+              </a:rPr>
+              <a:t>.</a:t>
+            </a:r>
+          </a:p>
+          <a:p>
+            <a:pPr marL="450000" lvl="1" indent="0">
+              <a:buNone/>
+            </a:pPr>
+            <a:r>
+              <a:rPr lang="fa-IR" sz="2400" dirty="0">
+                <a:effectLst/>
+                <a:latin typeface="Times New Roman" panose="02020603050405020304" pitchFamily="18" charset="0"/>
+                <a:cs typeface="B Lotus" panose="00000400000000000000" pitchFamily="2" charset="-78"/>
+              </a:rPr>
+              <a:t>البته در سطح </a:t>
+            </a:r>
+            <a:r>
+              <a:rPr lang="fa-IR" sz="2400" dirty="0" err="1">
+                <a:effectLst/>
+                <a:latin typeface="Times New Roman" panose="02020603050405020304" pitchFamily="18" charset="0"/>
+                <a:cs typeface="B Lotus" panose="00000400000000000000" pitchFamily="2" charset="-78"/>
+              </a:rPr>
+              <a:t>وب</a:t>
+            </a:r>
+            <a:r>
+              <a:rPr lang="fa-IR" sz="2400" dirty="0">
+                <a:effectLst/>
+                <a:latin typeface="Times New Roman" panose="02020603050405020304" pitchFamily="18" charset="0"/>
+                <a:cs typeface="B Lotus" panose="00000400000000000000" pitchFamily="2" charset="-78"/>
+              </a:rPr>
+              <a:t> ابزارهایی برای ایجاد فایل </a:t>
+            </a:r>
+            <a:r>
+              <a:rPr lang="en-US" sz="2400" dirty="0">
+                <a:effectLst/>
+                <a:latin typeface="Times New Roman" panose="02020603050405020304" pitchFamily="18" charset="0"/>
+                <a:cs typeface="B Lotus" panose="00000400000000000000" pitchFamily="2" charset="-78"/>
+              </a:rPr>
+              <a:t>.</a:t>
+            </a:r>
+            <a:r>
+              <a:rPr lang="en-US" sz="2400" dirty="0" err="1">
+                <a:effectLst/>
+                <a:latin typeface="Times New Roman" panose="02020603050405020304" pitchFamily="18" charset="0"/>
+                <a:cs typeface="B Lotus" panose="00000400000000000000" pitchFamily="2" charset="-78"/>
+              </a:rPr>
+              <a:t>gitignore</a:t>
+            </a:r>
+            <a:r>
+              <a:rPr lang="fa-IR" sz="2400" dirty="0">
+                <a:effectLst/>
+                <a:latin typeface="Times New Roman" panose="02020603050405020304" pitchFamily="18" charset="0"/>
+                <a:cs typeface="B Lotus" panose="00000400000000000000" pitchFamily="2" charset="-78"/>
+              </a:rPr>
+              <a:t> با توجه به </a:t>
+            </a:r>
+            <a:r>
+              <a:rPr lang="fa-IR" sz="2400" dirty="0" err="1">
+                <a:effectLst/>
+                <a:latin typeface="Times New Roman" panose="02020603050405020304" pitchFamily="18" charset="0"/>
+                <a:cs typeface="B Lotus" panose="00000400000000000000" pitchFamily="2" charset="-78"/>
+              </a:rPr>
+              <a:t>تکنولوژی‌هایی</a:t>
+            </a:r>
+            <a:r>
+              <a:rPr lang="fa-IR" sz="2400" dirty="0">
+                <a:effectLst/>
+                <a:latin typeface="Times New Roman" panose="02020603050405020304" pitchFamily="18" charset="0"/>
+                <a:cs typeface="B Lotus" panose="00000400000000000000" pitchFamily="2" charset="-78"/>
+              </a:rPr>
+              <a:t> که در پروژه خود استفاده </a:t>
+            </a:r>
+            <a:r>
+              <a:rPr lang="fa-IR" sz="2400" dirty="0" err="1">
+                <a:effectLst/>
+                <a:latin typeface="Times New Roman" panose="02020603050405020304" pitchFamily="18" charset="0"/>
+                <a:cs typeface="B Lotus" panose="00000400000000000000" pitchFamily="2" charset="-78"/>
+              </a:rPr>
+              <a:t>کرده‌اید</a:t>
+            </a:r>
+            <a:r>
+              <a:rPr lang="fa-IR" sz="2400" dirty="0">
+                <a:effectLst/>
+                <a:latin typeface="Times New Roman" panose="02020603050405020304" pitchFamily="18" charset="0"/>
+                <a:cs typeface="B Lotus" panose="00000400000000000000" pitchFamily="2" charset="-78"/>
+              </a:rPr>
+              <a:t> وجود دارد( مثلا </a:t>
+            </a:r>
+            <a:r>
+              <a:rPr lang="en-US" sz="2400" dirty="0">
+                <a:solidFill>
+                  <a:schemeClr val="tx1"/>
+                </a:solidFill>
+                <a:effectLst/>
+                <a:latin typeface="Times New Roman" panose="02020603050405020304" pitchFamily="18" charset="0"/>
+                <a:cs typeface="B Lotus" panose="00000400000000000000" pitchFamily="2" charset="-78"/>
+                <a:hlinkClick r:id="rId2">
+                  <a:extLst>
+                    <a:ext uri="{A12FA001-AC4F-418D-AE19-62706E023703}">
+                      <ahyp:hlinkClr xmlns:ahyp="http://schemas.microsoft.com/office/drawing/2018/hyperlinkcolor" val="tx"/>
+                    </a:ext>
+                  </a:extLst>
+                </a:hlinkClick>
+              </a:rPr>
+              <a:t>https://www.toptal.com/developers/gitignore</a:t>
+            </a:r>
+            <a:r>
+              <a:rPr lang="fa-IR" sz="2400" dirty="0">
+                <a:solidFill>
+                  <a:schemeClr val="tx1"/>
+                </a:solidFill>
+                <a:effectLst/>
+                <a:latin typeface="Times New Roman" panose="02020603050405020304" pitchFamily="18" charset="0"/>
+                <a:cs typeface="B Lotus" panose="00000400000000000000" pitchFamily="2" charset="-78"/>
+              </a:rPr>
+              <a:t> </a:t>
+            </a:r>
+            <a:r>
+              <a:rPr lang="fa-IR" sz="2400" dirty="0">
+                <a:effectLst/>
+                <a:latin typeface="Times New Roman" panose="02020603050405020304" pitchFamily="18" charset="0"/>
+                <a:cs typeface="B Lotus" panose="00000400000000000000" pitchFamily="2" charset="-78"/>
+              </a:rPr>
+              <a:t>).</a:t>
+            </a:r>
+          </a:p>
+        </p:txBody>
+      </p:sp>
+      <p:sp>
+        <p:nvSpPr>
+          <p:cNvPr id="4" name="Slide Number Placeholder 3">
+            <a:extLst>
+              <a:ext uri="{FF2B5EF4-FFF2-40B4-BE49-F238E27FC236}">
+                <a16:creationId xmlns:a16="http://schemas.microsoft.com/office/drawing/2014/main" id="{6AA0F52E-D73D-48DC-B6BC-0570A45BB9E5}"/>
+              </a:ext>
+            </a:extLst>
+          </p:cNvPr>
+          <p:cNvSpPr>
+            <a:spLocks noGrp="1"/>
+          </p:cNvSpPr>
+          <p:nvPr>
+            <p:ph type="sldNum" sz="quarter" idx="12"/>
+          </p:nvPr>
+        </p:nvSpPr>
+        <p:spPr/>
+        <p:txBody>
+          <a:bodyPr/>
+          <a:lstStyle/>
+          <a:p>
+            <a:fld id="{3A98EE3D-8CD1-4C3F-BD1C-C98C9596463C}" type="slidenum">
+              <a:rPr lang="en-US" smtClean="0"/>
+              <a:t>11</a:t>
+            </a:fld>
+            <a:endParaRPr lang="en-US" dirty="0"/>
+          </a:p>
+        </p:txBody>
+      </p:sp>
+    </p:spTree>
+    <p:extLst>
+      <p:ext uri="{BB962C8B-B14F-4D97-AF65-F5344CB8AC3E}">
+        <p14:creationId xmlns:p14="http://schemas.microsoft.com/office/powerpoint/2010/main" val="490033831"/>
+      </p:ext>
+    </p:extLst>
+  </p:cSld>
+  <p:clrMapOvr>
+    <a:masterClrMapping/>
+  </p:clrMapOvr>
+  <p:timing>
+    <p:tnLst>
+      <p:par>
+        <p:cTn id="1" dur="indefinite" restart="never" nodeType="tmRoot">
+          <p:childTnLst>
+            <p:seq concurrent="1" nextAc="seek">
+              <p:cTn id="2" dur="indefinite" nodeType="mainSeq">
+                <p:childTnLst>
                   <p:par>
-                    <p:cTn id="27" fill="hold">
+                    <p:cTn id="3" fill="hold">
                       <p:stCondLst>
                         <p:cond delay="indefinite"/>
                       </p:stCondLst>
                       <p:childTnLst>
                         <p:par>
-                          <p:cTn id="28" fill="hold">
+                          <p:cTn id="4" fill="hold">
                             <p:stCondLst>
                               <p:cond delay="0"/>
                             </p:stCondLst>
                             <p:childTnLst>
                               <p:par>
-                                <p:cTn id="29" presetID="2" presetClass="entr" presetSubtype="4" fill="hold" nodeType="clickEffect">
+                                <p:cTn id="5" presetID="2" presetClass="entr" presetSubtype="4" fill="hold" nodeType="clickEffect">
                                   <p:stCondLst>
                                     <p:cond delay="0"/>
                                   </p:stCondLst>
                                   <p:childTnLst>
                                     <p:set>
                                       <p:cBhvr>
-                                        <p:cTn id="30" dur="1" fill="hold">
+                                        <p:cTn id="6" dur="1" fill="hold">
+                                          <p:stCondLst>
+                                            <p:cond delay="0"/>
+                                          </p:stCondLst>
+                                        </p:cTn>
+                                        <p:tgtEl>
+                                          <p:spTgt spid="3">
+                                            <p:txEl>
+                                              <p:pRg st="1" end="1"/>
+                                            </p:txEl>
+                                          </p:spTgt>
+                                        </p:tgtEl>
+                                        <p:attrNameLst>
+                                          <p:attrName>style.visibility</p:attrName>
+                                        </p:attrNameLst>
+                                      </p:cBhvr>
+                                      <p:to>
+                                        <p:strVal val="visible"/>
+                                      </p:to>
+                                    </p:set>
+                                    <p:anim calcmode="lin" valueType="num">
+                                      <p:cBhvr additive="base">
+                                        <p:cTn id="7" dur="500" fill="hold"/>
+                                        <p:tgtEl>
+                                          <p:spTgt spid="3">
+                                            <p:txEl>
+                                              <p:pRg st="1" end="1"/>
+                                            </p:txEl>
+                                          </p:spTgt>
+                                        </p:tgtEl>
+                                        <p:attrNameLst>
+                                          <p:attrName>ppt_x</p:attrName>
+                                        </p:attrNameLst>
+                                      </p:cBhvr>
+                                      <p:tavLst>
+                                        <p:tav tm="0">
+                                          <p:val>
+                                            <p:strVal val="#ppt_x"/>
+                                          </p:val>
+                                        </p:tav>
+                                        <p:tav tm="100000">
+                                          <p:val>
+                                            <p:strVal val="#ppt_x"/>
+                                          </p:val>
+                                        </p:tav>
+                                      </p:tavLst>
+                                    </p:anim>
+                                    <p:anim calcmode="lin" valueType="num">
+                                      <p:cBhvr additive="base">
+                                        <p:cTn id="8" dur="500" fill="hold"/>
+                                        <p:tgtEl>
+                                          <p:spTgt spid="3">
+                                            <p:txEl>
+                                              <p:pRg st="1" end="1"/>
+                                            </p:txEl>
+                                          </p:spTgt>
+                                        </p:tgtEl>
+                                        <p:attrNameLst>
+                                          <p:attrName>ppt_y</p:attrName>
+                                        </p:attrNameLst>
+                                      </p:cBhvr>
+                                      <p:tavLst>
+                                        <p:tav tm="0">
+                                          <p:val>
+                                            <p:strVal val="1+#ppt_h/2"/>
+                                          </p:val>
+                                        </p:tav>
+                                        <p:tav tm="100000">
+                                          <p:val>
+                                            <p:strVal val="#ppt_y"/>
+                                          </p:val>
+                                        </p:tav>
+                                      </p:tavLst>
+                                    </p:anim>
+                                  </p:childTnLst>
+                                </p:cTn>
+                              </p:par>
+                            </p:childTnLst>
+                          </p:cTn>
+                        </p:par>
+                        <p:par>
+                          <p:cTn id="9" fill="hold">
+                            <p:stCondLst>
+                              <p:cond delay="500"/>
+                            </p:stCondLst>
+                            <p:childTnLst>
+                              <p:par>
+                                <p:cTn id="10" presetID="2" presetClass="entr" presetSubtype="4" fill="hold" nodeType="afterEffect">
+                                  <p:stCondLst>
+                                    <p:cond delay="0"/>
+                                  </p:stCondLst>
+                                  <p:childTnLst>
+                                    <p:set>
+                                      <p:cBhvr>
+                                        <p:cTn id="11" dur="1" fill="hold">
+                                          <p:stCondLst>
+                                            <p:cond delay="0"/>
+                                          </p:stCondLst>
+                                        </p:cTn>
+                                        <p:tgtEl>
+                                          <p:spTgt spid="3">
+                                            <p:txEl>
+                                              <p:pRg st="2" end="2"/>
+                                            </p:txEl>
+                                          </p:spTgt>
+                                        </p:tgtEl>
+                                        <p:attrNameLst>
+                                          <p:attrName>style.visibility</p:attrName>
+                                        </p:attrNameLst>
+                                      </p:cBhvr>
+                                      <p:to>
+                                        <p:strVal val="visible"/>
+                                      </p:to>
+                                    </p:set>
+                                    <p:anim calcmode="lin" valueType="num">
+                                      <p:cBhvr additive="base">
+                                        <p:cTn id="12" dur="500" fill="hold"/>
+                                        <p:tgtEl>
+                                          <p:spTgt spid="3">
+                                            <p:txEl>
+                                              <p:pRg st="2" end="2"/>
+                                            </p:txEl>
+                                          </p:spTgt>
+                                        </p:tgtEl>
+                                        <p:attrNameLst>
+                                          <p:attrName>ppt_x</p:attrName>
+                                        </p:attrNameLst>
+                                      </p:cBhvr>
+                                      <p:tavLst>
+                                        <p:tav tm="0">
+                                          <p:val>
+                                            <p:strVal val="#ppt_x"/>
+                                          </p:val>
+                                        </p:tav>
+                                        <p:tav tm="100000">
+                                          <p:val>
+                                            <p:strVal val="#ppt_x"/>
+                                          </p:val>
+                                        </p:tav>
+                                      </p:tavLst>
+                                    </p:anim>
+                                    <p:anim calcmode="lin" valueType="num">
+                                      <p:cBhvr additive="base">
+                                        <p:cTn id="13" dur="500" fill="hold"/>
+                                        <p:tgtEl>
+                                          <p:spTgt spid="3">
+                                            <p:txEl>
+                                              <p:pRg st="2" end="2"/>
+                                            </p:txEl>
+                                          </p:spTgt>
+                                        </p:tgtEl>
+                                        <p:attrNameLst>
+                                          <p:attrName>ppt_y</p:attrName>
+                                        </p:attrNameLst>
+                                      </p:cBhvr>
+                                      <p:tavLst>
+                                        <p:tav tm="0">
+                                          <p:val>
+                                            <p:strVal val="1+#ppt_h/2"/>
+                                          </p:val>
+                                        </p:tav>
+                                        <p:tav tm="100000">
+                                          <p:val>
+                                            <p:strVal val="#ppt_y"/>
+                                          </p:val>
+                                        </p:tav>
+                                      </p:tavLst>
+                                    </p:anim>
+                                  </p:childTnLst>
+                                </p:cTn>
+                              </p:par>
+                            </p:childTnLst>
+                          </p:cTn>
+                        </p:par>
+                        <p:par>
+                          <p:cTn id="14" fill="hold">
+                            <p:stCondLst>
+                              <p:cond delay="1000"/>
+                            </p:stCondLst>
+                            <p:childTnLst>
+                              <p:par>
+                                <p:cTn id="15" presetID="2" presetClass="entr" presetSubtype="4" fill="hold" nodeType="afterEffect">
+                                  <p:stCondLst>
+                                    <p:cond delay="0"/>
+                                  </p:stCondLst>
+                                  <p:childTnLst>
+                                    <p:set>
+                                      <p:cBhvr>
+                                        <p:cTn id="16" dur="1" fill="hold">
+                                          <p:stCondLst>
+                                            <p:cond delay="0"/>
+                                          </p:stCondLst>
+                                        </p:cTn>
+                                        <p:tgtEl>
+                                          <p:spTgt spid="3">
+                                            <p:txEl>
+                                              <p:pRg st="3" end="3"/>
+                                            </p:txEl>
+                                          </p:spTgt>
+                                        </p:tgtEl>
+                                        <p:attrNameLst>
+                                          <p:attrName>style.visibility</p:attrName>
+                                        </p:attrNameLst>
+                                      </p:cBhvr>
+                                      <p:to>
+                                        <p:strVal val="visible"/>
+                                      </p:to>
+                                    </p:set>
+                                    <p:anim calcmode="lin" valueType="num">
+                                      <p:cBhvr additive="base">
+                                        <p:cTn id="17" dur="500" fill="hold"/>
+                                        <p:tgtEl>
+                                          <p:spTgt spid="3">
+                                            <p:txEl>
+                                              <p:pRg st="3" end="3"/>
+                                            </p:txEl>
+                                          </p:spTgt>
+                                        </p:tgtEl>
+                                        <p:attrNameLst>
+                                          <p:attrName>ppt_x</p:attrName>
+                                        </p:attrNameLst>
+                                      </p:cBhvr>
+                                      <p:tavLst>
+                                        <p:tav tm="0">
+                                          <p:val>
+                                            <p:strVal val="#ppt_x"/>
+                                          </p:val>
+                                        </p:tav>
+                                        <p:tav tm="100000">
+                                          <p:val>
+                                            <p:strVal val="#ppt_x"/>
+                                          </p:val>
+                                        </p:tav>
+                                      </p:tavLst>
+                                    </p:anim>
+                                    <p:anim calcmode="lin" valueType="num">
+                                      <p:cBhvr additive="base">
+                                        <p:cTn id="18" dur="500" fill="hold"/>
+                                        <p:tgtEl>
+                                          <p:spTgt spid="3">
+                                            <p:txEl>
+                                              <p:pRg st="3" end="3"/>
+                                            </p:txEl>
+                                          </p:spTgt>
+                                        </p:tgtEl>
+                                        <p:attrNameLst>
+                                          <p:attrName>ppt_y</p:attrName>
+                                        </p:attrNameLst>
+                                      </p:cBhvr>
+                                      <p:tavLst>
+                                        <p:tav tm="0">
+                                          <p:val>
+                                            <p:strVal val="1+#ppt_h/2"/>
+                                          </p:val>
+                                        </p:tav>
+                                        <p:tav tm="100000">
+                                          <p:val>
+                                            <p:strVal val="#ppt_y"/>
+                                          </p:val>
+                                        </p:tav>
+                                      </p:tavLst>
+                                    </p:anim>
+                                  </p:childTnLst>
+                                </p:cTn>
+                              </p:par>
+                            </p:childTnLst>
+                          </p:cTn>
+                        </p:par>
+                      </p:childTnLst>
+                    </p:cTn>
+                  </p:par>
+                </p:childTnLst>
+              </p:cTn>
+              <p:prevCondLst>
+                <p:cond evt="onPrev" delay="0">
+                  <p:tgtEl>
+                    <p:sldTgt/>
+                  </p:tgtEl>
+                </p:cond>
+              </p:prevCondLst>
+              <p:nextCondLst>
+                <p:cond evt="onNext" delay="0">
+                  <p:tgtEl>
+                    <p:sldTgt/>
+                  </p:tgtEl>
+                </p:cond>
+              </p:nextCondLst>
+            </p:seq>
+          </p:childTnLst>
+        </p:cTn>
+      </p:par>
+    </p:tnLst>
+  </p:timing>
+</p:sld>
+</file>
+
+<file path=ppt/slides/slide12.xml><?xml version="1.0" encoding="utf-8"?>
+<p:sld xmlns:a="http://schemas.openxmlformats.org/drawingml/2006/main" xmlns:r="http://schemas.openxmlformats.org/officeDocument/2006/relationships" xmlns:p="http://schemas.openxmlformats.org/presentationml/2006/main">
+  <p:cSld>
+    <p:spTree>
+      <p:nvGrpSpPr>
+        <p:cNvPr id="1" name=""/>
+        <p:cNvGrpSpPr/>
+        <p:nvPr/>
+      </p:nvGrpSpPr>
+      <p:grpSpPr>
+        <a:xfrm>
+          <a:off x="0" y="0"/>
+          <a:ext cx="0" cy="0"/>
+          <a:chOff x="0" y="0"/>
+          <a:chExt cx="0" cy="0"/>
+        </a:xfrm>
+      </p:grpSpPr>
+      <p:sp>
+        <p:nvSpPr>
+          <p:cNvPr id="2" name="Title 1">
+            <a:extLst>
+              <a:ext uri="{FF2B5EF4-FFF2-40B4-BE49-F238E27FC236}">
+                <a16:creationId xmlns:a16="http://schemas.microsoft.com/office/drawing/2014/main" id="{BF1C1427-7F9A-423C-B18A-044F79B2834E}"/>
+              </a:ext>
+            </a:extLst>
+          </p:cNvPr>
+          <p:cNvSpPr>
+            <a:spLocks noGrp="1"/>
+          </p:cNvSpPr>
+          <p:nvPr>
+            <p:ph type="title"/>
+          </p:nvPr>
+        </p:nvSpPr>
+        <p:spPr/>
+        <p:txBody>
+          <a:bodyPr>
+            <a:normAutofit/>
+          </a:bodyPr>
+          <a:lstStyle/>
+          <a:p>
+            <a:r>
+              <a:rPr lang="fa-IR" dirty="0"/>
+              <a:t>ریموت</a:t>
+            </a:r>
+          </a:p>
+        </p:txBody>
+      </p:sp>
+      <p:sp>
+        <p:nvSpPr>
+          <p:cNvPr id="3" name="Content Placeholder 2">
+            <a:extLst>
+              <a:ext uri="{FF2B5EF4-FFF2-40B4-BE49-F238E27FC236}">
+                <a16:creationId xmlns:a16="http://schemas.microsoft.com/office/drawing/2014/main" id="{3BB0E2A9-28DC-430D-A183-22754EEB6FEF}"/>
+              </a:ext>
+            </a:extLst>
+          </p:cNvPr>
+          <p:cNvSpPr>
+            <a:spLocks noGrp="1"/>
+          </p:cNvSpPr>
+          <p:nvPr>
+            <p:ph idx="1"/>
+          </p:nvPr>
+        </p:nvSpPr>
+        <p:spPr>
+          <a:xfrm>
+            <a:off x="913795" y="1023999"/>
+            <a:ext cx="10353762" cy="5911062"/>
+          </a:xfrm>
+        </p:spPr>
+        <p:txBody>
+          <a:bodyPr>
+            <a:normAutofit/>
+          </a:bodyPr>
+          <a:lstStyle/>
+          <a:p>
+            <a:r>
+              <a:rPr lang="fa-IR" sz="2000" b="1" dirty="0">
+                <a:effectLst/>
+                <a:latin typeface="Times New Roman" panose="02020603050405020304" pitchFamily="18" charset="0"/>
+                <a:cs typeface="B Lotus" panose="00000400000000000000" pitchFamily="2" charset="-78"/>
+              </a:rPr>
+              <a:t>ریموت چیست؟</a:t>
+            </a:r>
+          </a:p>
+          <a:p>
+            <a:pPr lvl="1"/>
+            <a:r>
+              <a:rPr lang="fa-IR" sz="1700" dirty="0">
+                <a:effectLst/>
+                <a:latin typeface="Times New Roman" panose="02020603050405020304" pitchFamily="18" charset="0"/>
+                <a:cs typeface="B Lotus" panose="00000400000000000000" pitchFamily="2" charset="-78"/>
+              </a:rPr>
+              <a:t>مشاهده </a:t>
+            </a:r>
+            <a:r>
+              <a:rPr lang="fa-IR" sz="1700" dirty="0" err="1">
+                <a:effectLst/>
+                <a:latin typeface="Times New Roman" panose="02020603050405020304" pitchFamily="18" charset="0"/>
+                <a:cs typeface="B Lotus" panose="00000400000000000000" pitchFamily="2" charset="-78"/>
+              </a:rPr>
+              <a:t>ریموت‌ها</a:t>
+            </a:r>
+            <a:r>
+              <a:rPr lang="fa-IR" sz="1700" dirty="0">
+                <a:effectLst/>
+                <a:latin typeface="Times New Roman" panose="02020603050405020304" pitchFamily="18" charset="0"/>
+                <a:cs typeface="B Lotus" panose="00000400000000000000" pitchFamily="2" charset="-78"/>
+              </a:rPr>
+              <a:t>:</a:t>
+            </a:r>
+          </a:p>
+          <a:p>
+            <a:pPr marL="810000" lvl="2" indent="0">
+              <a:buNone/>
+            </a:pPr>
+            <a:r>
+              <a:rPr lang="fa-IR" sz="1700" b="1" dirty="0">
+                <a:effectLst/>
+                <a:latin typeface="Times New Roman" panose="02020603050405020304" pitchFamily="18" charset="0"/>
+                <a:cs typeface="B Lotus" panose="00000400000000000000" pitchFamily="2" charset="-78"/>
+              </a:rPr>
+              <a:t> </a:t>
+            </a:r>
+            <a:r>
+              <a:rPr lang="fa-IR" sz="1700" dirty="0">
+                <a:effectLst/>
+                <a:latin typeface="Times New Roman" panose="02020603050405020304" pitchFamily="18" charset="0"/>
+                <a:cs typeface="B Lotus" panose="00000400000000000000" pitchFamily="2" charset="-78"/>
+              </a:rPr>
+              <a:t>مشاهده </a:t>
+            </a:r>
+            <a:r>
+              <a:rPr lang="fa-IR" sz="1700" dirty="0" err="1">
+                <a:effectLst/>
+                <a:latin typeface="Times New Roman" panose="02020603050405020304" pitchFamily="18" charset="0"/>
+                <a:cs typeface="B Lotus" panose="00000400000000000000" pitchFamily="2" charset="-78"/>
+              </a:rPr>
+              <a:t>ریموت‌ها</a:t>
+            </a:r>
+            <a:r>
+              <a:rPr lang="fa-IR" sz="1700" dirty="0">
+                <a:effectLst/>
+                <a:latin typeface="Times New Roman" panose="02020603050405020304" pitchFamily="18" charset="0"/>
+                <a:cs typeface="B Lotus" panose="00000400000000000000" pitchFamily="2" charset="-78"/>
+              </a:rPr>
+              <a:t> به سادگی با دستور </a:t>
+            </a:r>
+            <a:r>
+              <a:rPr lang="en-US" sz="1700" dirty="0">
+                <a:solidFill>
+                  <a:srgbClr val="92D050"/>
+                </a:solidFill>
+                <a:effectLst/>
+                <a:latin typeface="Consolas" panose="020B0609020204030204" pitchFamily="49" charset="0"/>
+                <a:cs typeface="B Lotus" panose="00000400000000000000" pitchFamily="2" charset="-78"/>
+              </a:rPr>
+              <a:t>git remote</a:t>
+            </a:r>
+            <a:r>
+              <a:rPr lang="fa-IR" sz="1700" dirty="0">
+                <a:effectLst/>
+                <a:latin typeface="Times New Roman" panose="02020603050405020304" pitchFamily="18" charset="0"/>
+                <a:cs typeface="B Lotus" panose="00000400000000000000" pitchFamily="2" charset="-78"/>
+              </a:rPr>
+              <a:t> امکان پذیر است.</a:t>
+            </a:r>
+          </a:p>
+          <a:p>
+            <a:pPr lvl="1"/>
+            <a:r>
+              <a:rPr lang="fa-IR" sz="1700" dirty="0">
+                <a:effectLst/>
+                <a:latin typeface="Times New Roman" panose="02020603050405020304" pitchFamily="18" charset="0"/>
+                <a:cs typeface="B Lotus" panose="00000400000000000000" pitchFamily="2" charset="-78"/>
+              </a:rPr>
+              <a:t>اضافه کردن مخازن ریموت:</a:t>
+            </a:r>
+          </a:p>
+          <a:p>
+            <a:pPr marL="756000" lvl="2" indent="0">
+              <a:buNone/>
+            </a:pPr>
+            <a:r>
+              <a:rPr lang="fa-IR" sz="1700" dirty="0">
+                <a:effectLst/>
+                <a:latin typeface="Times New Roman" panose="02020603050405020304" pitchFamily="18" charset="0"/>
+                <a:cs typeface="B Lotus" panose="00000400000000000000" pitchFamily="2" charset="-78"/>
+              </a:rPr>
+              <a:t> </a:t>
+            </a:r>
+            <a:r>
+              <a:rPr lang="fa-IR" sz="1700" dirty="0" err="1">
+                <a:effectLst/>
+                <a:latin typeface="Times New Roman" panose="02020603050405020304" pitchFamily="18" charset="0"/>
+                <a:cs typeface="B Lotus" panose="00000400000000000000" pitchFamily="2" charset="-78"/>
+              </a:rPr>
+              <a:t>مخازنی</a:t>
+            </a:r>
+            <a:r>
+              <a:rPr lang="fa-IR" sz="1700" dirty="0">
+                <a:effectLst/>
+                <a:latin typeface="Times New Roman" panose="02020603050405020304" pitchFamily="18" charset="0"/>
+                <a:cs typeface="B Lotus" panose="00000400000000000000" pitchFamily="2" charset="-78"/>
+              </a:rPr>
+              <a:t> که به وسیله دستور </a:t>
+            </a:r>
+            <a:r>
+              <a:rPr lang="en-US" sz="1700" dirty="0">
+                <a:solidFill>
+                  <a:srgbClr val="92D050"/>
+                </a:solidFill>
+                <a:effectLst/>
+                <a:latin typeface="Consolas" panose="020B0609020204030204" pitchFamily="49" charset="0"/>
+                <a:cs typeface="B Lotus" panose="00000400000000000000" pitchFamily="2" charset="-78"/>
+              </a:rPr>
+              <a:t>git clone</a:t>
+            </a:r>
+            <a:r>
+              <a:rPr lang="fa-IR" sz="1700" dirty="0">
+                <a:solidFill>
+                  <a:srgbClr val="92D050"/>
+                </a:solidFill>
+                <a:effectLst/>
+                <a:latin typeface="Consolas" panose="020B0609020204030204" pitchFamily="49" charset="0"/>
+                <a:cs typeface="B Lotus" panose="00000400000000000000" pitchFamily="2" charset="-78"/>
+              </a:rPr>
+              <a:t> </a:t>
+            </a:r>
+            <a:r>
+              <a:rPr lang="fa-IR" sz="1700" dirty="0">
+                <a:effectLst/>
+                <a:latin typeface="Times New Roman" panose="02020603050405020304" pitchFamily="18" charset="0"/>
+                <a:cs typeface="B Lotus" panose="00000400000000000000" pitchFamily="2" charset="-78"/>
+              </a:rPr>
+              <a:t>بر روی کامپیوتر خود کپی کردید همواره یک ریموت( </a:t>
+            </a:r>
+            <a:r>
+              <a:rPr lang="fa-IR" sz="1700" dirty="0" err="1">
+                <a:effectLst/>
+                <a:latin typeface="Times New Roman" panose="02020603050405020304" pitchFamily="18" charset="0"/>
+                <a:cs typeface="B Lotus" panose="00000400000000000000" pitchFamily="2" charset="-78"/>
+              </a:rPr>
+              <a:t>ریموتی</a:t>
+            </a:r>
+            <a:r>
+              <a:rPr lang="fa-IR" sz="1700" dirty="0">
+                <a:effectLst/>
+                <a:latin typeface="Times New Roman" panose="02020603050405020304" pitchFamily="18" charset="0"/>
+                <a:cs typeface="B Lotus" panose="00000400000000000000" pitchFamily="2" charset="-78"/>
+              </a:rPr>
+              <a:t> که کلون از آن صورت گرفته ) دارند اما برای اضافه کردن ریموت جدید به یک مخزن محلی </a:t>
+            </a:r>
+            <a:r>
+              <a:rPr lang="fa-IR" sz="1700" dirty="0" err="1">
+                <a:effectLst/>
+                <a:latin typeface="Times New Roman" panose="02020603050405020304" pitchFamily="18" charset="0"/>
+                <a:cs typeface="B Lotus" panose="00000400000000000000" pitchFamily="2" charset="-78"/>
+              </a:rPr>
+              <a:t>می‌توانید</a:t>
+            </a:r>
+            <a:r>
+              <a:rPr lang="fa-IR" sz="1700" dirty="0">
+                <a:effectLst/>
+                <a:latin typeface="Times New Roman" panose="02020603050405020304" pitchFamily="18" charset="0"/>
+                <a:cs typeface="B Lotus" panose="00000400000000000000" pitchFamily="2" charset="-78"/>
+              </a:rPr>
+              <a:t> از دستور </a:t>
+            </a:r>
+            <a:r>
+              <a:rPr lang="en-US" sz="1700" dirty="0">
+                <a:solidFill>
+                  <a:srgbClr val="92D050"/>
+                </a:solidFill>
+                <a:effectLst/>
+                <a:latin typeface="Consolas" panose="020B0609020204030204" pitchFamily="49" charset="0"/>
+                <a:cs typeface="B Lotus" panose="00000400000000000000" pitchFamily="2" charset="-78"/>
+              </a:rPr>
+              <a:t>git remote add &lt;</a:t>
+            </a:r>
+            <a:r>
+              <a:rPr lang="en-US" sz="1700" dirty="0" err="1">
+                <a:solidFill>
+                  <a:srgbClr val="92D050"/>
+                </a:solidFill>
+                <a:effectLst/>
+                <a:latin typeface="Consolas" panose="020B0609020204030204" pitchFamily="49" charset="0"/>
+                <a:cs typeface="B Lotus" panose="00000400000000000000" pitchFamily="2" charset="-78"/>
+              </a:rPr>
+              <a:t>shortname</a:t>
+            </a:r>
+            <a:r>
+              <a:rPr lang="en-US" sz="1700" dirty="0">
+                <a:solidFill>
+                  <a:srgbClr val="92D050"/>
+                </a:solidFill>
+                <a:effectLst/>
+                <a:latin typeface="Consolas" panose="020B0609020204030204" pitchFamily="49" charset="0"/>
+                <a:cs typeface="B Lotus" panose="00000400000000000000" pitchFamily="2" charset="-78"/>
+              </a:rPr>
+              <a:t>&gt; &lt;</a:t>
+            </a:r>
+            <a:r>
+              <a:rPr lang="en-US" sz="1700" dirty="0" err="1">
+                <a:solidFill>
+                  <a:srgbClr val="92D050"/>
+                </a:solidFill>
+                <a:effectLst/>
+                <a:latin typeface="Consolas" panose="020B0609020204030204" pitchFamily="49" charset="0"/>
+                <a:cs typeface="B Lotus" panose="00000400000000000000" pitchFamily="2" charset="-78"/>
+              </a:rPr>
+              <a:t>url</a:t>
+            </a:r>
+            <a:r>
+              <a:rPr lang="en-US" sz="1700" dirty="0">
+                <a:solidFill>
+                  <a:srgbClr val="92D050"/>
+                </a:solidFill>
+                <a:effectLst/>
+                <a:latin typeface="Consolas" panose="020B0609020204030204" pitchFamily="49" charset="0"/>
+                <a:cs typeface="B Lotus" panose="00000400000000000000" pitchFamily="2" charset="-78"/>
+              </a:rPr>
+              <a:t>&gt;</a:t>
+            </a:r>
+            <a:r>
+              <a:rPr lang="fa-IR" sz="1700" dirty="0">
+                <a:solidFill>
+                  <a:srgbClr val="92D050"/>
+                </a:solidFill>
+                <a:effectLst/>
+                <a:latin typeface="Consolas" panose="020B0609020204030204" pitchFamily="49" charset="0"/>
+                <a:cs typeface="B Lotus" panose="00000400000000000000" pitchFamily="2" charset="-78"/>
+              </a:rPr>
+              <a:t> </a:t>
+            </a:r>
+            <a:r>
+              <a:rPr lang="fa-IR" sz="1700" dirty="0">
+                <a:effectLst/>
+                <a:latin typeface="Times New Roman" panose="02020603050405020304" pitchFamily="18" charset="0"/>
+                <a:cs typeface="B Lotus" panose="00000400000000000000" pitchFamily="2" charset="-78"/>
+              </a:rPr>
+              <a:t>استفاده کنید که یک ریموت با آدرس نوشته شده و نام دلخواه به مخزن شما اضافه </a:t>
+            </a:r>
+            <a:r>
+              <a:rPr lang="fa-IR" sz="1700" dirty="0" err="1">
+                <a:effectLst/>
+                <a:latin typeface="Times New Roman" panose="02020603050405020304" pitchFamily="18" charset="0"/>
+                <a:cs typeface="B Lotus" panose="00000400000000000000" pitchFamily="2" charset="-78"/>
+              </a:rPr>
+              <a:t>می‌کند</a:t>
+            </a:r>
+            <a:r>
+              <a:rPr lang="fa-IR" sz="1700" dirty="0">
+                <a:effectLst/>
+                <a:latin typeface="Times New Roman" panose="02020603050405020304" pitchFamily="18" charset="0"/>
+                <a:cs typeface="B Lotus" panose="00000400000000000000" pitchFamily="2" charset="-78"/>
+              </a:rPr>
+              <a:t>.</a:t>
+            </a:r>
+          </a:p>
+          <a:p>
+            <a:pPr lvl="1"/>
+            <a:r>
+              <a:rPr lang="fa-IR" sz="1700" dirty="0" err="1">
+                <a:effectLst/>
+                <a:latin typeface="Times New Roman" panose="02020603050405020304" pitchFamily="18" charset="0"/>
+                <a:cs typeface="B Lotus" panose="00000400000000000000" pitchFamily="2" charset="-78"/>
+              </a:rPr>
+              <a:t>فچ</a:t>
+            </a:r>
+            <a:r>
+              <a:rPr lang="fa-IR" sz="1700" dirty="0">
+                <a:effectLst/>
+                <a:latin typeface="Times New Roman" panose="02020603050405020304" pitchFamily="18" charset="0"/>
+                <a:cs typeface="B Lotus" panose="00000400000000000000" pitchFamily="2" charset="-78"/>
+              </a:rPr>
+              <a:t> و پول کردن از </a:t>
+            </a:r>
+            <a:r>
+              <a:rPr lang="fa-IR" sz="1700" dirty="0" err="1">
+                <a:effectLst/>
+                <a:latin typeface="Times New Roman" panose="02020603050405020304" pitchFamily="18" charset="0"/>
+                <a:cs typeface="B Lotus" panose="00000400000000000000" pitchFamily="2" charset="-78"/>
+              </a:rPr>
+              <a:t>ریموت‌ها</a:t>
+            </a:r>
+            <a:r>
+              <a:rPr lang="fa-IR" sz="1700" dirty="0">
+                <a:effectLst/>
+                <a:latin typeface="Times New Roman" panose="02020603050405020304" pitchFamily="18" charset="0"/>
+                <a:cs typeface="B Lotus" panose="00000400000000000000" pitchFamily="2" charset="-78"/>
+              </a:rPr>
+              <a:t>:</a:t>
+            </a:r>
+          </a:p>
+          <a:p>
+            <a:pPr marL="810000" lvl="2" indent="0">
+              <a:buNone/>
+            </a:pPr>
+            <a:r>
+              <a:rPr lang="fa-IR" sz="1700" dirty="0">
+                <a:effectLst/>
+                <a:latin typeface="Times New Roman" panose="02020603050405020304" pitchFamily="18" charset="0"/>
+                <a:cs typeface="B Lotus" panose="00000400000000000000" pitchFamily="2" charset="-78"/>
+              </a:rPr>
+              <a:t>دستور </a:t>
+            </a:r>
+            <a:r>
+              <a:rPr lang="en-US" sz="1700" dirty="0">
+                <a:solidFill>
+                  <a:srgbClr val="92D050"/>
+                </a:solidFill>
+                <a:effectLst/>
+                <a:latin typeface="Consolas" panose="020B0609020204030204" pitchFamily="49" charset="0"/>
+                <a:cs typeface="B Lotus" panose="00000400000000000000" pitchFamily="2" charset="-78"/>
+              </a:rPr>
+              <a:t>git fetch &lt;remote&gt;</a:t>
+            </a:r>
+            <a:r>
+              <a:rPr lang="fa-IR" sz="1700" dirty="0">
+                <a:effectLst/>
+                <a:latin typeface="Times New Roman" panose="02020603050405020304" pitchFamily="18" charset="0"/>
+                <a:cs typeface="B Lotus" panose="00000400000000000000" pitchFamily="2" charset="-78"/>
+              </a:rPr>
+              <a:t> تمام اطلاعات ریموت که روی سیستم محلی شما وجود ندارند را به سیستم محلی شما کپی </a:t>
+            </a:r>
+            <a:r>
+              <a:rPr lang="fa-IR" sz="1700" dirty="0" err="1">
+                <a:effectLst/>
+                <a:latin typeface="Times New Roman" panose="02020603050405020304" pitchFamily="18" charset="0"/>
+                <a:cs typeface="B Lotus" panose="00000400000000000000" pitchFamily="2" charset="-78"/>
+              </a:rPr>
+              <a:t>می‌کند</a:t>
+            </a:r>
+            <a:r>
+              <a:rPr lang="fa-IR" sz="1700" dirty="0">
+                <a:effectLst/>
+                <a:latin typeface="Times New Roman" panose="02020603050405020304" pitchFamily="18" charset="0"/>
+                <a:cs typeface="B Lotus" panose="00000400000000000000" pitchFamily="2" charset="-78"/>
+              </a:rPr>
+              <a:t>، اما دستور </a:t>
+            </a:r>
+            <a:r>
+              <a:rPr lang="en-US" sz="1700" dirty="0">
+                <a:solidFill>
+                  <a:srgbClr val="92D050"/>
+                </a:solidFill>
+                <a:effectLst/>
+                <a:latin typeface="Consolas" panose="020B0609020204030204" pitchFamily="49" charset="0"/>
+                <a:cs typeface="B Lotus" panose="00000400000000000000" pitchFamily="2" charset="-78"/>
+              </a:rPr>
+              <a:t>git pull &lt;remote&gt;</a:t>
+            </a:r>
+            <a:r>
+              <a:rPr lang="fa-IR" sz="1700" dirty="0">
+                <a:solidFill>
+                  <a:srgbClr val="92D050"/>
+                </a:solidFill>
+                <a:effectLst/>
+                <a:latin typeface="Consolas" panose="020B0609020204030204" pitchFamily="49" charset="0"/>
+                <a:cs typeface="B Lotus" panose="00000400000000000000" pitchFamily="2" charset="-78"/>
+              </a:rPr>
+              <a:t> </a:t>
+            </a:r>
+            <a:r>
+              <a:rPr lang="fa-IR" sz="1700" dirty="0">
+                <a:effectLst/>
+                <a:latin typeface="Times New Roman" panose="02020603050405020304" pitchFamily="18" charset="0"/>
+                <a:cs typeface="B Lotus" panose="00000400000000000000" pitchFamily="2" charset="-78"/>
+              </a:rPr>
+              <a:t>علاوه بر کپی کردن اطلاعات از سرور این اطلاعات را با اطلاعات محلی شما نیز ادغام </a:t>
+            </a:r>
+            <a:r>
+              <a:rPr lang="fa-IR" sz="1700" dirty="0" err="1">
+                <a:effectLst/>
+                <a:latin typeface="Times New Roman" panose="02020603050405020304" pitchFamily="18" charset="0"/>
+                <a:cs typeface="B Lotus" panose="00000400000000000000" pitchFamily="2" charset="-78"/>
+              </a:rPr>
+              <a:t>می‌کند</a:t>
+            </a:r>
+            <a:r>
+              <a:rPr lang="fa-IR" sz="1700" dirty="0">
+                <a:effectLst/>
+                <a:latin typeface="Times New Roman" panose="02020603050405020304" pitchFamily="18" charset="0"/>
+                <a:cs typeface="B Lotus" panose="00000400000000000000" pitchFamily="2" charset="-78"/>
+              </a:rPr>
+              <a:t>.</a:t>
+            </a:r>
+          </a:p>
+          <a:p>
+            <a:pPr lvl="1"/>
+            <a:r>
+              <a:rPr lang="fa-IR" sz="1700" dirty="0">
+                <a:effectLst/>
+                <a:latin typeface="Times New Roman" panose="02020603050405020304" pitchFamily="18" charset="0"/>
+                <a:cs typeface="B Lotus" panose="00000400000000000000" pitchFamily="2" charset="-78"/>
+              </a:rPr>
+              <a:t>پوش کردن به ریموت:</a:t>
+            </a:r>
+          </a:p>
+          <a:p>
+            <a:pPr marL="756000" lvl="2" indent="0">
+              <a:buNone/>
+            </a:pPr>
+            <a:r>
+              <a:rPr lang="fa-IR" sz="1700" dirty="0">
+                <a:effectLst/>
+                <a:latin typeface="Times New Roman" panose="02020603050405020304" pitchFamily="18" charset="0"/>
+                <a:cs typeface="B Lotus" panose="00000400000000000000" pitchFamily="2" charset="-78"/>
+              </a:rPr>
+              <a:t> در </a:t>
+            </a:r>
+            <a:r>
+              <a:rPr lang="fa-IR" sz="1700" dirty="0" err="1">
+                <a:effectLst/>
+                <a:latin typeface="Times New Roman" panose="02020603050405020304" pitchFamily="18" charset="0"/>
+                <a:cs typeface="B Lotus" panose="00000400000000000000" pitchFamily="2" charset="-78"/>
+              </a:rPr>
+              <a:t>مرحله‌ای</a:t>
+            </a:r>
+            <a:r>
+              <a:rPr lang="fa-IR" sz="1700" dirty="0">
+                <a:effectLst/>
+                <a:latin typeface="Times New Roman" panose="02020603050405020304" pitchFamily="18" charset="0"/>
+                <a:cs typeface="B Lotus" panose="00000400000000000000" pitchFamily="2" charset="-78"/>
+              </a:rPr>
+              <a:t> شما نیاز دارید که تغییرات اعمال شده روی نسخه محلی( </a:t>
+            </a:r>
+            <a:r>
+              <a:rPr lang="fa-IR" sz="1700" dirty="0" err="1">
+                <a:effectLst/>
+                <a:latin typeface="Times New Roman" panose="02020603050405020304" pitchFamily="18" charset="0"/>
+                <a:cs typeface="B Lotus" panose="00000400000000000000" pitchFamily="2" charset="-78"/>
+              </a:rPr>
+              <a:t>کامیت‌ها</a:t>
+            </a:r>
+            <a:r>
+              <a:rPr lang="fa-IR" sz="1700" dirty="0">
+                <a:effectLst/>
+                <a:latin typeface="Times New Roman" panose="02020603050405020304" pitchFamily="18" charset="0"/>
+                <a:cs typeface="B Lotus" panose="00000400000000000000" pitchFamily="2" charset="-78"/>
+              </a:rPr>
+              <a:t> ) را به ریموت خود ارسال کنید، این کار با دستور</a:t>
+            </a:r>
+            <a:br>
+              <a:rPr lang="fa-IR" sz="1700" dirty="0">
+                <a:effectLst/>
+                <a:latin typeface="Times New Roman" panose="02020603050405020304" pitchFamily="18" charset="0"/>
+                <a:cs typeface="B Lotus" panose="00000400000000000000" pitchFamily="2" charset="-78"/>
+              </a:rPr>
+            </a:br>
+            <a:r>
+              <a:rPr lang="fa-IR" sz="1700" dirty="0">
+                <a:solidFill>
+                  <a:srgbClr val="92D050"/>
+                </a:solidFill>
+                <a:effectLst/>
+                <a:latin typeface="Consolas" panose="020B0609020204030204" pitchFamily="49" charset="0"/>
+                <a:cs typeface="B Lotus" panose="00000400000000000000" pitchFamily="2" charset="-78"/>
+              </a:rPr>
+              <a:t>  </a:t>
+            </a:r>
+            <a:r>
+              <a:rPr lang="en-US" sz="1700" dirty="0">
+                <a:solidFill>
+                  <a:srgbClr val="92D050"/>
+                </a:solidFill>
+                <a:effectLst/>
+                <a:latin typeface="Consolas" panose="020B0609020204030204" pitchFamily="49" charset="0"/>
+                <a:cs typeface="B Lotus" panose="00000400000000000000" pitchFamily="2" charset="-78"/>
+              </a:rPr>
+              <a:t>git push &lt;remote&gt; &lt;branch&gt;</a:t>
+            </a:r>
+            <a:r>
+              <a:rPr lang="fa-IR" sz="1700" dirty="0">
+                <a:effectLst/>
+                <a:latin typeface="Times New Roman" panose="02020603050405020304" pitchFamily="18" charset="0"/>
+                <a:cs typeface="B Lotus" panose="00000400000000000000" pitchFamily="2" charset="-78"/>
+              </a:rPr>
+              <a:t> صورت </a:t>
+            </a:r>
+            <a:r>
+              <a:rPr lang="fa-IR" sz="1700" dirty="0" err="1">
+                <a:effectLst/>
+                <a:latin typeface="Times New Roman" panose="02020603050405020304" pitchFamily="18" charset="0"/>
+                <a:cs typeface="B Lotus" panose="00000400000000000000" pitchFamily="2" charset="-78"/>
+              </a:rPr>
+              <a:t>می‌گیرد</a:t>
+            </a:r>
+            <a:r>
+              <a:rPr lang="fa-IR" sz="1700" dirty="0">
+                <a:effectLst/>
+                <a:latin typeface="Times New Roman" panose="02020603050405020304" pitchFamily="18" charset="0"/>
+                <a:cs typeface="B Lotus" panose="00000400000000000000" pitchFamily="2" charset="-78"/>
+              </a:rPr>
+              <a:t> که در آینده به موضوع </a:t>
+            </a:r>
+            <a:r>
+              <a:rPr lang="fa-IR" sz="1700" dirty="0" err="1">
+                <a:effectLst/>
+                <a:latin typeface="Times New Roman" panose="02020603050405020304" pitchFamily="18" charset="0"/>
+                <a:cs typeface="B Lotus" panose="00000400000000000000" pitchFamily="2" charset="-78"/>
+              </a:rPr>
+              <a:t>برنچ</a:t>
+            </a:r>
+            <a:r>
+              <a:rPr lang="fa-IR" sz="1700" dirty="0">
+                <a:effectLst/>
+                <a:latin typeface="Times New Roman" panose="02020603050405020304" pitchFamily="18" charset="0"/>
+                <a:cs typeface="B Lotus" panose="00000400000000000000" pitchFamily="2" charset="-78"/>
+              </a:rPr>
+              <a:t> خواهیم پرداخت.</a:t>
+            </a:r>
+          </a:p>
+          <a:p>
+            <a:pPr lvl="1"/>
+            <a:r>
+              <a:rPr lang="fa-IR" sz="1700" dirty="0">
+                <a:effectLst/>
+                <a:latin typeface="Times New Roman" panose="02020603050405020304" pitchFamily="18" charset="0"/>
+                <a:cs typeface="B Lotus" panose="00000400000000000000" pitchFamily="2" charset="-78"/>
+              </a:rPr>
+              <a:t>تغییر نام و حذف ریموت:</a:t>
+            </a:r>
+          </a:p>
+          <a:p>
+            <a:pPr marL="756000" lvl="2" indent="0">
+              <a:buNone/>
+            </a:pPr>
+            <a:r>
+              <a:rPr lang="fa-IR" sz="1700" dirty="0">
+                <a:effectLst/>
+                <a:latin typeface="Times New Roman" panose="02020603050405020304" pitchFamily="18" charset="0"/>
+                <a:cs typeface="B Lotus" panose="00000400000000000000" pitchFamily="2" charset="-78"/>
+              </a:rPr>
+              <a:t> با دستور </a:t>
+            </a:r>
+            <a:r>
+              <a:rPr lang="fr-FR" sz="1700" dirty="0">
+                <a:solidFill>
+                  <a:srgbClr val="92D050"/>
+                </a:solidFill>
+                <a:effectLst/>
+                <a:latin typeface="Consolas" panose="020B0609020204030204" pitchFamily="49" charset="0"/>
+                <a:cs typeface="B Lotus" panose="00000400000000000000" pitchFamily="2" charset="-78"/>
+              </a:rPr>
+              <a:t>git </a:t>
+            </a:r>
+            <a:r>
+              <a:rPr lang="fr-FR" sz="1700" dirty="0" err="1">
+                <a:solidFill>
+                  <a:srgbClr val="92D050"/>
+                </a:solidFill>
+                <a:effectLst/>
+                <a:latin typeface="Consolas" panose="020B0609020204030204" pitchFamily="49" charset="0"/>
+                <a:cs typeface="B Lotus" panose="00000400000000000000" pitchFamily="2" charset="-78"/>
+              </a:rPr>
+              <a:t>remote</a:t>
+            </a:r>
+            <a:r>
+              <a:rPr lang="fr-FR" sz="1700" dirty="0">
+                <a:solidFill>
+                  <a:srgbClr val="92D050"/>
+                </a:solidFill>
+                <a:effectLst/>
+                <a:latin typeface="Consolas" panose="020B0609020204030204" pitchFamily="49" charset="0"/>
+                <a:cs typeface="B Lotus" panose="00000400000000000000" pitchFamily="2" charset="-78"/>
+              </a:rPr>
+              <a:t> </a:t>
+            </a:r>
+            <a:r>
+              <a:rPr lang="fr-FR" sz="1700" dirty="0" err="1">
+                <a:solidFill>
+                  <a:srgbClr val="92D050"/>
+                </a:solidFill>
+                <a:effectLst/>
+                <a:latin typeface="Consolas" panose="020B0609020204030204" pitchFamily="49" charset="0"/>
+                <a:cs typeface="B Lotus" panose="00000400000000000000" pitchFamily="2" charset="-78"/>
+              </a:rPr>
+              <a:t>rename</a:t>
+            </a:r>
+            <a:r>
+              <a:rPr lang="fr-FR" sz="1700" dirty="0">
+                <a:solidFill>
+                  <a:srgbClr val="92D050"/>
+                </a:solidFill>
+                <a:effectLst/>
+                <a:latin typeface="Consolas" panose="020B0609020204030204" pitchFamily="49" charset="0"/>
+                <a:cs typeface="B Lotus" panose="00000400000000000000" pitchFamily="2" charset="-78"/>
+              </a:rPr>
+              <a:t> </a:t>
+            </a:r>
+            <a:r>
+              <a:rPr lang="en-US" sz="1700" dirty="0">
+                <a:solidFill>
+                  <a:srgbClr val="92D050"/>
+                </a:solidFill>
+                <a:effectLst/>
+                <a:latin typeface="Consolas" panose="020B0609020204030204" pitchFamily="49" charset="0"/>
+                <a:cs typeface="B Lotus" panose="00000400000000000000" pitchFamily="2" charset="-78"/>
+              </a:rPr>
+              <a:t>&lt;old name&gt; &lt;new name&gt;</a:t>
+            </a:r>
+            <a:r>
+              <a:rPr lang="fa-IR" sz="1700" dirty="0">
+                <a:solidFill>
+                  <a:srgbClr val="92D050"/>
+                </a:solidFill>
+                <a:effectLst/>
+                <a:latin typeface="Consolas" panose="020B0609020204030204" pitchFamily="49" charset="0"/>
+                <a:cs typeface="B Lotus" panose="00000400000000000000" pitchFamily="2" charset="-78"/>
+              </a:rPr>
+              <a:t> </a:t>
+            </a:r>
+            <a:r>
+              <a:rPr lang="fa-IR" sz="1700" dirty="0">
+                <a:effectLst/>
+                <a:latin typeface="Times New Roman" panose="02020603050405020304" pitchFamily="18" charset="0"/>
+                <a:cs typeface="B Lotus" panose="00000400000000000000" pitchFamily="2" charset="-78"/>
+              </a:rPr>
+              <a:t>به سادگی </a:t>
+            </a:r>
+            <a:r>
+              <a:rPr lang="fa-IR" sz="1700" dirty="0" err="1">
+                <a:effectLst/>
+                <a:latin typeface="Times New Roman" panose="02020603050405020304" pitchFamily="18" charset="0"/>
+                <a:cs typeface="B Lotus" panose="00000400000000000000" pitchFamily="2" charset="-78"/>
+              </a:rPr>
+              <a:t>می‌توانید</a:t>
+            </a:r>
+            <a:r>
+              <a:rPr lang="fa-IR" sz="1700" dirty="0">
+                <a:effectLst/>
+                <a:latin typeface="Times New Roman" panose="02020603050405020304" pitchFamily="18" charset="0"/>
+                <a:cs typeface="B Lotus" panose="00000400000000000000" pitchFamily="2" charset="-78"/>
+              </a:rPr>
+              <a:t> نام ریموت را تغییر بدهید و با دستور</a:t>
+            </a:r>
+            <a:br>
+              <a:rPr lang="fa-IR" sz="1700" dirty="0">
+                <a:effectLst/>
+                <a:latin typeface="Times New Roman" panose="02020603050405020304" pitchFamily="18" charset="0"/>
+                <a:cs typeface="B Lotus" panose="00000400000000000000" pitchFamily="2" charset="-78"/>
+              </a:rPr>
+            </a:br>
+            <a:r>
+              <a:rPr lang="fa-IR" sz="1700" dirty="0">
+                <a:effectLst/>
+                <a:latin typeface="Times New Roman" panose="02020603050405020304" pitchFamily="18" charset="0"/>
+                <a:cs typeface="B Lotus" panose="00000400000000000000" pitchFamily="2" charset="-78"/>
+              </a:rPr>
+              <a:t> </a:t>
+            </a:r>
+            <a:r>
+              <a:rPr lang="en-US" sz="1700" dirty="0">
+                <a:solidFill>
+                  <a:srgbClr val="92D050"/>
+                </a:solidFill>
+                <a:effectLst/>
+                <a:latin typeface="Consolas" panose="020B0609020204030204" pitchFamily="49" charset="0"/>
+                <a:cs typeface="B Lotus" panose="00000400000000000000" pitchFamily="2" charset="-78"/>
+              </a:rPr>
+              <a:t>git remote remove &lt;name&gt;</a:t>
+            </a:r>
+            <a:r>
+              <a:rPr lang="fa-IR" sz="1700" dirty="0">
+                <a:solidFill>
+                  <a:srgbClr val="92D050"/>
+                </a:solidFill>
+                <a:effectLst/>
+                <a:latin typeface="Consolas" panose="020B0609020204030204" pitchFamily="49" charset="0"/>
+                <a:cs typeface="B Lotus" panose="00000400000000000000" pitchFamily="2" charset="-78"/>
+              </a:rPr>
+              <a:t> </a:t>
+            </a:r>
+            <a:r>
+              <a:rPr lang="fa-IR" sz="1700" dirty="0" err="1">
+                <a:effectLst/>
+                <a:latin typeface="Times New Roman" panose="02020603050405020304" pitchFamily="18" charset="0"/>
+                <a:cs typeface="B Lotus" panose="00000400000000000000" pitchFamily="2" charset="-78"/>
+              </a:rPr>
+              <a:t>می‌توانید</a:t>
+            </a:r>
+            <a:r>
+              <a:rPr lang="fa-IR" sz="1700" dirty="0">
+                <a:effectLst/>
+                <a:latin typeface="Times New Roman" panose="02020603050405020304" pitchFamily="18" charset="0"/>
+                <a:cs typeface="B Lotus" panose="00000400000000000000" pitchFamily="2" charset="-78"/>
+              </a:rPr>
+              <a:t> ریموت و تمام </a:t>
+            </a:r>
+            <a:r>
+              <a:rPr lang="fa-IR" sz="1700" dirty="0" err="1">
+                <a:effectLst/>
+                <a:latin typeface="Times New Roman" panose="02020603050405020304" pitchFamily="18" charset="0"/>
+                <a:cs typeface="B Lotus" panose="00000400000000000000" pitchFamily="2" charset="-78"/>
+              </a:rPr>
+              <a:t>برنچ‌های</a:t>
+            </a:r>
+            <a:r>
+              <a:rPr lang="fa-IR" sz="1700" dirty="0">
+                <a:effectLst/>
+                <a:latin typeface="Times New Roman" panose="02020603050405020304" pitchFamily="18" charset="0"/>
+                <a:cs typeface="B Lotus" panose="00000400000000000000" pitchFamily="2" charset="-78"/>
+              </a:rPr>
+              <a:t> پیگیر و </a:t>
+            </a:r>
+            <a:r>
+              <a:rPr lang="fa-IR" sz="1700" dirty="0" err="1">
+                <a:effectLst/>
+                <a:latin typeface="Times New Roman" panose="02020603050405020304" pitchFamily="18" charset="0"/>
+                <a:cs typeface="B Lotus" panose="00000400000000000000" pitchFamily="2" charset="-78"/>
+              </a:rPr>
+              <a:t>پیکربندی‌های</a:t>
+            </a:r>
+            <a:r>
+              <a:rPr lang="fa-IR" sz="1700" dirty="0">
+                <a:effectLst/>
+                <a:latin typeface="Times New Roman" panose="02020603050405020304" pitchFamily="18" charset="0"/>
+                <a:cs typeface="B Lotus" panose="00000400000000000000" pitchFamily="2" charset="-78"/>
+              </a:rPr>
+              <a:t> مربوط به ریموت را پاک کنید.</a:t>
+            </a:r>
+          </a:p>
+        </p:txBody>
+      </p:sp>
+      <p:sp>
+        <p:nvSpPr>
+          <p:cNvPr id="4" name="Slide Number Placeholder 3">
+            <a:extLst>
+              <a:ext uri="{FF2B5EF4-FFF2-40B4-BE49-F238E27FC236}">
+                <a16:creationId xmlns:a16="http://schemas.microsoft.com/office/drawing/2014/main" id="{7DA29031-9E93-44A1-A5B4-BB313C958CB4}"/>
+              </a:ext>
+            </a:extLst>
+          </p:cNvPr>
+          <p:cNvSpPr>
+            <a:spLocks noGrp="1"/>
+          </p:cNvSpPr>
+          <p:nvPr>
+            <p:ph type="sldNum" sz="quarter" idx="12"/>
+          </p:nvPr>
+        </p:nvSpPr>
+        <p:spPr/>
+        <p:txBody>
+          <a:bodyPr/>
+          <a:lstStyle/>
+          <a:p>
+            <a:fld id="{3A98EE3D-8CD1-4C3F-BD1C-C98C9596463C}" type="slidenum">
+              <a:rPr lang="en-US" smtClean="0"/>
+              <a:t>12</a:t>
+            </a:fld>
+            <a:endParaRPr lang="en-US" dirty="0"/>
+          </a:p>
+        </p:txBody>
+      </p:sp>
+    </p:spTree>
+    <p:extLst>
+      <p:ext uri="{BB962C8B-B14F-4D97-AF65-F5344CB8AC3E}">
+        <p14:creationId xmlns:p14="http://schemas.microsoft.com/office/powerpoint/2010/main" val="1261359138"/>
+      </p:ext>
+    </p:extLst>
+  </p:cSld>
+  <p:clrMapOvr>
+    <a:masterClrMapping/>
+  </p:clrMapOvr>
+  <p:timing>
+    <p:tnLst>
+      <p:par>
+        <p:cTn id="1" dur="indefinite" restart="never" nodeType="tmRoot">
+          <p:childTnLst>
+            <p:seq concurrent="1" nextAc="seek">
+              <p:cTn id="2" dur="indefinite" nodeType="mainSeq">
+                <p:childTnLst>
+                  <p:par>
+                    <p:cTn id="3" fill="hold">
+                      <p:stCondLst>
+                        <p:cond delay="indefinite"/>
+                      </p:stCondLst>
+                      <p:childTnLst>
+                        <p:par>
+                          <p:cTn id="4" fill="hold">
+                            <p:stCondLst>
+                              <p:cond delay="0"/>
+                            </p:stCondLst>
+                            <p:childTnLst>
+                              <p:par>
+                                <p:cTn id="5" presetID="2" presetClass="entr" presetSubtype="4" fill="hold" nodeType="clickEffect">
+                                  <p:stCondLst>
+                                    <p:cond delay="0"/>
+                                  </p:stCondLst>
+                                  <p:childTnLst>
+                                    <p:set>
+                                      <p:cBhvr>
+                                        <p:cTn id="6" dur="1" fill="hold">
+                                          <p:stCondLst>
+                                            <p:cond delay="0"/>
+                                          </p:stCondLst>
+                                        </p:cTn>
+                                        <p:tgtEl>
+                                          <p:spTgt spid="3">
+                                            <p:txEl>
+                                              <p:pRg st="1" end="1"/>
+                                            </p:txEl>
+                                          </p:spTgt>
+                                        </p:tgtEl>
+                                        <p:attrNameLst>
+                                          <p:attrName>style.visibility</p:attrName>
+                                        </p:attrNameLst>
+                                      </p:cBhvr>
+                                      <p:to>
+                                        <p:strVal val="visible"/>
+                                      </p:to>
+                                    </p:set>
+                                    <p:anim calcmode="lin" valueType="num">
+                                      <p:cBhvr additive="base">
+                                        <p:cTn id="7" dur="500" fill="hold"/>
+                                        <p:tgtEl>
+                                          <p:spTgt spid="3">
+                                            <p:txEl>
+                                              <p:pRg st="1" end="1"/>
+                                            </p:txEl>
+                                          </p:spTgt>
+                                        </p:tgtEl>
+                                        <p:attrNameLst>
+                                          <p:attrName>ppt_x</p:attrName>
+                                        </p:attrNameLst>
+                                      </p:cBhvr>
+                                      <p:tavLst>
+                                        <p:tav tm="0">
+                                          <p:val>
+                                            <p:strVal val="#ppt_x"/>
+                                          </p:val>
+                                        </p:tav>
+                                        <p:tav tm="100000">
+                                          <p:val>
+                                            <p:strVal val="#ppt_x"/>
+                                          </p:val>
+                                        </p:tav>
+                                      </p:tavLst>
+                                    </p:anim>
+                                    <p:anim calcmode="lin" valueType="num">
+                                      <p:cBhvr additive="base">
+                                        <p:cTn id="8" dur="500" fill="hold"/>
+                                        <p:tgtEl>
+                                          <p:spTgt spid="3">
+                                            <p:txEl>
+                                              <p:pRg st="1" end="1"/>
+                                            </p:txEl>
+                                          </p:spTgt>
+                                        </p:tgtEl>
+                                        <p:attrNameLst>
+                                          <p:attrName>ppt_y</p:attrName>
+                                        </p:attrNameLst>
+                                      </p:cBhvr>
+                                      <p:tavLst>
+                                        <p:tav tm="0">
+                                          <p:val>
+                                            <p:strVal val="1+#ppt_h/2"/>
+                                          </p:val>
+                                        </p:tav>
+                                        <p:tav tm="100000">
+                                          <p:val>
+                                            <p:strVal val="#ppt_y"/>
+                                          </p:val>
+                                        </p:tav>
+                                      </p:tavLst>
+                                    </p:anim>
+                                  </p:childTnLst>
+                                </p:cTn>
+                              </p:par>
+                            </p:childTnLst>
+                          </p:cTn>
+                        </p:par>
+                        <p:par>
+                          <p:cTn id="9" fill="hold">
+                            <p:stCondLst>
+                              <p:cond delay="500"/>
+                            </p:stCondLst>
+                            <p:childTnLst>
+                              <p:par>
+                                <p:cTn id="10" presetID="2" presetClass="entr" presetSubtype="4" fill="hold" nodeType="afterEffect">
+                                  <p:stCondLst>
+                                    <p:cond delay="0"/>
+                                  </p:stCondLst>
+                                  <p:childTnLst>
+                                    <p:set>
+                                      <p:cBhvr>
+                                        <p:cTn id="11" dur="1" fill="hold">
+                                          <p:stCondLst>
+                                            <p:cond delay="0"/>
+                                          </p:stCondLst>
+                                        </p:cTn>
+                                        <p:tgtEl>
+                                          <p:spTgt spid="3">
+                                            <p:txEl>
+                                              <p:pRg st="2" end="2"/>
+                                            </p:txEl>
+                                          </p:spTgt>
+                                        </p:tgtEl>
+                                        <p:attrNameLst>
+                                          <p:attrName>style.visibility</p:attrName>
+                                        </p:attrNameLst>
+                                      </p:cBhvr>
+                                      <p:to>
+                                        <p:strVal val="visible"/>
+                                      </p:to>
+                                    </p:set>
+                                    <p:anim calcmode="lin" valueType="num">
+                                      <p:cBhvr additive="base">
+                                        <p:cTn id="12" dur="500" fill="hold"/>
+                                        <p:tgtEl>
+                                          <p:spTgt spid="3">
+                                            <p:txEl>
+                                              <p:pRg st="2" end="2"/>
+                                            </p:txEl>
+                                          </p:spTgt>
+                                        </p:tgtEl>
+                                        <p:attrNameLst>
+                                          <p:attrName>ppt_x</p:attrName>
+                                        </p:attrNameLst>
+                                      </p:cBhvr>
+                                      <p:tavLst>
+                                        <p:tav tm="0">
+                                          <p:val>
+                                            <p:strVal val="#ppt_x"/>
+                                          </p:val>
+                                        </p:tav>
+                                        <p:tav tm="100000">
+                                          <p:val>
+                                            <p:strVal val="#ppt_x"/>
+                                          </p:val>
+                                        </p:tav>
+                                      </p:tavLst>
+                                    </p:anim>
+                                    <p:anim calcmode="lin" valueType="num">
+                                      <p:cBhvr additive="base">
+                                        <p:cTn id="13" dur="500" fill="hold"/>
+                                        <p:tgtEl>
+                                          <p:spTgt spid="3">
+                                            <p:txEl>
+                                              <p:pRg st="2" end="2"/>
+                                            </p:txEl>
+                                          </p:spTgt>
+                                        </p:tgtEl>
+                                        <p:attrNameLst>
+                                          <p:attrName>ppt_y</p:attrName>
+                                        </p:attrNameLst>
+                                      </p:cBhvr>
+                                      <p:tavLst>
+                                        <p:tav tm="0">
+                                          <p:val>
+                                            <p:strVal val="1+#ppt_h/2"/>
+                                          </p:val>
+                                        </p:tav>
+                                        <p:tav tm="100000">
+                                          <p:val>
+                                            <p:strVal val="#ppt_y"/>
+                                          </p:val>
+                                        </p:tav>
+                                      </p:tavLst>
+                                    </p:anim>
+                                  </p:childTnLst>
+                                </p:cTn>
+                              </p:par>
+                            </p:childTnLst>
+                          </p:cTn>
+                        </p:par>
+                      </p:childTnLst>
+                    </p:cTn>
+                  </p:par>
+                  <p:par>
+                    <p:cTn id="14" fill="hold">
+                      <p:stCondLst>
+                        <p:cond delay="indefinite"/>
+                      </p:stCondLst>
+                      <p:childTnLst>
+                        <p:par>
+                          <p:cTn id="15" fill="hold">
+                            <p:stCondLst>
+                              <p:cond delay="0"/>
+                            </p:stCondLst>
+                            <p:childTnLst>
+                              <p:par>
+                                <p:cTn id="16" presetID="2" presetClass="entr" presetSubtype="4" fill="hold" nodeType="clickEffect">
+                                  <p:stCondLst>
+                                    <p:cond delay="0"/>
+                                  </p:stCondLst>
+                                  <p:childTnLst>
+                                    <p:set>
+                                      <p:cBhvr>
+                                        <p:cTn id="17" dur="1" fill="hold">
+                                          <p:stCondLst>
+                                            <p:cond delay="0"/>
+                                          </p:stCondLst>
+                                        </p:cTn>
+                                        <p:tgtEl>
+                                          <p:spTgt spid="3">
+                                            <p:txEl>
+                                              <p:pRg st="3" end="3"/>
+                                            </p:txEl>
+                                          </p:spTgt>
+                                        </p:tgtEl>
+                                        <p:attrNameLst>
+                                          <p:attrName>style.visibility</p:attrName>
+                                        </p:attrNameLst>
+                                      </p:cBhvr>
+                                      <p:to>
+                                        <p:strVal val="visible"/>
+                                      </p:to>
+                                    </p:set>
+                                    <p:anim calcmode="lin" valueType="num">
+                                      <p:cBhvr additive="base">
+                                        <p:cTn id="18" dur="500" fill="hold"/>
+                                        <p:tgtEl>
+                                          <p:spTgt spid="3">
+                                            <p:txEl>
+                                              <p:pRg st="3" end="3"/>
+                                            </p:txEl>
+                                          </p:spTgt>
+                                        </p:tgtEl>
+                                        <p:attrNameLst>
+                                          <p:attrName>ppt_x</p:attrName>
+                                        </p:attrNameLst>
+                                      </p:cBhvr>
+                                      <p:tavLst>
+                                        <p:tav tm="0">
+                                          <p:val>
+                                            <p:strVal val="#ppt_x"/>
+                                          </p:val>
+                                        </p:tav>
+                                        <p:tav tm="100000">
+                                          <p:val>
+                                            <p:strVal val="#ppt_x"/>
+                                          </p:val>
+                                        </p:tav>
+                                      </p:tavLst>
+                                    </p:anim>
+                                    <p:anim calcmode="lin" valueType="num">
+                                      <p:cBhvr additive="base">
+                                        <p:cTn id="19" dur="500" fill="hold"/>
+                                        <p:tgtEl>
+                                          <p:spTgt spid="3">
+                                            <p:txEl>
+                                              <p:pRg st="3" end="3"/>
+                                            </p:txEl>
+                                          </p:spTgt>
+                                        </p:tgtEl>
+                                        <p:attrNameLst>
+                                          <p:attrName>ppt_y</p:attrName>
+                                        </p:attrNameLst>
+                                      </p:cBhvr>
+                                      <p:tavLst>
+                                        <p:tav tm="0">
+                                          <p:val>
+                                            <p:strVal val="1+#ppt_h/2"/>
+                                          </p:val>
+                                        </p:tav>
+                                        <p:tav tm="100000">
+                                          <p:val>
+                                            <p:strVal val="#ppt_y"/>
+                                          </p:val>
+                                        </p:tav>
+                                      </p:tavLst>
+                                    </p:anim>
+                                  </p:childTnLst>
+                                </p:cTn>
+                              </p:par>
+                            </p:childTnLst>
+                          </p:cTn>
+                        </p:par>
+                        <p:par>
+                          <p:cTn id="20" fill="hold">
+                            <p:stCondLst>
+                              <p:cond delay="500"/>
+                            </p:stCondLst>
+                            <p:childTnLst>
+                              <p:par>
+                                <p:cTn id="21" presetID="2" presetClass="entr" presetSubtype="4" fill="hold" nodeType="afterEffect">
+                                  <p:stCondLst>
+                                    <p:cond delay="0"/>
+                                  </p:stCondLst>
+                                  <p:childTnLst>
+                                    <p:set>
+                                      <p:cBhvr>
+                                        <p:cTn id="22" dur="1" fill="hold">
+                                          <p:stCondLst>
+                                            <p:cond delay="0"/>
+                                          </p:stCondLst>
+                                        </p:cTn>
+                                        <p:tgtEl>
+                                          <p:spTgt spid="3">
+                                            <p:txEl>
+                                              <p:pRg st="4" end="4"/>
+                                            </p:txEl>
+                                          </p:spTgt>
+                                        </p:tgtEl>
+                                        <p:attrNameLst>
+                                          <p:attrName>style.visibility</p:attrName>
+                                        </p:attrNameLst>
+                                      </p:cBhvr>
+                                      <p:to>
+                                        <p:strVal val="visible"/>
+                                      </p:to>
+                                    </p:set>
+                                    <p:anim calcmode="lin" valueType="num">
+                                      <p:cBhvr additive="base">
+                                        <p:cTn id="23" dur="500" fill="hold"/>
+                                        <p:tgtEl>
+                                          <p:spTgt spid="3">
+                                            <p:txEl>
+                                              <p:pRg st="4" end="4"/>
+                                            </p:txEl>
+                                          </p:spTgt>
+                                        </p:tgtEl>
+                                        <p:attrNameLst>
+                                          <p:attrName>ppt_x</p:attrName>
+                                        </p:attrNameLst>
+                                      </p:cBhvr>
+                                      <p:tavLst>
+                                        <p:tav tm="0">
+                                          <p:val>
+                                            <p:strVal val="#ppt_x"/>
+                                          </p:val>
+                                        </p:tav>
+                                        <p:tav tm="100000">
+                                          <p:val>
+                                            <p:strVal val="#ppt_x"/>
+                                          </p:val>
+                                        </p:tav>
+                                      </p:tavLst>
+                                    </p:anim>
+                                    <p:anim calcmode="lin" valueType="num">
+                                      <p:cBhvr additive="base">
+                                        <p:cTn id="24" dur="500" fill="hold"/>
+                                        <p:tgtEl>
+                                          <p:spTgt spid="3">
+                                            <p:txEl>
+                                              <p:pRg st="4" end="4"/>
+                                            </p:txEl>
+                                          </p:spTgt>
+                                        </p:tgtEl>
+                                        <p:attrNameLst>
+                                          <p:attrName>ppt_y</p:attrName>
+                                        </p:attrNameLst>
+                                      </p:cBhvr>
+                                      <p:tavLst>
+                                        <p:tav tm="0">
+                                          <p:val>
+                                            <p:strVal val="1+#ppt_h/2"/>
+                                          </p:val>
+                                        </p:tav>
+                                        <p:tav tm="100000">
+                                          <p:val>
+                                            <p:strVal val="#ppt_y"/>
+                                          </p:val>
+                                        </p:tav>
+                                      </p:tavLst>
+                                    </p:anim>
+                                  </p:childTnLst>
+                                </p:cTn>
+                              </p:par>
+                            </p:childTnLst>
+                          </p:cTn>
+                        </p:par>
+                      </p:childTnLst>
+                    </p:cTn>
+                  </p:par>
+                  <p:par>
+                    <p:cTn id="25" fill="hold">
+                      <p:stCondLst>
+                        <p:cond delay="indefinite"/>
+                      </p:stCondLst>
+                      <p:childTnLst>
+                        <p:par>
+                          <p:cTn id="26" fill="hold">
+                            <p:stCondLst>
+                              <p:cond delay="0"/>
+                            </p:stCondLst>
+                            <p:childTnLst>
+                              <p:par>
+                                <p:cTn id="27" presetID="2" presetClass="entr" presetSubtype="4" fill="hold" nodeType="clickEffect">
+                                  <p:stCondLst>
+                                    <p:cond delay="0"/>
+                                  </p:stCondLst>
+                                  <p:childTnLst>
+                                    <p:set>
+                                      <p:cBhvr>
+                                        <p:cTn id="28" dur="1" fill="hold">
                                           <p:stCondLst>
                                             <p:cond delay="0"/>
                                           </p:stCondLst>
@@ -13817,7 +14241,7 @@
                                     </p:set>
                                     <p:anim calcmode="lin" valueType="num">
                                       <p:cBhvr additive="base">
-                                        <p:cTn id="31" dur="500" fill="hold"/>
+                                        <p:cTn id="29" dur="500" fill="hold"/>
                                         <p:tgtEl>
                                           <p:spTgt spid="3">
                                             <p:txEl>
@@ -13844,7 +14268,7 @@
                                     </p:anim>
                                     <p:anim calcmode="lin" valueType="num">
                                       <p:cBhvr additive="base">
-                                        <p:cTn id="32" dur="500" fill="hold"/>
+                                        <p:cTn id="30" dur="500" fill="hold"/>
                                         <p:tgtEl>
                                           <p:spTgt spid="3">
                                             <p:txEl>
@@ -13875,30 +14299,21 @@
                             </p:childTnLst>
                           </p:cTn>
                         </p:par>
-                      </p:childTnLst>
-                    </p:cTn>
-                  </p:par>
-                  <p:par>
-                    <p:cTn id="33" fill="hold">
-                      <p:stCondLst>
-                        <p:cond delay="indefinite"/>
-                      </p:stCondLst>
-                      <p:childTnLst>
                         <p:par>
-                          <p:cTn id="34" fill="hold">
+                          <p:cTn id="31" fill="hold">
                             <p:stCondLst>
-                              <p:cond delay="0"/>
+                              <p:cond delay="500"/>
                             </p:stCondLst>
                             <p:childTnLst>
                               <p:par>
-                                <p:cTn id="35" presetID="2" presetClass="entr" presetSubtype="4" fill="hold" nodeType="clickEffect">
+                                <p:cTn id="32" presetID="2" presetClass="entr" presetSubtype="4" fill="hold" nodeType="afterEffect">
                                   <p:stCondLst>
                                     <p:cond delay="0"/>
                                   </p:stCondLst>
                                   <p:childTnLst>
                                     <p:set>
                                       <p:cBhvr>
-                                        <p:cTn id="36" dur="1" fill="hold">
+                                        <p:cTn id="33" dur="1" fill="hold">
                                           <p:stCondLst>
                                             <p:cond delay="0"/>
                                           </p:stCondLst>
@@ -13920,7 +14335,7 @@
                                     </p:set>
                                     <p:anim calcmode="lin" valueType="num">
                                       <p:cBhvr additive="base">
-                                        <p:cTn id="37" dur="500" fill="hold"/>
+                                        <p:cTn id="34" dur="500" fill="hold"/>
                                         <p:tgtEl>
                                           <p:spTgt spid="3">
                                             <p:txEl>
@@ -13947,7 +14362,7 @@
                                     </p:anim>
                                     <p:anim calcmode="lin" valueType="num">
                                       <p:cBhvr additive="base">
-                                        <p:cTn id="38" dur="500" fill="hold"/>
+                                        <p:cTn id="35" dur="500" fill="hold"/>
                                         <p:tgtEl>
                                           <p:spTgt spid="3">
                                             <p:txEl>
@@ -13982,26 +14397,26 @@
                     </p:cTn>
                   </p:par>
                   <p:par>
-                    <p:cTn id="39" fill="hold">
+                    <p:cTn id="36" fill="hold">
                       <p:stCondLst>
                         <p:cond delay="indefinite"/>
                       </p:stCondLst>
                       <p:childTnLst>
                         <p:par>
-                          <p:cTn id="40" fill="hold">
+                          <p:cTn id="37" fill="hold">
                             <p:stCondLst>
                               <p:cond delay="0"/>
                             </p:stCondLst>
                             <p:childTnLst>
                               <p:par>
-                                <p:cTn id="41" presetID="2" presetClass="entr" presetSubtype="4" fill="hold" nodeType="clickEffect">
+                                <p:cTn id="38" presetID="2" presetClass="entr" presetSubtype="4" fill="hold" nodeType="clickEffect">
                                   <p:stCondLst>
                                     <p:cond delay="0"/>
                                   </p:stCondLst>
                                   <p:childTnLst>
                                     <p:set>
                                       <p:cBhvr>
-                                        <p:cTn id="42" dur="1" fill="hold">
+                                        <p:cTn id="39" dur="1" fill="hold">
                                           <p:stCondLst>
                                             <p:cond delay="0"/>
                                           </p:stCondLst>
@@ -14023,7 +14438,7 @@
                                     </p:set>
                                     <p:anim calcmode="lin" valueType="num">
                                       <p:cBhvr additive="base">
-                                        <p:cTn id="43" dur="500" fill="hold"/>
+                                        <p:cTn id="40" dur="500" fill="hold"/>
                                         <p:tgtEl>
                                           <p:spTgt spid="3">
                                             <p:txEl>
@@ -14050,7 +14465,7 @@
                                     </p:anim>
                                     <p:anim calcmode="lin" valueType="num">
                                       <p:cBhvr additive="base">
-                                        <p:cTn id="44" dur="500" fill="hold"/>
+                                        <p:cTn id="41" dur="500" fill="hold"/>
                                         <p:tgtEl>
                                           <p:spTgt spid="3">
                                             <p:txEl>
@@ -14081,30 +14496,21 @@
                             </p:childTnLst>
                           </p:cTn>
                         </p:par>
-                      </p:childTnLst>
-                    </p:cTn>
-                  </p:par>
-                  <p:par>
-                    <p:cTn id="45" fill="hold">
-                      <p:stCondLst>
-                        <p:cond delay="indefinite"/>
-                      </p:stCondLst>
-                      <p:childTnLst>
                         <p:par>
-                          <p:cTn id="46" fill="hold">
+                          <p:cTn id="42" fill="hold">
                             <p:stCondLst>
-                              <p:cond delay="0"/>
+                              <p:cond delay="500"/>
                             </p:stCondLst>
                             <p:childTnLst>
                               <p:par>
-                                <p:cTn id="47" presetID="2" presetClass="entr" presetSubtype="4" fill="hold" nodeType="clickEffect">
+                                <p:cTn id="43" presetID="2" presetClass="entr" presetSubtype="4" fill="hold" nodeType="afterEffect">
                                   <p:stCondLst>
                                     <p:cond delay="0"/>
                                   </p:stCondLst>
                                   <p:childTnLst>
                                     <p:set>
                                       <p:cBhvr>
-                                        <p:cTn id="48" dur="1" fill="hold">
+                                        <p:cTn id="44" dur="1" fill="hold">
                                           <p:stCondLst>
                                             <p:cond delay="0"/>
                                           </p:stCondLst>
@@ -14126,7 +14532,7 @@
                                     </p:set>
                                     <p:anim calcmode="lin" valueType="num">
                                       <p:cBhvr additive="base">
-                                        <p:cTn id="49" dur="500" fill="hold"/>
+                                        <p:cTn id="45" dur="500" fill="hold"/>
                                         <p:tgtEl>
                                           <p:spTgt spid="3">
                                             <p:txEl>
@@ -14153,7 +14559,7 @@
                                     </p:anim>
                                     <p:anim calcmode="lin" valueType="num">
                                       <p:cBhvr additive="base">
-                                        <p:cTn id="50" dur="500" fill="hold"/>
+                                        <p:cTn id="46" dur="500" fill="hold"/>
                                         <p:tgtEl>
                                           <p:spTgt spid="3">
                                             <p:txEl>
@@ -14188,26 +14594,26 @@
                     </p:cTn>
                   </p:par>
                   <p:par>
-                    <p:cTn id="51" fill="hold">
+                    <p:cTn id="47" fill="hold">
                       <p:stCondLst>
                         <p:cond delay="indefinite"/>
                       </p:stCondLst>
                       <p:childTnLst>
                         <p:par>
-                          <p:cTn id="52" fill="hold">
+                          <p:cTn id="48" fill="hold">
                             <p:stCondLst>
                               <p:cond delay="0"/>
                             </p:stCondLst>
                             <p:childTnLst>
                               <p:par>
-                                <p:cTn id="53" presetID="2" presetClass="entr" presetSubtype="4" fill="hold" nodeType="clickEffect">
+                                <p:cTn id="49" presetID="2" presetClass="entr" presetSubtype="4" fill="hold" nodeType="clickEffect">
                                   <p:stCondLst>
                                     <p:cond delay="0"/>
                                   </p:stCondLst>
                                   <p:childTnLst>
                                     <p:set>
                                       <p:cBhvr>
-                                        <p:cTn id="54" dur="1" fill="hold">
+                                        <p:cTn id="50" dur="1" fill="hold">
                                           <p:stCondLst>
                                             <p:cond delay="0"/>
                                           </p:stCondLst>
@@ -14229,7 +14635,7 @@
                                     </p:set>
                                     <p:anim calcmode="lin" valueType="num">
                                       <p:cBhvr additive="base">
-                                        <p:cTn id="55" dur="500" fill="hold"/>
+                                        <p:cTn id="51" dur="500" fill="hold"/>
                                         <p:tgtEl>
                                           <p:spTgt spid="3">
                                             <p:txEl>
@@ -14256,7 +14662,7 @@
                                     </p:anim>
                                     <p:anim calcmode="lin" valueType="num">
                                       <p:cBhvr additive="base">
-                                        <p:cTn id="56" dur="500" fill="hold"/>
+                                        <p:cTn id="52" dur="500" fill="hold"/>
                                         <p:tgtEl>
                                           <p:spTgt spid="3">
                                             <p:txEl>
@@ -14287,30 +14693,21 @@
                             </p:childTnLst>
                           </p:cTn>
                         </p:par>
-                      </p:childTnLst>
-                    </p:cTn>
-                  </p:par>
-                  <p:par>
-                    <p:cTn id="57" fill="hold">
-                      <p:stCondLst>
-                        <p:cond delay="indefinite"/>
-                      </p:stCondLst>
-                      <p:childTnLst>
                         <p:par>
-                          <p:cTn id="58" fill="hold">
+                          <p:cTn id="53" fill="hold">
                             <p:stCondLst>
-                              <p:cond delay="0"/>
+                              <p:cond delay="500"/>
                             </p:stCondLst>
                             <p:childTnLst>
                               <p:par>
-                                <p:cTn id="59" presetID="2" presetClass="entr" presetSubtype="4" fill="hold" nodeType="clickEffect">
+                                <p:cTn id="54" presetID="2" presetClass="entr" presetSubtype="4" fill="hold" nodeType="afterEffect">
                                   <p:stCondLst>
                                     <p:cond delay="0"/>
                                   </p:stCondLst>
                                   <p:childTnLst>
                                     <p:set>
                                       <p:cBhvr>
-                                        <p:cTn id="60" dur="1" fill="hold">
+                                        <p:cTn id="55" dur="1" fill="hold">
                                           <p:stCondLst>
                                             <p:cond delay="0"/>
                                           </p:stCondLst>
@@ -14332,7 +14729,7 @@
                                     </p:set>
                                     <p:anim calcmode="lin" valueType="num">
                                       <p:cBhvr additive="base">
-                                        <p:cTn id="61" dur="500" fill="hold"/>
+                                        <p:cTn id="56" dur="500" fill="hold"/>
                                         <p:tgtEl>
                                           <p:spTgt spid="3">
                                             <p:txEl>
@@ -14359,7 +14756,7 @@
                                     </p:anim>
                                     <p:anim calcmode="lin" valueType="num">
                                       <p:cBhvr additive="base">
-                                        <p:cTn id="62" dur="500" fill="hold"/>
+                                        <p:cTn id="57" dur="500" fill="hold"/>
                                         <p:tgtEl>
                                           <p:spTgt spid="3">
                                             <p:txEl>
@@ -14674,7 +15071,7 @@
           </a:effectLst>
           <a:extLst>
             <a:ext uri="{91240B29-F687-4f45-9708-019B960494DF}">
-              <a14:hiddenLine xmlns="" xmlns:a14="http://schemas.microsoft.com/office/drawing/2010/main" xmlns:p14="http://schemas.microsoft.com/office/powerpoint/2010/main" xmlns:a16="http://schemas.microsoft.com/office/drawing/2014/main" w="9525">
+              <a14:hiddenLine xmlns:a16="http://schemas.microsoft.com/office/drawing/2014/main" xmlns:p14="http://schemas.microsoft.com/office/powerpoint/2010/main" xmlns:a14="http://schemas.microsoft.com/office/drawing/2010/main" xmlns="" w="9525">
                 <a:solidFill>
                   <a:srgbClr val="000000"/>
                 </a:solidFill>
@@ -24769,6 +25166,15 @@
 </file>
 
 <file path=customXml/item2.xml><?xml version="1.0" encoding="utf-8"?>
+<p:properties xmlns:p="http://schemas.microsoft.com/office/2006/metadata/properties" xmlns:xsi="http://www.w3.org/2001/XMLSchema-instance" xmlns:pc="http://schemas.microsoft.com/office/infopath/2007/PartnerControls">
+  <documentManagement>
+    <Status xmlns="71af3243-3dd4-4a8d-8c0d-dd76da1f02a5">Not started</Status>
+    <MediaServiceKeyPoints xmlns="71af3243-3dd4-4a8d-8c0d-dd76da1f02a5" xsi:nil="true"/>
+  </documentManagement>
+</p:properties>
+</file>
+
+<file path=customXml/item3.xml><?xml version="1.0" encoding="utf-8"?>
 <ct:contentTypeSchema xmlns:ct="http://schemas.microsoft.com/office/2006/metadata/contentType" xmlns:ma="http://schemas.microsoft.com/office/2006/metadata/properties/metaAttributes" ct:_="" ma:_="" ma:contentTypeName="Document" ma:contentTypeID="0x01010079F111ED35F8CC479449609E8A0923A6" ma:contentTypeVersion="12" ma:contentTypeDescription="Create a new document." ma:contentTypeScope="" ma:versionID="a410dd7f93c95333ffa1b60ed6adedd1">
   <xsd:schema xmlns:xsd="http://www.w3.org/2001/XMLSchema" xmlns:xs="http://www.w3.org/2001/XMLSchema" xmlns:p="http://schemas.microsoft.com/office/2006/metadata/properties" xmlns:ns2="71af3243-3dd4-4a8d-8c0d-dd76da1f02a5" xmlns:ns3="16c05727-aa75-4e4a-9b5f-8a80a1165891" targetNamespace="http://schemas.microsoft.com/office/2006/metadata/properties" ma:root="true" ma:fieldsID="a936d9baba76aa3866493feff160faab" ns2:_="" ns3:_="">
     <xsd:import namespace="71af3243-3dd4-4a8d-8c0d-dd76da1f02a5"/>
@@ -24989,15 +25395,6 @@
 </ct:contentTypeSchema>
 </file>
 
-<file path=customXml/item3.xml><?xml version="1.0" encoding="utf-8"?>
-<p:properties xmlns:p="http://schemas.microsoft.com/office/2006/metadata/properties" xmlns:xsi="http://www.w3.org/2001/XMLSchema-instance" xmlns:pc="http://schemas.microsoft.com/office/infopath/2007/PartnerControls">
-  <documentManagement>
-    <Status xmlns="71af3243-3dd4-4a8d-8c0d-dd76da1f02a5">Not started</Status>
-    <MediaServiceKeyPoints xmlns="71af3243-3dd4-4a8d-8c0d-dd76da1f02a5" xsi:nil="true"/>
-  </documentManagement>
-</p:properties>
-</file>
-
 <file path=customXml/itemProps1.xml><?xml version="1.0" encoding="utf-8"?>
 <ds:datastoreItem xmlns:ds="http://schemas.openxmlformats.org/officeDocument/2006/customXml" ds:itemID="{64B270AB-C138-415C-897E-3C24487DECF1}">
   <ds:schemaRefs>
@@ -25007,6 +25404,16 @@
 </file>
 
 <file path=customXml/itemProps2.xml><?xml version="1.0" encoding="utf-8"?>
+<ds:datastoreItem xmlns:ds="http://schemas.openxmlformats.org/officeDocument/2006/customXml" ds:itemID="{2C4C00F4-06E9-43E3-AD97-88A857CEFA82}">
+  <ds:schemaRefs>
+    <ds:schemaRef ds:uri="http://schemas.microsoft.com/office/2006/metadata/properties"/>
+    <ds:schemaRef ds:uri="http://schemas.microsoft.com/office/infopath/2007/PartnerControls"/>
+    <ds:schemaRef ds:uri="71af3243-3dd4-4a8d-8c0d-dd76da1f02a5"/>
+  </ds:schemaRefs>
+</ds:datastoreItem>
+</file>
+
+<file path=customXml/itemProps3.xml><?xml version="1.0" encoding="utf-8"?>
 <ds:datastoreItem xmlns:ds="http://schemas.openxmlformats.org/officeDocument/2006/customXml" ds:itemID="{0585E981-8C91-4205-A0C3-C991F42B4C9E}">
   <ds:schemaRefs>
     <ds:schemaRef ds:uri="http://schemas.microsoft.com/office/2006/metadata/contentType"/>
@@ -25023,14 +25430,4 @@
     <ds:schemaRef ds:uri="http://schemas.microsoft.com/internal/obd"/>
   </ds:schemaRefs>
 </ds:datastoreItem>
-</file>
-
-<file path=customXml/itemProps3.xml><?xml version="1.0" encoding="utf-8"?>
-<ds:datastoreItem xmlns:ds="http://schemas.openxmlformats.org/officeDocument/2006/customXml" ds:itemID="{2C4C00F4-06E9-43E3-AD97-88A857CEFA82}">
-  <ds:schemaRefs>
-    <ds:schemaRef ds:uri="http://schemas.microsoft.com/office/2006/metadata/properties"/>
-    <ds:schemaRef ds:uri="http://schemas.microsoft.com/office/infopath/2007/PartnerControls"/>
-    <ds:schemaRef ds:uri="71af3243-3dd4-4a8d-8c0d-dd76da1f02a5"/>
-  </ds:schemaRefs>
-</ds:datastoreItem>
 </file>
</xml_diff>

<commit_message>
second session's Content added.
</commit_message>
<xml_diff>
--- a/git slides.pptx
+++ b/git slides.pptx
@@ -5,10 +5,10 @@
     <p:sldMasterId id="2147483660" r:id="rId4"/>
   </p:sldMasterIdLst>
   <p:notesMasterIdLst>
-    <p:notesMasterId r:id="rId17"/>
+    <p:notesMasterId r:id="rId22"/>
   </p:notesMasterIdLst>
   <p:handoutMasterIdLst>
-    <p:handoutMasterId r:id="rId18"/>
+    <p:handoutMasterId r:id="rId23"/>
   </p:handoutMasterIdLst>
   <p:sldIdLst>
     <p:sldId id="281" r:id="rId5"/>
@@ -23,6 +23,11 @@
     <p:sldId id="288" r:id="rId14"/>
     <p:sldId id="290" r:id="rId15"/>
     <p:sldId id="289" r:id="rId16"/>
+    <p:sldId id="291" r:id="rId17"/>
+    <p:sldId id="292" r:id="rId18"/>
+    <p:sldId id="293" r:id="rId19"/>
+    <p:sldId id="294" r:id="rId20"/>
+    <p:sldId id="296" r:id="rId21"/>
   </p:sldIdLst>
   <p:sldSz cx="12192000" cy="6858000"/>
   <p:notesSz cx="6858000" cy="9144000"/>
@@ -237,7 +242,7 @@
           <a:p>
             <a:fld id="{7FD03EC1-2B28-42FB-8498-2945B84C90C5}" type="datetimeFigureOut">
               <a:rPr lang="fa-IR" smtClean="0"/>
-              <a:t>26/07/1442</a:t>
+              <a:t>30/07/1442</a:t>
             </a:fld>
             <a:endParaRPr lang="fa-IR"/>
           </a:p>
@@ -414,7 +419,7 @@
           <a:p>
             <a:fld id="{AFD01546-198A-4195-BCF8-F0FF54C90E5E}" type="datetimeFigureOut">
               <a:rPr lang="en-US" smtClean="0"/>
-              <a:t>3/9/2021</a:t>
+              <a:t>3/13/2021</a:t>
             </a:fld>
             <a:endParaRPr lang="en-US" dirty="0"/>
           </a:p>
@@ -4790,6 +4795,1496 @@
 </p:notes>
 </file>
 
+<file path=ppt/notesSlides/notesSlide6.xml><?xml version="1.0" encoding="utf-8"?>
+<p:notes xmlns:a="http://schemas.openxmlformats.org/drawingml/2006/main" xmlns:r="http://schemas.openxmlformats.org/officeDocument/2006/relationships" xmlns:p="http://schemas.openxmlformats.org/presentationml/2006/main">
+  <p:cSld>
+    <p:spTree>
+      <p:nvGrpSpPr>
+        <p:cNvPr id="1" name=""/>
+        <p:cNvGrpSpPr/>
+        <p:nvPr/>
+      </p:nvGrpSpPr>
+      <p:grpSpPr>
+        <a:xfrm>
+          <a:off x="0" y="0"/>
+          <a:ext cx="0" cy="0"/>
+          <a:chOff x="0" y="0"/>
+          <a:chExt cx="0" cy="0"/>
+        </a:xfrm>
+      </p:grpSpPr>
+      <p:sp>
+        <p:nvSpPr>
+          <p:cNvPr id="2" name="Slide Image Placeholder 1"/>
+          <p:cNvSpPr>
+            <a:spLocks noGrp="1" noRot="1" noChangeAspect="1"/>
+          </p:cNvSpPr>
+          <p:nvPr>
+            <p:ph type="sldImg"/>
+          </p:nvPr>
+        </p:nvSpPr>
+        <p:spPr/>
+      </p:sp>
+      <p:sp>
+        <p:nvSpPr>
+          <p:cNvPr id="3" name="Notes Placeholder 2"/>
+          <p:cNvSpPr>
+            <a:spLocks noGrp="1"/>
+          </p:cNvSpPr>
+          <p:nvPr>
+            <p:ph type="body" idx="1"/>
+          </p:nvPr>
+        </p:nvSpPr>
+        <p:spPr/>
+        <p:txBody>
+          <a:bodyPr/>
+          <a:lstStyle/>
+          <a:p>
+            <a:pPr algn="r" rtl="1"/>
+            <a:r>
+              <a:rPr lang="fa-IR" dirty="0"/>
+              <a:t>+شاخه یا </a:t>
+            </a:r>
+            <a:r>
+              <a:rPr lang="fa-IR" dirty="0" err="1"/>
+              <a:t>شعبه‌سازی</a:t>
+            </a:r>
+            <a:r>
+              <a:rPr lang="fa-IR" dirty="0"/>
+              <a:t> (</a:t>
+            </a:r>
+            <a:r>
+              <a:rPr lang="en-US" dirty="0"/>
+              <a:t>Branching) </a:t>
+            </a:r>
+            <a:r>
+              <a:rPr lang="fa-IR" dirty="0"/>
+              <a:t>به معنی این است که شما از مسیر اصلی توسعه جدا شده و به </a:t>
+            </a:r>
+            <a:r>
+              <a:rPr lang="fa-IR" dirty="0" err="1"/>
+              <a:t>ادامهٔ</a:t>
+            </a:r>
+            <a:r>
+              <a:rPr lang="fa-IR" dirty="0"/>
+              <a:t> کار، بدون خرابی به بار آوردن در مسیر اصلی بپردازید.</a:t>
+            </a:r>
+          </a:p>
+          <a:p>
+            <a:pPr algn="r" rtl="1"/>
+            <a:endParaRPr lang="fa-IR" dirty="0"/>
+          </a:p>
+          <a:p>
+            <a:pPr algn="r" rtl="1"/>
+            <a:r>
+              <a:rPr lang="fa-IR" dirty="0"/>
+              <a:t>+وقتی یک </a:t>
+            </a:r>
+            <a:r>
+              <a:rPr lang="fa-IR" dirty="0" err="1"/>
+              <a:t>کامیت</a:t>
+            </a:r>
+            <a:r>
+              <a:rPr lang="fa-IR" dirty="0"/>
+              <a:t> </a:t>
+            </a:r>
+            <a:r>
+              <a:rPr lang="fa-IR" dirty="0" err="1"/>
+              <a:t>می‌سازید</a:t>
+            </a:r>
+            <a:r>
+              <a:rPr lang="fa-IR" dirty="0"/>
+              <a:t>، </a:t>
+            </a:r>
+            <a:r>
+              <a:rPr lang="fa-IR" dirty="0" err="1"/>
+              <a:t>گیت</a:t>
+            </a:r>
+            <a:r>
+              <a:rPr lang="fa-IR" dirty="0"/>
+              <a:t> یک </a:t>
+            </a:r>
+            <a:r>
+              <a:rPr lang="fa-IR" dirty="0" err="1"/>
+              <a:t>آبجکت</a:t>
+            </a:r>
+            <a:r>
+              <a:rPr lang="fa-IR" dirty="0"/>
+              <a:t> </a:t>
+            </a:r>
+            <a:r>
+              <a:rPr lang="fa-IR" dirty="0" err="1"/>
+              <a:t>کامیت</a:t>
+            </a:r>
+            <a:r>
+              <a:rPr lang="fa-IR" dirty="0"/>
+              <a:t> که شامل یک نشانگر به </a:t>
+            </a:r>
+            <a:r>
+              <a:rPr lang="fa-IR" dirty="0" err="1"/>
+              <a:t>اسنپ‌شات</a:t>
+            </a:r>
+            <a:r>
+              <a:rPr lang="fa-IR" dirty="0"/>
+              <a:t> </a:t>
+            </a:r>
+            <a:r>
+              <a:rPr lang="fa-IR" dirty="0" err="1"/>
+              <a:t>دربرگیرندهٔ</a:t>
+            </a:r>
+            <a:r>
+              <a:rPr lang="fa-IR" dirty="0"/>
+              <a:t> اطلاعات </a:t>
+            </a:r>
+            <a:r>
+              <a:rPr lang="fa-IR" dirty="0" err="1"/>
+              <a:t>صحنهٔ</a:t>
+            </a:r>
+            <a:r>
+              <a:rPr lang="fa-IR" dirty="0"/>
+              <a:t> شماست را ذخیره </a:t>
+            </a:r>
+            <a:r>
+              <a:rPr lang="fa-IR" dirty="0" err="1"/>
+              <a:t>می‌کند</a:t>
+            </a:r>
+            <a:r>
+              <a:rPr lang="fa-IR" dirty="0"/>
+              <a:t>. این </a:t>
+            </a:r>
+            <a:r>
+              <a:rPr lang="fa-IR" dirty="0" err="1"/>
+              <a:t>آبجکت</a:t>
+            </a:r>
+            <a:r>
+              <a:rPr lang="fa-IR" dirty="0"/>
+              <a:t> همچنین شامل نام نویسنده و آدرس ایمیل او، پیغامی که وارد </a:t>
+            </a:r>
+            <a:r>
+              <a:rPr lang="fa-IR" dirty="0" err="1"/>
+              <a:t>کرده‌اید</a:t>
+            </a:r>
+            <a:r>
+              <a:rPr lang="fa-IR" dirty="0"/>
+              <a:t> و یک نشانگر به </a:t>
+            </a:r>
+            <a:r>
+              <a:rPr lang="fa-IR" dirty="0" err="1"/>
+              <a:t>کامیت</a:t>
+            </a:r>
+            <a:r>
+              <a:rPr lang="fa-IR" dirty="0"/>
+              <a:t> یا </a:t>
+            </a:r>
+            <a:r>
+              <a:rPr lang="fa-IR" dirty="0" err="1"/>
+              <a:t>کامیت‌هایی</a:t>
+            </a:r>
+            <a:r>
+              <a:rPr lang="fa-IR" dirty="0"/>
+              <a:t> که مستقیماً قبل این </a:t>
+            </a:r>
+            <a:r>
+              <a:rPr lang="fa-IR" dirty="0" err="1"/>
+              <a:t>کامیت</a:t>
+            </a:r>
+            <a:r>
+              <a:rPr lang="fa-IR" dirty="0"/>
+              <a:t> (والد یا والدین) </a:t>
+            </a:r>
+            <a:r>
+              <a:rPr lang="fa-IR" dirty="0" err="1"/>
+              <a:t>آمده‌اند</a:t>
+            </a:r>
+            <a:r>
+              <a:rPr lang="fa-IR" dirty="0"/>
+              <a:t> است: صفر والد برای </a:t>
+            </a:r>
+            <a:r>
+              <a:rPr lang="fa-IR" dirty="0" err="1"/>
+              <a:t>کامیت</a:t>
+            </a:r>
+            <a:r>
+              <a:rPr lang="fa-IR" dirty="0"/>
+              <a:t> اولیه، یک والد برای یک </a:t>
+            </a:r>
+            <a:r>
+              <a:rPr lang="fa-IR" dirty="0" err="1"/>
+              <a:t>کامیت</a:t>
+            </a:r>
+            <a:r>
+              <a:rPr lang="fa-IR" dirty="0"/>
+              <a:t> معمولی و چند والد برای یک </a:t>
+            </a:r>
+            <a:r>
+              <a:rPr lang="fa-IR" dirty="0" err="1"/>
+              <a:t>کامیت</a:t>
+            </a:r>
+            <a:r>
+              <a:rPr lang="fa-IR" dirty="0"/>
+              <a:t> </a:t>
+            </a:r>
+            <a:r>
+              <a:rPr lang="fa-IR" dirty="0" err="1"/>
+              <a:t>مرج</a:t>
+            </a:r>
+            <a:r>
+              <a:rPr lang="fa-IR" dirty="0"/>
+              <a:t> حاصل یک یا چند </a:t>
+            </a:r>
+            <a:r>
+              <a:rPr lang="fa-IR" dirty="0" err="1"/>
+              <a:t>برنچ</a:t>
+            </a:r>
+            <a:r>
+              <a:rPr lang="fa-IR" dirty="0"/>
+              <a:t>.</a:t>
+            </a:r>
+          </a:p>
+          <a:p>
+            <a:pPr algn="r" rtl="1"/>
+            <a:r>
+              <a:rPr lang="fa-IR" dirty="0"/>
+              <a:t>وقتی </a:t>
+            </a:r>
+            <a:r>
+              <a:rPr lang="fa-IR" dirty="0" err="1"/>
+              <a:t>کامیتی</a:t>
+            </a:r>
+            <a:r>
+              <a:rPr lang="fa-IR" dirty="0"/>
+              <a:t> را با اجرای </a:t>
+            </a:r>
+            <a:r>
+              <a:rPr lang="en-US" dirty="0"/>
+              <a:t>git commit </a:t>
+            </a:r>
+            <a:r>
+              <a:rPr lang="fa-IR" dirty="0" err="1"/>
+              <a:t>می‌سازید</a:t>
+            </a:r>
+            <a:r>
+              <a:rPr lang="fa-IR" dirty="0"/>
+              <a:t>، </a:t>
+            </a:r>
+            <a:r>
+              <a:rPr lang="fa-IR" dirty="0" err="1"/>
+              <a:t>گیت</a:t>
+            </a:r>
+            <a:r>
+              <a:rPr lang="fa-IR" dirty="0"/>
+              <a:t> </a:t>
+            </a:r>
+            <a:r>
+              <a:rPr lang="fa-IR" dirty="0" err="1"/>
+              <a:t>همهٔ</a:t>
+            </a:r>
+            <a:r>
+              <a:rPr lang="fa-IR" dirty="0"/>
+              <a:t> </a:t>
+            </a:r>
+            <a:r>
+              <a:rPr lang="fa-IR" dirty="0" err="1"/>
+              <a:t>زیرپوشه‌ها</a:t>
+            </a:r>
+            <a:r>
+              <a:rPr lang="fa-IR" dirty="0"/>
+              <a:t> (در مثال فقط روت پروژه) را </a:t>
+            </a:r>
+            <a:r>
+              <a:rPr lang="fa-IR" dirty="0" err="1"/>
+              <a:t>چک‌سام</a:t>
+            </a:r>
+            <a:r>
+              <a:rPr lang="fa-IR" dirty="0"/>
+              <a:t> </a:t>
+            </a:r>
+            <a:r>
+              <a:rPr lang="fa-IR" dirty="0" err="1"/>
+              <a:t>می‌کند</a:t>
+            </a:r>
+            <a:r>
+              <a:rPr lang="fa-IR" dirty="0"/>
+              <a:t> و </a:t>
+            </a:r>
+            <a:r>
+              <a:rPr lang="fa-IR" dirty="0" err="1"/>
+              <a:t>آن‌ها</a:t>
+            </a:r>
+            <a:r>
+              <a:rPr lang="fa-IR" dirty="0"/>
+              <a:t> را به عنوان یک </a:t>
+            </a:r>
+            <a:r>
+              <a:rPr lang="fa-IR" dirty="0" err="1"/>
+              <a:t>آبجکت</a:t>
+            </a:r>
+            <a:r>
+              <a:rPr lang="fa-IR" dirty="0"/>
+              <a:t> درخت در مخزن </a:t>
+            </a:r>
+            <a:r>
+              <a:rPr lang="fa-IR" dirty="0" err="1"/>
+              <a:t>گیت</a:t>
+            </a:r>
+            <a:r>
+              <a:rPr lang="fa-IR" dirty="0"/>
+              <a:t> ذخیره </a:t>
+            </a:r>
+            <a:r>
+              <a:rPr lang="fa-IR" dirty="0" err="1"/>
+              <a:t>می‌کند</a:t>
+            </a:r>
+            <a:r>
+              <a:rPr lang="fa-IR" dirty="0"/>
+              <a:t>. سپس </a:t>
+            </a:r>
+            <a:r>
+              <a:rPr lang="fa-IR" dirty="0" err="1"/>
+              <a:t>گیت</a:t>
+            </a:r>
+            <a:r>
+              <a:rPr lang="fa-IR" dirty="0"/>
+              <a:t> یک </a:t>
+            </a:r>
+            <a:r>
+              <a:rPr lang="fa-IR" dirty="0" err="1"/>
+              <a:t>کامیت</a:t>
+            </a:r>
+            <a:r>
+              <a:rPr lang="fa-IR" dirty="0"/>
+              <a:t> </a:t>
+            </a:r>
+            <a:r>
+              <a:rPr lang="fa-IR" dirty="0" err="1"/>
+              <a:t>آبجکت</a:t>
+            </a:r>
+            <a:r>
+              <a:rPr lang="fa-IR" dirty="0"/>
+              <a:t> که </a:t>
+            </a:r>
+            <a:r>
+              <a:rPr lang="fa-IR" dirty="0" err="1"/>
+              <a:t>متادیتا</a:t>
+            </a:r>
+            <a:r>
+              <a:rPr lang="fa-IR" dirty="0"/>
+              <a:t> و </a:t>
+            </a:r>
+            <a:r>
+              <a:rPr lang="fa-IR" dirty="0" err="1"/>
+              <a:t>نشانگری</a:t>
+            </a:r>
+            <a:r>
+              <a:rPr lang="fa-IR" dirty="0"/>
+              <a:t> که به روت درخت پروژه دارد </a:t>
+            </a:r>
+            <a:r>
+              <a:rPr lang="fa-IR" dirty="0" err="1"/>
+              <a:t>می‌سازد</a:t>
+            </a:r>
+            <a:r>
+              <a:rPr lang="fa-IR" dirty="0"/>
+              <a:t> تا بتواند </a:t>
+            </a:r>
+            <a:r>
+              <a:rPr lang="fa-IR" dirty="0" err="1"/>
+              <a:t>اسنپ‌شات</a:t>
+            </a:r>
+            <a:r>
+              <a:rPr lang="fa-IR" dirty="0"/>
+              <a:t> پروژه را هنگامی که نیاز بود بازسازی کند.</a:t>
+            </a:r>
+          </a:p>
+          <a:p>
+            <a:pPr algn="r" rtl="1"/>
+            <a:endParaRPr lang="fa-IR" dirty="0"/>
+          </a:p>
+          <a:p>
+            <a:pPr algn="r" rtl="1"/>
+            <a:r>
+              <a:rPr lang="fa-IR" dirty="0"/>
+              <a:t>+یک </a:t>
+            </a:r>
+            <a:r>
+              <a:rPr lang="fa-IR" dirty="0" err="1"/>
+              <a:t>برنچ</a:t>
+            </a:r>
+            <a:r>
+              <a:rPr lang="fa-IR" dirty="0"/>
+              <a:t> </a:t>
+            </a:r>
+            <a:r>
+              <a:rPr lang="fa-IR" dirty="0" err="1"/>
+              <a:t>گیت</a:t>
+            </a:r>
+            <a:r>
+              <a:rPr lang="fa-IR" dirty="0"/>
+              <a:t> یک نشانگر </a:t>
+            </a:r>
+            <a:r>
+              <a:rPr lang="fa-IR" dirty="0" err="1"/>
+              <a:t>سبک‌وزن</a:t>
+            </a:r>
+            <a:r>
+              <a:rPr lang="fa-IR" dirty="0"/>
+              <a:t> قابل انتقال به یکی از این </a:t>
+            </a:r>
+            <a:r>
+              <a:rPr lang="fa-IR" dirty="0" err="1"/>
+              <a:t>کامیت‌هاست</a:t>
+            </a:r>
+            <a:r>
+              <a:rPr lang="fa-IR" dirty="0"/>
+              <a:t>. نام پیش‌‌فرض </a:t>
+            </a:r>
+            <a:r>
+              <a:rPr lang="fa-IR" dirty="0" err="1"/>
+              <a:t>برنچ</a:t>
+            </a:r>
+            <a:r>
+              <a:rPr lang="fa-IR" dirty="0"/>
+              <a:t> در </a:t>
+            </a:r>
+            <a:r>
+              <a:rPr lang="fa-IR" dirty="0" err="1"/>
+              <a:t>گیت</a:t>
+            </a:r>
+            <a:r>
+              <a:rPr lang="fa-IR" dirty="0"/>
+              <a:t> </a:t>
+            </a:r>
+            <a:r>
+              <a:rPr lang="en-US" dirty="0"/>
+              <a:t>master </a:t>
+            </a:r>
+            <a:r>
+              <a:rPr lang="fa-IR" dirty="0"/>
+              <a:t>است. همچنان که </a:t>
+            </a:r>
+            <a:r>
+              <a:rPr lang="fa-IR" dirty="0" err="1"/>
+              <a:t>کامیت</a:t>
+            </a:r>
+            <a:r>
+              <a:rPr lang="fa-IR" dirty="0"/>
+              <a:t> </a:t>
+            </a:r>
+            <a:r>
+              <a:rPr lang="fa-IR" dirty="0" err="1"/>
+              <a:t>می‌سازید</a:t>
+            </a:r>
+            <a:r>
+              <a:rPr lang="fa-IR" dirty="0"/>
+              <a:t>، یک </a:t>
+            </a:r>
+            <a:r>
+              <a:rPr lang="fa-IR" dirty="0" err="1"/>
+              <a:t>برنچ</a:t>
+            </a:r>
+            <a:r>
+              <a:rPr lang="fa-IR" dirty="0"/>
+              <a:t> </a:t>
+            </a:r>
+            <a:r>
+              <a:rPr lang="en-US" dirty="0"/>
+              <a:t>master </a:t>
+            </a:r>
+            <a:r>
+              <a:rPr lang="fa-IR" dirty="0" err="1"/>
+              <a:t>برایتان</a:t>
+            </a:r>
+            <a:r>
+              <a:rPr lang="fa-IR" dirty="0"/>
+              <a:t> ساخته </a:t>
+            </a:r>
+            <a:r>
+              <a:rPr lang="fa-IR" dirty="0" err="1"/>
+              <a:t>می‌شود</a:t>
+            </a:r>
+            <a:r>
+              <a:rPr lang="fa-IR" dirty="0"/>
+              <a:t> که به آخرین </a:t>
+            </a:r>
+            <a:r>
+              <a:rPr lang="fa-IR" dirty="0" err="1"/>
+              <a:t>کامیتی</a:t>
+            </a:r>
+            <a:r>
+              <a:rPr lang="fa-IR" dirty="0"/>
+              <a:t> که </a:t>
+            </a:r>
+            <a:r>
+              <a:rPr lang="fa-IR" dirty="0" err="1"/>
+              <a:t>ساخته‌اید</a:t>
+            </a:r>
+            <a:r>
+              <a:rPr lang="fa-IR" dirty="0"/>
+              <a:t> اشاره </a:t>
+            </a:r>
+            <a:r>
+              <a:rPr lang="fa-IR" dirty="0" err="1"/>
+              <a:t>می‌کند</a:t>
+            </a:r>
+            <a:r>
+              <a:rPr lang="fa-IR" dirty="0"/>
+              <a:t>. هر بار که </a:t>
+            </a:r>
+            <a:r>
+              <a:rPr lang="fa-IR" dirty="0" err="1"/>
+              <a:t>کامیت</a:t>
+            </a:r>
+            <a:r>
+              <a:rPr lang="fa-IR" dirty="0"/>
+              <a:t> </a:t>
+            </a:r>
+            <a:r>
+              <a:rPr lang="fa-IR" dirty="0" err="1"/>
+              <a:t>می‌کنید</a:t>
+            </a:r>
+            <a:r>
+              <a:rPr lang="fa-IR" dirty="0"/>
+              <a:t> نشانگر </a:t>
+            </a:r>
+            <a:r>
+              <a:rPr lang="fa-IR" dirty="0" err="1"/>
+              <a:t>برنچ</a:t>
+            </a:r>
+            <a:r>
+              <a:rPr lang="fa-IR" dirty="0"/>
+              <a:t> </a:t>
+            </a:r>
+            <a:r>
+              <a:rPr lang="en-US" dirty="0"/>
+              <a:t>master </a:t>
+            </a:r>
+            <a:r>
+              <a:rPr lang="fa-IR" dirty="0"/>
+              <a:t>به طور خودکار به جلو حرکت </a:t>
+            </a:r>
+            <a:r>
+              <a:rPr lang="fa-IR" dirty="0" err="1"/>
+              <a:t>می‌کند</a:t>
+            </a:r>
+            <a:r>
+              <a:rPr lang="fa-IR" dirty="0"/>
+              <a:t>.</a:t>
+            </a:r>
+          </a:p>
+          <a:p>
+            <a:pPr algn="r" rtl="1"/>
+            <a:endParaRPr lang="fa-IR" dirty="0"/>
+          </a:p>
+          <a:p>
+            <a:pPr algn="r" rtl="1"/>
+            <a:r>
+              <a:rPr lang="fa-IR" dirty="0"/>
+              <a:t>+انجام این کار یک نشانگر جدید برای شما </a:t>
+            </a:r>
+            <a:r>
+              <a:rPr lang="fa-IR" dirty="0" err="1"/>
+              <a:t>می‌سازد</a:t>
+            </a:r>
+            <a:r>
+              <a:rPr lang="fa-IR" dirty="0"/>
+              <a:t> تا آنرا به این سو و آن سو انتقال دهید. فرض بر این بگذاریم که </a:t>
+            </a:r>
+            <a:r>
+              <a:rPr lang="fa-IR" dirty="0" err="1"/>
+              <a:t>می‌خواهید</a:t>
+            </a:r>
+            <a:r>
+              <a:rPr lang="fa-IR" dirty="0"/>
+              <a:t> </a:t>
+            </a:r>
+            <a:r>
+              <a:rPr lang="fa-IR" dirty="0" err="1"/>
+              <a:t>برنچ</a:t>
+            </a:r>
+            <a:r>
+              <a:rPr lang="fa-IR" dirty="0"/>
+              <a:t> جدیدی با نام </a:t>
+            </a:r>
+            <a:r>
+              <a:rPr lang="en-US" dirty="0"/>
+              <a:t>testing </a:t>
+            </a:r>
+            <a:r>
+              <a:rPr lang="fa-IR" dirty="0"/>
+              <a:t>بسازید.</a:t>
+            </a:r>
+          </a:p>
+          <a:p>
+            <a:pPr algn="r" rtl="1"/>
+            <a:endParaRPr lang="fa-IR" dirty="0"/>
+          </a:p>
+          <a:p>
+            <a:pPr algn="r" rtl="1"/>
+            <a:r>
+              <a:rPr lang="fa-IR" dirty="0"/>
+              <a:t>+</a:t>
+            </a:r>
+            <a:r>
+              <a:rPr lang="fa-IR" dirty="0" err="1"/>
+              <a:t>گیت</a:t>
+            </a:r>
+            <a:r>
+              <a:rPr lang="fa-IR" dirty="0"/>
+              <a:t> نشانگر خاصی به نام </a:t>
+            </a:r>
+            <a:r>
+              <a:rPr lang="en-US" dirty="0"/>
+              <a:t>HEAD (</a:t>
+            </a:r>
+            <a:r>
+              <a:rPr lang="fa-IR" dirty="0"/>
+              <a:t>هد) را در خود دارد. به خاطر داشته باشید این مفهوم تفاوت زیادی با مفهوم </a:t>
+            </a:r>
+            <a:r>
+              <a:rPr lang="en-US" dirty="0"/>
+              <a:t>HEAD </a:t>
+            </a:r>
+            <a:r>
+              <a:rPr lang="fa-IR" dirty="0"/>
+              <a:t>در دیگر </a:t>
+            </a:r>
+            <a:r>
+              <a:rPr lang="en-US" dirty="0"/>
+              <a:t>VCS</a:t>
+            </a:r>
+            <a:r>
+              <a:rPr lang="fa-IR" dirty="0"/>
+              <a:t>ها، مانند </a:t>
+            </a:r>
+            <a:r>
+              <a:rPr lang="fa-IR" dirty="0" err="1"/>
+              <a:t>ساب‌ورژن</a:t>
+            </a:r>
+            <a:r>
+              <a:rPr lang="fa-IR" dirty="0"/>
+              <a:t> یا </a:t>
+            </a:r>
+            <a:r>
+              <a:rPr lang="en-US" dirty="0"/>
+              <a:t>CVS، </a:t>
+            </a:r>
+            <a:r>
+              <a:rPr lang="fa-IR" dirty="0"/>
+              <a:t>دارد که ممکن است از پیشتر به یاد داشته باشید. در </a:t>
+            </a:r>
+            <a:r>
+              <a:rPr lang="fa-IR" dirty="0" err="1"/>
+              <a:t>گیت</a:t>
+            </a:r>
+            <a:r>
+              <a:rPr lang="fa-IR" dirty="0"/>
+              <a:t>، هد </a:t>
+            </a:r>
+            <a:r>
+              <a:rPr lang="fa-IR" dirty="0" err="1"/>
+              <a:t>نشانگری</a:t>
+            </a:r>
+            <a:r>
+              <a:rPr lang="fa-IR" dirty="0"/>
+              <a:t> است که به </a:t>
+            </a:r>
+            <a:r>
+              <a:rPr lang="fa-IR" dirty="0" err="1"/>
+              <a:t>برنچ</a:t>
+            </a:r>
+            <a:r>
+              <a:rPr lang="fa-IR" dirty="0"/>
+              <a:t> محلی که روی آن هستید اشاره </a:t>
+            </a:r>
+            <a:r>
+              <a:rPr lang="fa-IR" dirty="0" err="1"/>
+              <a:t>می‌کند</a:t>
+            </a:r>
+            <a:r>
+              <a:rPr lang="fa-IR" dirty="0"/>
+              <a:t>. در مثالی که روی آن کار </a:t>
+            </a:r>
+            <a:r>
+              <a:rPr lang="fa-IR" dirty="0" err="1"/>
+              <a:t>می‌کنیم</a:t>
+            </a:r>
+            <a:r>
+              <a:rPr lang="fa-IR" dirty="0"/>
+              <a:t> شما هنوز روی </a:t>
+            </a:r>
+            <a:r>
+              <a:rPr lang="en-US" dirty="0"/>
+              <a:t>master </a:t>
+            </a:r>
+            <a:r>
+              <a:rPr lang="fa-IR" dirty="0"/>
+              <a:t>هستید. دستور </a:t>
+            </a:r>
+            <a:r>
+              <a:rPr lang="en-US" dirty="0"/>
+              <a:t>git branch </a:t>
+            </a:r>
+            <a:r>
+              <a:rPr lang="fa-IR" dirty="0"/>
+              <a:t>فقط یک </a:t>
+            </a:r>
+            <a:r>
+              <a:rPr lang="fa-IR" dirty="0" err="1"/>
+              <a:t>برنچ</a:t>
+            </a:r>
+            <a:r>
+              <a:rPr lang="fa-IR" dirty="0"/>
+              <a:t> جدید </a:t>
+            </a:r>
+            <a:r>
+              <a:rPr lang="fa-IR" i="1" dirty="0"/>
+              <a:t>ساخت</a:t>
+            </a:r>
+            <a:r>
+              <a:rPr lang="fa-IR" dirty="0"/>
+              <a:t> — به </a:t>
+            </a:r>
+            <a:r>
+              <a:rPr lang="fa-IR" dirty="0" err="1"/>
+              <a:t>برنچ</a:t>
+            </a:r>
+            <a:r>
+              <a:rPr lang="fa-IR" dirty="0"/>
+              <a:t> جدید نقل مکان نکرد.</a:t>
+            </a:r>
+          </a:p>
+          <a:p>
+            <a:pPr algn="r" rtl="1"/>
+            <a:endParaRPr lang="fa-IR" dirty="0"/>
+          </a:p>
+          <a:p>
+            <a:pPr algn="r" rtl="1"/>
+            <a:endParaRPr lang="fa-IR" dirty="0"/>
+          </a:p>
+        </p:txBody>
+      </p:sp>
+      <p:sp>
+        <p:nvSpPr>
+          <p:cNvPr id="4" name="Slide Number Placeholder 3"/>
+          <p:cNvSpPr>
+            <a:spLocks noGrp="1"/>
+          </p:cNvSpPr>
+          <p:nvPr>
+            <p:ph type="sldNum" sz="quarter" idx="5"/>
+          </p:nvPr>
+        </p:nvSpPr>
+        <p:spPr/>
+        <p:txBody>
+          <a:bodyPr/>
+          <a:lstStyle/>
+          <a:p>
+            <a:fld id="{2E6DE88F-1F85-4A27-9D34-D74A50E7B0DA}" type="slidenum">
+              <a:rPr lang="en-US" smtClean="0"/>
+              <a:t>13</a:t>
+            </a:fld>
+            <a:endParaRPr lang="en-US" dirty="0"/>
+          </a:p>
+        </p:txBody>
+      </p:sp>
+    </p:spTree>
+    <p:extLst>
+      <p:ext uri="{BB962C8B-B14F-4D97-AF65-F5344CB8AC3E}">
+        <p14:creationId xmlns:p14="http://schemas.microsoft.com/office/powerpoint/2010/main" val="2809838791"/>
+      </p:ext>
+    </p:extLst>
+  </p:cSld>
+  <p:clrMapOvr>
+    <a:masterClrMapping/>
+  </p:clrMapOvr>
+</p:notes>
+</file>
+
+<file path=ppt/notesSlides/notesSlide7.xml><?xml version="1.0" encoding="utf-8"?>
+<p:notes xmlns:a="http://schemas.openxmlformats.org/drawingml/2006/main" xmlns:r="http://schemas.openxmlformats.org/officeDocument/2006/relationships" xmlns:p="http://schemas.openxmlformats.org/presentationml/2006/main">
+  <p:cSld>
+    <p:spTree>
+      <p:nvGrpSpPr>
+        <p:cNvPr id="1" name=""/>
+        <p:cNvGrpSpPr/>
+        <p:nvPr/>
+      </p:nvGrpSpPr>
+      <p:grpSpPr>
+        <a:xfrm>
+          <a:off x="0" y="0"/>
+          <a:ext cx="0" cy="0"/>
+          <a:chOff x="0" y="0"/>
+          <a:chExt cx="0" cy="0"/>
+        </a:xfrm>
+      </p:grpSpPr>
+      <p:sp>
+        <p:nvSpPr>
+          <p:cNvPr id="2" name="Slide Image Placeholder 1"/>
+          <p:cNvSpPr>
+            <a:spLocks noGrp="1" noRot="1" noChangeAspect="1"/>
+          </p:cNvSpPr>
+          <p:nvPr>
+            <p:ph type="sldImg"/>
+          </p:nvPr>
+        </p:nvSpPr>
+        <p:spPr/>
+      </p:sp>
+      <p:sp>
+        <p:nvSpPr>
+          <p:cNvPr id="3" name="Notes Placeholder 2"/>
+          <p:cNvSpPr>
+            <a:spLocks noGrp="1"/>
+          </p:cNvSpPr>
+          <p:nvPr>
+            <p:ph type="body" idx="1"/>
+          </p:nvPr>
+        </p:nvSpPr>
+        <p:spPr/>
+        <p:txBody>
+          <a:bodyPr/>
+          <a:lstStyle/>
+          <a:p>
+            <a:endParaRPr lang="fa-IR" dirty="0"/>
+          </a:p>
+        </p:txBody>
+      </p:sp>
+      <p:sp>
+        <p:nvSpPr>
+          <p:cNvPr id="4" name="Slide Number Placeholder 3"/>
+          <p:cNvSpPr>
+            <a:spLocks noGrp="1"/>
+          </p:cNvSpPr>
+          <p:nvPr>
+            <p:ph type="sldNum" sz="quarter" idx="5"/>
+          </p:nvPr>
+        </p:nvSpPr>
+        <p:spPr/>
+        <p:txBody>
+          <a:bodyPr/>
+          <a:lstStyle/>
+          <a:p>
+            <a:fld id="{2E6DE88F-1F85-4A27-9D34-D74A50E7B0DA}" type="slidenum">
+              <a:rPr lang="en-US" smtClean="0"/>
+              <a:t>15</a:t>
+            </a:fld>
+            <a:endParaRPr lang="en-US" dirty="0"/>
+          </a:p>
+        </p:txBody>
+      </p:sp>
+    </p:spTree>
+    <p:extLst>
+      <p:ext uri="{BB962C8B-B14F-4D97-AF65-F5344CB8AC3E}">
+        <p14:creationId xmlns:p14="http://schemas.microsoft.com/office/powerpoint/2010/main" val="1111629540"/>
+      </p:ext>
+    </p:extLst>
+  </p:cSld>
+  <p:clrMapOvr>
+    <a:masterClrMapping/>
+  </p:clrMapOvr>
+</p:notes>
+</file>
+
+<file path=ppt/notesSlides/notesSlide8.xml><?xml version="1.0" encoding="utf-8"?>
+<p:notes xmlns:a="http://schemas.openxmlformats.org/drawingml/2006/main" xmlns:r="http://schemas.openxmlformats.org/officeDocument/2006/relationships" xmlns:p="http://schemas.openxmlformats.org/presentationml/2006/main">
+  <p:cSld>
+    <p:spTree>
+      <p:nvGrpSpPr>
+        <p:cNvPr id="1" name=""/>
+        <p:cNvGrpSpPr/>
+        <p:nvPr/>
+      </p:nvGrpSpPr>
+      <p:grpSpPr>
+        <a:xfrm>
+          <a:off x="0" y="0"/>
+          <a:ext cx="0" cy="0"/>
+          <a:chOff x="0" y="0"/>
+          <a:chExt cx="0" cy="0"/>
+        </a:xfrm>
+      </p:grpSpPr>
+      <p:sp>
+        <p:nvSpPr>
+          <p:cNvPr id="2" name="Slide Image Placeholder 1"/>
+          <p:cNvSpPr>
+            <a:spLocks noGrp="1" noRot="1" noChangeAspect="1"/>
+          </p:cNvSpPr>
+          <p:nvPr>
+            <p:ph type="sldImg"/>
+          </p:nvPr>
+        </p:nvSpPr>
+        <p:spPr/>
+      </p:sp>
+      <p:sp>
+        <p:nvSpPr>
+          <p:cNvPr id="3" name="Notes Placeholder 2"/>
+          <p:cNvSpPr>
+            <a:spLocks noGrp="1"/>
+          </p:cNvSpPr>
+          <p:nvPr>
+            <p:ph type="body" idx="1"/>
+          </p:nvPr>
+        </p:nvSpPr>
+        <p:spPr/>
+        <p:txBody>
+          <a:bodyPr/>
+          <a:lstStyle/>
+          <a:p>
+            <a:pPr algn="r" rtl="1"/>
+            <a:r>
+              <a:rPr lang="fa-IR" dirty="0"/>
+              <a:t>+این عملیات با رفتن به والد مشترک دو </a:t>
+            </a:r>
+            <a:r>
+              <a:rPr lang="fa-IR" dirty="0" err="1"/>
+              <a:t>برنچ</a:t>
+            </a:r>
+            <a:r>
+              <a:rPr lang="fa-IR" dirty="0"/>
+              <a:t> (آنکه رویش قرار دارید و آنکه رویش </a:t>
+            </a:r>
+            <a:r>
+              <a:rPr lang="fa-IR" dirty="0" err="1"/>
+              <a:t>ریبیس</a:t>
+            </a:r>
+            <a:r>
+              <a:rPr lang="fa-IR" dirty="0"/>
+              <a:t>‌ </a:t>
+            </a:r>
+            <a:r>
+              <a:rPr lang="fa-IR" dirty="0" err="1"/>
+              <a:t>می‌کنید</a:t>
+            </a:r>
+            <a:r>
+              <a:rPr lang="fa-IR" dirty="0"/>
+              <a:t>)، گرفتن </a:t>
+            </a:r>
+            <a:r>
+              <a:rPr lang="fa-IR" dirty="0" err="1"/>
+              <a:t>دیف</a:t>
+            </a:r>
+            <a:r>
+              <a:rPr lang="fa-IR" dirty="0"/>
+              <a:t> معرفی شده در هر </a:t>
+            </a:r>
+            <a:r>
+              <a:rPr lang="fa-IR" dirty="0" err="1"/>
+              <a:t>کامیت</a:t>
+            </a:r>
+            <a:r>
+              <a:rPr lang="fa-IR" dirty="0"/>
+              <a:t> </a:t>
+            </a:r>
+            <a:r>
+              <a:rPr lang="fa-IR" dirty="0" err="1"/>
+              <a:t>برنچی</a:t>
+            </a:r>
+            <a:r>
+              <a:rPr lang="fa-IR" dirty="0"/>
+              <a:t> که روی آن هستید، ذخیره آن </a:t>
+            </a:r>
+            <a:r>
+              <a:rPr lang="fa-IR" dirty="0" err="1"/>
+              <a:t>دیف‌ها</a:t>
+            </a:r>
+            <a:r>
+              <a:rPr lang="fa-IR" dirty="0"/>
+              <a:t> روی </a:t>
+            </a:r>
+            <a:r>
+              <a:rPr lang="fa-IR" dirty="0" err="1"/>
+              <a:t>فایل‌های</a:t>
+            </a:r>
+            <a:r>
+              <a:rPr lang="fa-IR" dirty="0"/>
+              <a:t> موقت، </a:t>
+            </a:r>
+            <a:r>
+              <a:rPr lang="fa-IR" dirty="0" err="1"/>
+              <a:t>بازنشانی</a:t>
+            </a:r>
+            <a:r>
+              <a:rPr lang="fa-IR" dirty="0"/>
+              <a:t> </a:t>
+            </a:r>
+            <a:r>
+              <a:rPr lang="fa-IR" dirty="0" err="1"/>
+              <a:t>برنچ</a:t>
+            </a:r>
+            <a:r>
+              <a:rPr lang="fa-IR" dirty="0"/>
+              <a:t> فعلی به </a:t>
+            </a:r>
+            <a:r>
+              <a:rPr lang="fa-IR" dirty="0" err="1"/>
+              <a:t>کامیت</a:t>
+            </a:r>
+            <a:r>
+              <a:rPr lang="fa-IR" dirty="0"/>
+              <a:t> </a:t>
+            </a:r>
+            <a:r>
+              <a:rPr lang="fa-IR" dirty="0" err="1"/>
+              <a:t>برنچی</a:t>
+            </a:r>
+            <a:r>
+              <a:rPr lang="fa-IR" dirty="0"/>
+              <a:t> که روی آن </a:t>
+            </a:r>
+            <a:r>
+              <a:rPr lang="fa-IR" dirty="0" err="1"/>
+              <a:t>ریبیس</a:t>
+            </a:r>
+            <a:r>
+              <a:rPr lang="fa-IR" dirty="0"/>
+              <a:t> </a:t>
+            </a:r>
+            <a:r>
+              <a:rPr lang="fa-IR" dirty="0" err="1"/>
+              <a:t>می‌کنید</a:t>
+            </a:r>
+            <a:r>
+              <a:rPr lang="fa-IR" dirty="0"/>
+              <a:t> و در نهایت اعمال به ترتیب تغییرات کار </a:t>
+            </a:r>
+            <a:r>
+              <a:rPr lang="fa-IR" dirty="0" err="1"/>
+              <a:t>می‌کند</a:t>
+            </a:r>
+            <a:r>
+              <a:rPr lang="fa-IR" dirty="0"/>
+              <a:t>.</a:t>
+            </a:r>
+          </a:p>
+          <a:p>
+            <a:pPr algn="r" rtl="1"/>
+            <a:endParaRPr lang="fa-IR" dirty="0"/>
+          </a:p>
+          <a:p>
+            <a:pPr algn="r" rtl="1"/>
+            <a:r>
+              <a:rPr lang="fa-IR" dirty="0"/>
+              <a:t>+حال که </a:t>
+            </a:r>
+            <a:r>
+              <a:rPr lang="fa-IR" dirty="0" err="1"/>
+              <a:t>ریبیس</a:t>
+            </a:r>
+            <a:r>
+              <a:rPr lang="fa-IR" dirty="0"/>
+              <a:t> و </a:t>
+            </a:r>
+            <a:r>
+              <a:rPr lang="fa-IR" dirty="0" err="1"/>
+              <a:t>مرج</a:t>
+            </a:r>
+            <a:r>
+              <a:rPr lang="fa-IR" dirty="0"/>
+              <a:t> را در عمل دیدید، ‌ممکن است به این فکر کنید که کدام بهتر است. پیش از اینکه به آن پاسخ دهیم بیایید کمی به عقب </a:t>
+            </a:r>
+            <a:r>
+              <a:rPr lang="fa-IR" dirty="0" err="1"/>
+              <a:t>بازگردیم</a:t>
+            </a:r>
+            <a:r>
+              <a:rPr lang="fa-IR" dirty="0"/>
+              <a:t> و به مبحث اینکه تاریخچه چه معنایی دارد بپردازیم.</a:t>
+            </a:r>
+          </a:p>
+          <a:p>
+            <a:pPr algn="r" rtl="1"/>
+            <a:r>
+              <a:rPr lang="fa-IR" dirty="0"/>
+              <a:t>از دیدگاهی </a:t>
+            </a:r>
+            <a:r>
+              <a:rPr lang="fa-IR" dirty="0" err="1"/>
+              <a:t>تاریخچهٔ</a:t>
+            </a:r>
+            <a:r>
+              <a:rPr lang="fa-IR" dirty="0"/>
+              <a:t> </a:t>
+            </a:r>
+            <a:r>
+              <a:rPr lang="fa-IR" dirty="0" err="1"/>
+              <a:t>کامیت</a:t>
+            </a:r>
+            <a:r>
+              <a:rPr lang="fa-IR" dirty="0"/>
+              <a:t>‌‌های مخزن شما </a:t>
+            </a:r>
+            <a:r>
+              <a:rPr lang="fa-IR" b="1" dirty="0"/>
+              <a:t>ثبت وقایع اتفاق افتاده است.</a:t>
+            </a:r>
+            <a:r>
+              <a:rPr lang="fa-IR" dirty="0"/>
+              <a:t> سندی تاریخی و </a:t>
+            </a:r>
+            <a:r>
+              <a:rPr lang="fa-IR" dirty="0" err="1"/>
+              <a:t>باارزش</a:t>
+            </a:r>
+            <a:r>
+              <a:rPr lang="fa-IR" dirty="0"/>
+              <a:t> است که نباید با آن خیلی بازی کرد. از این زاویه دید تغییر دادن </a:t>
+            </a:r>
+            <a:r>
+              <a:rPr lang="fa-IR" dirty="0" err="1"/>
+              <a:t>تاریخچهٔ</a:t>
+            </a:r>
+            <a:r>
+              <a:rPr lang="fa-IR" dirty="0"/>
+              <a:t> </a:t>
+            </a:r>
+            <a:r>
+              <a:rPr lang="fa-IR" dirty="0" err="1"/>
+              <a:t>کامیت‌ها</a:t>
+            </a:r>
+            <a:r>
+              <a:rPr lang="fa-IR" dirty="0"/>
+              <a:t> تقریباً تعریف را نقض </a:t>
+            </a:r>
+            <a:r>
+              <a:rPr lang="fa-IR" dirty="0" err="1"/>
+              <a:t>می‌کند</a:t>
+            </a:r>
+            <a:r>
+              <a:rPr lang="fa-IR" dirty="0"/>
+              <a:t>؛ شما در حال دروغ گفتن </a:t>
+            </a:r>
+            <a:r>
+              <a:rPr lang="fa-IR" dirty="0" err="1"/>
+              <a:t>دربارهٔ</a:t>
+            </a:r>
+            <a:r>
+              <a:rPr lang="fa-IR" dirty="0"/>
+              <a:t> اتفاقاتی هستید که واقعاً </a:t>
+            </a:r>
+            <a:r>
+              <a:rPr lang="fa-IR" dirty="0" err="1"/>
+              <a:t>افتاده‌اند</a:t>
+            </a:r>
+            <a:r>
+              <a:rPr lang="fa-IR" dirty="0"/>
+              <a:t>. پس اگر </a:t>
+            </a:r>
+            <a:r>
+              <a:rPr lang="fa-IR" dirty="0" err="1"/>
+              <a:t>دسته‌ای</a:t>
+            </a:r>
+            <a:r>
+              <a:rPr lang="fa-IR" dirty="0"/>
+              <a:t> از </a:t>
+            </a:r>
+            <a:r>
+              <a:rPr lang="fa-IR" dirty="0" err="1"/>
+              <a:t>مرج</a:t>
+            </a:r>
+            <a:r>
+              <a:rPr lang="fa-IR" dirty="0"/>
+              <a:t> </a:t>
+            </a:r>
+            <a:r>
+              <a:rPr lang="fa-IR" dirty="0" err="1"/>
+              <a:t>کامیت‌های</a:t>
+            </a:r>
+            <a:r>
+              <a:rPr lang="fa-IR" dirty="0"/>
+              <a:t> شلوغ داشته باشیم چه کنیم؟ اتفاقی است که افتاده و مخزن باید آنرا برای آیندگان نگه دارد.</a:t>
+            </a:r>
+          </a:p>
+          <a:p>
+            <a:pPr algn="r" rtl="1"/>
+            <a:r>
+              <a:rPr lang="fa-IR" dirty="0"/>
+              <a:t>در نقطه مقابل دیدگاهی است که </a:t>
+            </a:r>
+            <a:r>
+              <a:rPr lang="fa-IR" dirty="0" err="1"/>
+              <a:t>می‌گوید</a:t>
+            </a:r>
+            <a:r>
+              <a:rPr lang="fa-IR" dirty="0"/>
+              <a:t> </a:t>
+            </a:r>
+            <a:r>
+              <a:rPr lang="fa-IR" dirty="0" err="1"/>
+              <a:t>تاریخچهٔ</a:t>
+            </a:r>
+            <a:r>
+              <a:rPr lang="fa-IR" dirty="0"/>
+              <a:t> </a:t>
+            </a:r>
+            <a:r>
+              <a:rPr lang="fa-IR" dirty="0" err="1"/>
+              <a:t>کامیت‌ها</a:t>
+            </a:r>
+            <a:r>
+              <a:rPr lang="fa-IR" dirty="0"/>
+              <a:t> </a:t>
+            </a:r>
+            <a:r>
+              <a:rPr lang="fa-IR" b="1" dirty="0"/>
+              <a:t>داستان چگونگی ساخت </a:t>
+            </a:r>
+            <a:r>
+              <a:rPr lang="fa-IR" b="1" dirty="0" err="1"/>
+              <a:t>پروژهٔ</a:t>
+            </a:r>
+            <a:r>
+              <a:rPr lang="fa-IR" b="1" dirty="0"/>
+              <a:t> شما است.</a:t>
+            </a:r>
+            <a:r>
+              <a:rPr lang="fa-IR" dirty="0"/>
+              <a:t> پیش </a:t>
+            </a:r>
+            <a:r>
+              <a:rPr lang="fa-IR" dirty="0" err="1"/>
+              <a:t>نمی‌آید</a:t>
+            </a:r>
+            <a:r>
+              <a:rPr lang="fa-IR" dirty="0"/>
+              <a:t> که اولین </a:t>
+            </a:r>
+            <a:r>
+              <a:rPr lang="fa-IR" dirty="0" err="1"/>
+              <a:t>پیش‌نویس</a:t>
+            </a:r>
+            <a:r>
+              <a:rPr lang="fa-IR" dirty="0"/>
+              <a:t> یک کتاب و راهنمایی درباره اینکه «چرا </a:t>
+            </a:r>
+            <a:r>
+              <a:rPr lang="fa-IR" dirty="0" err="1"/>
+              <a:t>نرم‌افزارتان</a:t>
+            </a:r>
+            <a:r>
+              <a:rPr lang="fa-IR" dirty="0"/>
+              <a:t> مستحق </a:t>
+            </a:r>
+            <a:r>
+              <a:rPr lang="fa-IR" dirty="0" err="1"/>
+              <a:t>ویرایش‌های</a:t>
+            </a:r>
+            <a:r>
+              <a:rPr lang="fa-IR" dirty="0"/>
+              <a:t> محتاطانه است» منتشر کنید. افرادی که این دیدگاه را دارند از ابزارهایی مانند </a:t>
+            </a:r>
+            <a:r>
+              <a:rPr lang="en-US" dirty="0"/>
+              <a:t>rebase </a:t>
+            </a:r>
+            <a:r>
+              <a:rPr lang="fa-IR" dirty="0"/>
+              <a:t>و </a:t>
+            </a:r>
+            <a:r>
+              <a:rPr lang="en-US" dirty="0"/>
+              <a:t>filter-branch </a:t>
+            </a:r>
+            <a:r>
+              <a:rPr lang="fa-IR" dirty="0"/>
+              <a:t>استفاده </a:t>
+            </a:r>
+            <a:r>
+              <a:rPr lang="fa-IR" dirty="0" err="1"/>
+              <a:t>می‌کنند</a:t>
+            </a:r>
+            <a:r>
+              <a:rPr lang="fa-IR" dirty="0"/>
+              <a:t> تا داستان را به نحوی بسرایند که برای خوانندگان احتمالی پخته باشد.</a:t>
+            </a:r>
+          </a:p>
+          <a:p>
+            <a:pPr algn="r" rtl="1"/>
+            <a:r>
+              <a:rPr lang="fa-IR" dirty="0"/>
+              <a:t>حال برای جواب دادن به اینکه </a:t>
+            </a:r>
+            <a:r>
+              <a:rPr lang="fa-IR" dirty="0" err="1"/>
+              <a:t>مرج</a:t>
+            </a:r>
+            <a:r>
+              <a:rPr lang="fa-IR" dirty="0"/>
+              <a:t> بهتر است یا </a:t>
+            </a:r>
+            <a:r>
+              <a:rPr lang="fa-IR" dirty="0" err="1"/>
+              <a:t>ریبیس</a:t>
+            </a:r>
+            <a:r>
+              <a:rPr lang="fa-IR" dirty="0"/>
+              <a:t>: خوشبختانه ملاحظه </a:t>
+            </a:r>
+            <a:r>
+              <a:rPr lang="fa-IR" dirty="0" err="1"/>
+              <a:t>می‌کنید</a:t>
+            </a:r>
+            <a:r>
+              <a:rPr lang="fa-IR" dirty="0"/>
+              <a:t> که جواب دادن خیلی ساده نیست. </a:t>
+            </a:r>
+            <a:r>
+              <a:rPr lang="fa-IR" dirty="0" err="1"/>
+              <a:t>گیت</a:t>
+            </a:r>
+            <a:r>
+              <a:rPr lang="fa-IR" dirty="0"/>
+              <a:t> ابزار قدرتمندی است، به شما </a:t>
+            </a:r>
+            <a:r>
+              <a:rPr lang="fa-IR" dirty="0" err="1"/>
+              <a:t>اجازهٔ</a:t>
+            </a:r>
+            <a:r>
+              <a:rPr lang="fa-IR" dirty="0"/>
+              <a:t> انجام خیلی </a:t>
+            </a:r>
+            <a:r>
+              <a:rPr lang="fa-IR" dirty="0" err="1"/>
+              <a:t>کار‌ها</a:t>
+            </a:r>
+            <a:r>
+              <a:rPr lang="fa-IR" dirty="0"/>
+              <a:t> را به خصوص روی </a:t>
+            </a:r>
+            <a:r>
+              <a:rPr lang="fa-IR" dirty="0" err="1"/>
+              <a:t>تاریخچه‌تان</a:t>
+            </a:r>
+            <a:r>
+              <a:rPr lang="fa-IR" dirty="0"/>
+              <a:t> </a:t>
+            </a:r>
+            <a:r>
+              <a:rPr lang="fa-IR" dirty="0" err="1"/>
+              <a:t>می‌دهد</a:t>
+            </a:r>
+            <a:r>
+              <a:rPr lang="fa-IR" dirty="0"/>
+              <a:t>، اما هر تیم و هر پروژه متفاوت است. حال که </a:t>
+            </a:r>
+            <a:r>
+              <a:rPr lang="fa-IR" dirty="0" err="1"/>
+              <a:t>می‌دانید</a:t>
+            </a:r>
+            <a:r>
+              <a:rPr lang="fa-IR" dirty="0"/>
+              <a:t> چگونه </a:t>
+            </a:r>
+            <a:r>
+              <a:rPr lang="fa-IR" dirty="0" err="1"/>
+              <a:t>این‌ها</a:t>
+            </a:r>
+            <a:r>
+              <a:rPr lang="fa-IR" dirty="0"/>
+              <a:t> کار </a:t>
+            </a:r>
+            <a:r>
+              <a:rPr lang="fa-IR" dirty="0" err="1"/>
+              <a:t>می‌کنند</a:t>
+            </a:r>
+            <a:r>
+              <a:rPr lang="fa-IR" dirty="0"/>
+              <a:t>، به شما بستگی دارد که تصمیم بگیرید که کدام برای شرایط بخصوص شما بهترین است.</a:t>
+            </a:r>
+          </a:p>
+          <a:p>
+            <a:pPr algn="r" rtl="1"/>
+            <a:r>
+              <a:rPr lang="fa-IR" dirty="0"/>
+              <a:t>در کل بهترین حالت ممکن این است که تغییرات محلی را که اعمال </a:t>
+            </a:r>
+            <a:r>
+              <a:rPr lang="fa-IR" dirty="0" err="1"/>
+              <a:t>کرده‌اید</a:t>
+            </a:r>
+            <a:r>
+              <a:rPr lang="fa-IR" dirty="0"/>
+              <a:t> اما منتشر </a:t>
+            </a:r>
+            <a:r>
+              <a:rPr lang="fa-IR" dirty="0" err="1"/>
+              <a:t>نکرده‌اید</a:t>
+            </a:r>
+            <a:r>
+              <a:rPr lang="fa-IR" dirty="0"/>
+              <a:t> </a:t>
+            </a:r>
+            <a:r>
+              <a:rPr lang="fa-IR" dirty="0" err="1"/>
+              <a:t>ریبیس</a:t>
+            </a:r>
+            <a:r>
+              <a:rPr lang="fa-IR" dirty="0"/>
+              <a:t> کنید تا پیش از پوش </a:t>
+            </a:r>
+            <a:r>
+              <a:rPr lang="fa-IR" dirty="0" err="1"/>
+              <a:t>تاریخچهٔ</a:t>
+            </a:r>
+            <a:r>
+              <a:rPr lang="fa-IR" dirty="0"/>
+              <a:t> شما تمیز باشد، اما هرگز هیچ چیزی را که جایی پوش </a:t>
+            </a:r>
+            <a:r>
+              <a:rPr lang="fa-IR" dirty="0" err="1"/>
+              <a:t>کرده‌اید</a:t>
+            </a:r>
+            <a:r>
+              <a:rPr lang="fa-IR" dirty="0"/>
+              <a:t> </a:t>
+            </a:r>
+            <a:r>
+              <a:rPr lang="fa-IR" dirty="0" err="1"/>
+              <a:t>ریبیس</a:t>
+            </a:r>
+            <a:r>
+              <a:rPr lang="fa-IR" dirty="0"/>
+              <a:t> نکنید.</a:t>
+            </a:r>
+          </a:p>
+          <a:p>
+            <a:pPr algn="r" rtl="1"/>
+            <a:endParaRPr lang="fa-IR" dirty="0"/>
+          </a:p>
+        </p:txBody>
+      </p:sp>
+      <p:sp>
+        <p:nvSpPr>
+          <p:cNvPr id="4" name="Slide Number Placeholder 3"/>
+          <p:cNvSpPr>
+            <a:spLocks noGrp="1"/>
+          </p:cNvSpPr>
+          <p:nvPr>
+            <p:ph type="sldNum" sz="quarter" idx="5"/>
+          </p:nvPr>
+        </p:nvSpPr>
+        <p:spPr/>
+        <p:txBody>
+          <a:bodyPr/>
+          <a:lstStyle/>
+          <a:p>
+            <a:fld id="{2E6DE88F-1F85-4A27-9D34-D74A50E7B0DA}" type="slidenum">
+              <a:rPr lang="en-US" smtClean="0"/>
+              <a:t>16</a:t>
+            </a:fld>
+            <a:endParaRPr lang="en-US" dirty="0"/>
+          </a:p>
+        </p:txBody>
+      </p:sp>
+    </p:spTree>
+    <p:extLst>
+      <p:ext uri="{BB962C8B-B14F-4D97-AF65-F5344CB8AC3E}">
+        <p14:creationId xmlns:p14="http://schemas.microsoft.com/office/powerpoint/2010/main" val="3639252189"/>
+      </p:ext>
+    </p:extLst>
+  </p:cSld>
+  <p:clrMapOvr>
+    <a:masterClrMapping/>
+  </p:clrMapOvr>
+</p:notes>
+</file>
+
 <file path=ppt/slideLayouts/slideLayout1.xml><?xml version="1.0" encoding="utf-8"?>
 <p:sldLayout xmlns:a="http://schemas.openxmlformats.org/drawingml/2006/main" xmlns:r="http://schemas.openxmlformats.org/officeDocument/2006/relationships" xmlns:p="http://schemas.openxmlformats.org/presentationml/2006/main" type="title" preserve="1">
   <p:cSld name="Title Slide">
@@ -4975,7 +6470,7 @@
           <a:p>
             <a:fld id="{F69DA16B-231B-482D-AA37-04379E774E41}" type="datetime1">
               <a:rPr lang="en-US" smtClean="0"/>
-              <a:t>3/9/2021</a:t>
+              <a:t>3/13/2021</a:t>
             </a:fld>
             <a:endParaRPr lang="en-US" dirty="0"/>
           </a:p>
@@ -5280,7 +6775,7 @@
           <a:p>
             <a:fld id="{6B87A23E-6D85-42A1-9FCE-A4E4139C6C17}" type="datetime1">
               <a:rPr lang="en-US" smtClean="0"/>
-              <a:t>3/9/2021</a:t>
+              <a:t>3/13/2021</a:t>
             </a:fld>
             <a:endParaRPr lang="en-US" dirty="0"/>
           </a:p>
@@ -5474,7 +6969,7 @@
           <a:p>
             <a:fld id="{51102DFB-B4B6-4780-9A33-C6A670AA20CA}" type="datetime1">
               <a:rPr lang="en-US" smtClean="0"/>
-              <a:t>3/9/2021</a:t>
+              <a:t>3/13/2021</a:t>
             </a:fld>
             <a:endParaRPr lang="en-US" dirty="0"/>
           </a:p>
@@ -5737,7 +7232,7 @@
           <a:p>
             <a:fld id="{0F14DB28-C4AE-4945-8A67-EE7D88CC098D}" type="datetime1">
               <a:rPr lang="en-US" smtClean="0"/>
-              <a:t>3/9/2021</a:t>
+              <a:t>3/13/2021</a:t>
             </a:fld>
             <a:endParaRPr lang="en-US" dirty="0"/>
           </a:p>
@@ -6173,7 +7668,7 @@
           <a:p>
             <a:fld id="{7FE6CF1C-BBA1-4BC1-989A-F1939DCA95BE}" type="datetime1">
               <a:rPr lang="en-US" smtClean="0"/>
-              <a:t>3/9/2021</a:t>
+              <a:t>3/13/2021</a:t>
             </a:fld>
             <a:endParaRPr lang="en-US" dirty="0"/>
           </a:p>
@@ -6710,7 +8205,7 @@
           <a:p>
             <a:fld id="{BE9DBDA7-CBB9-4352-A3E0-31AA369760C6}" type="datetime1">
               <a:rPr lang="en-US" smtClean="0"/>
-              <a:t>3/9/2021</a:t>
+              <a:t>3/13/2021</a:t>
             </a:fld>
             <a:endParaRPr lang="en-US" dirty="0"/>
           </a:p>
@@ -7592,7 +9087,7 @@
           <a:p>
             <a:fld id="{C03B6EC0-93AF-49E2-B665-23BF8B570B6E}" type="datetime1">
               <a:rPr lang="en-US" smtClean="0"/>
-              <a:t>3/9/2021</a:t>
+              <a:t>3/13/2021</a:t>
             </a:fld>
             <a:endParaRPr lang="en-US" dirty="0"/>
           </a:p>
@@ -7803,7 +9298,7 @@
           <a:p>
             <a:fld id="{B5E59FB5-DE1C-440A-ADBA-9491B030D047}" type="datetime1">
               <a:rPr lang="en-US" smtClean="0"/>
-              <a:t>3/9/2021</a:t>
+              <a:t>3/13/2021</a:t>
             </a:fld>
             <a:endParaRPr lang="en-US" dirty="0"/>
           </a:p>
@@ -8056,7 +9551,7 @@
           <a:p>
             <a:fld id="{9376A69F-3D08-47DF-AFC5-4A8D0A483A95}" type="datetime1">
               <a:rPr lang="en-US" smtClean="0"/>
-              <a:t>3/9/2021</a:t>
+              <a:t>3/13/2021</a:t>
             </a:fld>
             <a:endParaRPr lang="en-US" dirty="0"/>
           </a:p>
@@ -8298,7 +9793,7 @@
           <a:p>
             <a:fld id="{522E65B4-4602-468F-9608-73B12AC05567}" type="datetime1">
               <a:rPr lang="en-US" smtClean="0"/>
-              <a:t>3/9/2021</a:t>
+              <a:t>3/13/2021</a:t>
             </a:fld>
             <a:endParaRPr lang="en-US" dirty="0"/>
           </a:p>
@@ -8781,7 +10276,7 @@
           <a:p>
             <a:fld id="{3303A7E3-514F-4065-959A-0A389058DEDF}" type="datetime1">
               <a:rPr lang="en-US" smtClean="0"/>
-              <a:t>3/9/2021</a:t>
+              <a:t>3/13/2021</a:t>
             </a:fld>
             <a:endParaRPr lang="en-US" dirty="0"/>
           </a:p>
@@ -8899,7 +10394,7 @@
           <a:p>
             <a:fld id="{3F0C4CA6-0101-4C6B-8A91-9EB945CCD130}" type="datetime1">
               <a:rPr lang="en-US" smtClean="0"/>
-              <a:t>3/9/2021</a:t>
+              <a:t>3/13/2021</a:t>
             </a:fld>
             <a:endParaRPr lang="en-US" dirty="0"/>
           </a:p>
@@ -8994,7 +10489,7 @@
           <a:p>
             <a:fld id="{822895EA-2C3F-471B-A818-ADC9D631BFD3}" type="datetime1">
               <a:rPr lang="en-US" smtClean="0"/>
-              <a:t>3/9/2021</a:t>
+              <a:t>3/13/2021</a:t>
             </a:fld>
             <a:endParaRPr lang="en-US" dirty="0"/>
           </a:p>
@@ -9249,7 +10744,7 @@
           <a:p>
             <a:fld id="{3F87215C-3807-44F5-93D0-93EF791DB7A6}" type="datetime1">
               <a:rPr lang="en-US" smtClean="0"/>
-              <a:t>3/9/2021</a:t>
+              <a:t>3/13/2021</a:t>
             </a:fld>
             <a:endParaRPr lang="en-US" dirty="0"/>
           </a:p>
@@ -9556,7 +11051,7 @@
           <a:p>
             <a:fld id="{F462F745-7E65-4FD8-8CE3-7E86A8F598A8}" type="datetime1">
               <a:rPr lang="en-US" smtClean="0"/>
-              <a:t>3/9/2021</a:t>
+              <a:t>3/13/2021</a:t>
             </a:fld>
             <a:endParaRPr lang="en-US" dirty="0"/>
           </a:p>
@@ -9791,7 +11286,7 @@
           <a:p>
             <a:fld id="{4F63B90C-B8D9-42C8-AB56-0F22C1FB1A38}" type="datetime1">
               <a:rPr lang="en-US" smtClean="0"/>
-              <a:t>3/9/2021</a:t>
+              <a:t>3/13/2021</a:t>
             </a:fld>
             <a:endParaRPr lang="en-US" dirty="0"/>
           </a:p>
@@ -14815,6 +16310,1736 @@
 </p:sld>
 </file>
 
+<file path=ppt/slides/slide13.xml><?xml version="1.0" encoding="utf-8"?>
+<p:sld xmlns:a="http://schemas.openxmlformats.org/drawingml/2006/main" xmlns:r="http://schemas.openxmlformats.org/officeDocument/2006/relationships" xmlns:p="http://schemas.openxmlformats.org/presentationml/2006/main">
+  <p:cSld>
+    <p:spTree>
+      <p:nvGrpSpPr>
+        <p:cNvPr id="1" name=""/>
+        <p:cNvGrpSpPr/>
+        <p:nvPr/>
+      </p:nvGrpSpPr>
+      <p:grpSpPr>
+        <a:xfrm>
+          <a:off x="0" y="0"/>
+          <a:ext cx="0" cy="0"/>
+          <a:chOff x="0" y="0"/>
+          <a:chExt cx="0" cy="0"/>
+        </a:xfrm>
+      </p:grpSpPr>
+      <p:sp>
+        <p:nvSpPr>
+          <p:cNvPr id="2" name="Title 1">
+            <a:extLst>
+              <a:ext uri="{FF2B5EF4-FFF2-40B4-BE49-F238E27FC236}">
+                <a16:creationId xmlns:a16="http://schemas.microsoft.com/office/drawing/2014/main" id="{98DA7885-0FE9-4AB2-AAB4-716BB3ED44A9}"/>
+              </a:ext>
+            </a:extLst>
+          </p:cNvPr>
+          <p:cNvSpPr>
+            <a:spLocks noGrp="1"/>
+          </p:cNvSpPr>
+          <p:nvPr>
+            <p:ph type="title"/>
+          </p:nvPr>
+        </p:nvSpPr>
+        <p:spPr/>
+        <p:txBody>
+          <a:bodyPr/>
+          <a:lstStyle/>
+          <a:p>
+            <a:r>
+              <a:rPr lang="fa-IR" dirty="0"/>
+              <a:t>شاخه( </a:t>
+            </a:r>
+            <a:r>
+              <a:rPr lang="en-US" dirty="0"/>
+              <a:t>Branch</a:t>
+            </a:r>
+            <a:r>
+              <a:rPr lang="fa-IR" dirty="0"/>
+              <a:t> )</a:t>
+            </a:r>
+          </a:p>
+        </p:txBody>
+      </p:sp>
+      <p:sp>
+        <p:nvSpPr>
+          <p:cNvPr id="3" name="Content Placeholder 2">
+            <a:extLst>
+              <a:ext uri="{FF2B5EF4-FFF2-40B4-BE49-F238E27FC236}">
+                <a16:creationId xmlns:a16="http://schemas.microsoft.com/office/drawing/2014/main" id="{DFC742B1-AE89-4CB1-AC4F-043FB28C75CB}"/>
+              </a:ext>
+            </a:extLst>
+          </p:cNvPr>
+          <p:cNvSpPr>
+            <a:spLocks noGrp="1"/>
+          </p:cNvSpPr>
+          <p:nvPr>
+            <p:ph idx="1"/>
+          </p:nvPr>
+        </p:nvSpPr>
+        <p:spPr/>
+        <p:txBody>
+          <a:bodyPr>
+            <a:normAutofit fontScale="77500" lnSpcReduction="20000"/>
+          </a:bodyPr>
+          <a:lstStyle/>
+          <a:p>
+            <a:r>
+              <a:rPr lang="fa-IR" dirty="0" err="1">
+                <a:effectLst/>
+                <a:latin typeface="Times New Roman" panose="02020603050405020304" pitchFamily="18" charset="0"/>
+                <a:cs typeface="B Lotus" panose="00000400000000000000" pitchFamily="2" charset="-78"/>
+              </a:rPr>
+              <a:t>شاخه‌سازی</a:t>
+            </a:r>
+            <a:r>
+              <a:rPr lang="fa-IR" dirty="0">
+                <a:effectLst/>
+                <a:latin typeface="Times New Roman" panose="02020603050405020304" pitchFamily="18" charset="0"/>
+                <a:cs typeface="B Lotus" panose="00000400000000000000" pitchFamily="2" charset="-78"/>
+              </a:rPr>
+              <a:t>( شعبه سازی ) به چه معناست؟</a:t>
+            </a:r>
+          </a:p>
+          <a:p>
+            <a:r>
+              <a:rPr lang="fa-IR" dirty="0" err="1">
+                <a:effectLst/>
+                <a:latin typeface="Times New Roman" panose="02020603050405020304" pitchFamily="18" charset="0"/>
+                <a:cs typeface="B Lotus" panose="00000400000000000000" pitchFamily="2" charset="-78"/>
+              </a:rPr>
+              <a:t>شاخه‌ها</a:t>
+            </a:r>
+            <a:r>
+              <a:rPr lang="fa-IR" dirty="0">
+                <a:effectLst/>
+                <a:latin typeface="Times New Roman" panose="02020603050405020304" pitchFamily="18" charset="0"/>
+                <a:cs typeface="B Lotus" panose="00000400000000000000" pitchFamily="2" charset="-78"/>
+              </a:rPr>
+              <a:t> در </a:t>
+            </a:r>
+            <a:r>
+              <a:rPr lang="fa-IR" dirty="0" err="1">
+                <a:effectLst/>
+                <a:latin typeface="Times New Roman" panose="02020603050405020304" pitchFamily="18" charset="0"/>
+                <a:cs typeface="B Lotus" panose="00000400000000000000" pitchFamily="2" charset="-78"/>
+              </a:rPr>
+              <a:t>گیت</a:t>
+            </a:r>
+            <a:r>
+              <a:rPr lang="fa-IR" dirty="0">
+                <a:effectLst/>
+                <a:latin typeface="Times New Roman" panose="02020603050405020304" pitchFamily="18" charset="0"/>
+                <a:cs typeface="B Lotus" panose="00000400000000000000" pitchFamily="2" charset="-78"/>
+              </a:rPr>
+              <a:t>:</a:t>
+            </a:r>
+          </a:p>
+          <a:p>
+            <a:pPr lvl="1">
+              <a:buFont typeface="Wingdings" panose="05000000000000000000" pitchFamily="2" charset="2"/>
+              <a:buChar char="§"/>
+            </a:pPr>
+            <a:r>
+              <a:rPr lang="fa-IR" dirty="0">
+                <a:effectLst/>
+                <a:latin typeface="Times New Roman" panose="02020603050405020304" pitchFamily="18" charset="0"/>
+                <a:cs typeface="B Lotus" panose="00000400000000000000" pitchFamily="2" charset="-78"/>
+              </a:rPr>
+              <a:t>در هنگام </a:t>
+            </a:r>
+            <a:r>
+              <a:rPr lang="fa-IR" dirty="0" err="1">
+                <a:effectLst/>
+                <a:latin typeface="Times New Roman" panose="02020603050405020304" pitchFamily="18" charset="0"/>
+                <a:cs typeface="B Lotus" panose="00000400000000000000" pitchFamily="2" charset="-78"/>
+              </a:rPr>
+              <a:t>کامیت</a:t>
+            </a:r>
+            <a:r>
+              <a:rPr lang="fa-IR" dirty="0">
+                <a:effectLst/>
+                <a:latin typeface="Times New Roman" panose="02020603050405020304" pitchFamily="18" charset="0"/>
+                <a:cs typeface="B Lotus" panose="00000400000000000000" pitchFamily="2" charset="-78"/>
+              </a:rPr>
+              <a:t> چه چیزی ذخیره میشود؟</a:t>
+            </a:r>
+          </a:p>
+          <a:p>
+            <a:pPr lvl="1">
+              <a:buFont typeface="Wingdings" panose="05000000000000000000" pitchFamily="2" charset="2"/>
+              <a:buChar char="§"/>
+            </a:pPr>
+            <a:r>
+              <a:rPr lang="fa-IR" dirty="0">
+                <a:effectLst/>
+                <a:latin typeface="Times New Roman" panose="02020603050405020304" pitchFamily="18" charset="0"/>
+                <a:cs typeface="B Lotus" panose="00000400000000000000" pitchFamily="2" charset="-78"/>
+              </a:rPr>
+              <a:t>شاخه در عمل چیست؟</a:t>
+            </a:r>
+          </a:p>
+          <a:p>
+            <a:pPr lvl="1">
+              <a:buFont typeface="Wingdings" panose="05000000000000000000" pitchFamily="2" charset="2"/>
+              <a:buChar char="§"/>
+            </a:pPr>
+            <a:r>
+              <a:rPr lang="fa-IR" dirty="0">
+                <a:effectLst/>
+                <a:latin typeface="Times New Roman" panose="02020603050405020304" pitchFamily="18" charset="0"/>
+                <a:cs typeface="B Lotus" panose="00000400000000000000" pitchFamily="2" charset="-78"/>
+              </a:rPr>
+              <a:t>وقتی یک </a:t>
+            </a:r>
+            <a:r>
+              <a:rPr lang="fa-IR" dirty="0" err="1">
+                <a:effectLst/>
+                <a:latin typeface="Times New Roman" panose="02020603050405020304" pitchFamily="18" charset="0"/>
+                <a:cs typeface="B Lotus" panose="00000400000000000000" pitchFamily="2" charset="-78"/>
+              </a:rPr>
+              <a:t>برنچ</a:t>
+            </a:r>
+            <a:r>
+              <a:rPr lang="fa-IR" dirty="0">
+                <a:effectLst/>
+                <a:latin typeface="Times New Roman" panose="02020603050405020304" pitchFamily="18" charset="0"/>
+                <a:cs typeface="B Lotus" panose="00000400000000000000" pitchFamily="2" charset="-78"/>
+              </a:rPr>
+              <a:t> جدید </a:t>
+            </a:r>
+            <a:r>
+              <a:rPr lang="fa-IR" dirty="0" err="1">
+                <a:effectLst/>
+                <a:latin typeface="Times New Roman" panose="02020603050405020304" pitchFamily="18" charset="0"/>
+                <a:cs typeface="B Lotus" panose="00000400000000000000" pitchFamily="2" charset="-78"/>
+              </a:rPr>
+              <a:t>می‌سازید</a:t>
+            </a:r>
+            <a:r>
+              <a:rPr lang="fa-IR" dirty="0">
+                <a:effectLst/>
+                <a:latin typeface="Times New Roman" panose="02020603050405020304" pitchFamily="18" charset="0"/>
+                <a:cs typeface="B Lotus" panose="00000400000000000000" pitchFamily="2" charset="-78"/>
+              </a:rPr>
+              <a:t> چه اتفاقی </a:t>
+            </a:r>
+            <a:r>
+              <a:rPr lang="fa-IR" dirty="0" err="1">
+                <a:effectLst/>
+                <a:latin typeface="Times New Roman" panose="02020603050405020304" pitchFamily="18" charset="0"/>
+                <a:cs typeface="B Lotus" panose="00000400000000000000" pitchFamily="2" charset="-78"/>
+              </a:rPr>
+              <a:t>می‌افتد</a:t>
+            </a:r>
+            <a:r>
+              <a:rPr lang="fa-IR" dirty="0">
+                <a:effectLst/>
+                <a:latin typeface="Times New Roman" panose="02020603050405020304" pitchFamily="18" charset="0"/>
+                <a:cs typeface="B Lotus" panose="00000400000000000000" pitchFamily="2" charset="-78"/>
+              </a:rPr>
+              <a:t>؟</a:t>
+            </a:r>
+          </a:p>
+          <a:p>
+            <a:pPr lvl="1">
+              <a:buFont typeface="Wingdings" panose="05000000000000000000" pitchFamily="2" charset="2"/>
+              <a:buChar char="§"/>
+            </a:pPr>
+            <a:r>
+              <a:rPr lang="fa-IR" dirty="0">
+                <a:effectLst/>
+                <a:latin typeface="Times New Roman" panose="02020603050405020304" pitchFamily="18" charset="0"/>
+                <a:cs typeface="B Lotus" panose="00000400000000000000" pitchFamily="2" charset="-78"/>
+              </a:rPr>
+              <a:t>چگونه </a:t>
+            </a:r>
+            <a:r>
+              <a:rPr lang="fa-IR" dirty="0" err="1">
+                <a:effectLst/>
+                <a:latin typeface="Times New Roman" panose="02020603050405020304" pitchFamily="18" charset="0"/>
+                <a:cs typeface="B Lotus" panose="00000400000000000000" pitchFamily="2" charset="-78"/>
+              </a:rPr>
+              <a:t>گیت</a:t>
+            </a:r>
+            <a:r>
+              <a:rPr lang="fa-IR" dirty="0">
+                <a:effectLst/>
+                <a:latin typeface="Times New Roman" panose="02020603050405020304" pitchFamily="18" charset="0"/>
+                <a:cs typeface="B Lotus" panose="00000400000000000000" pitchFamily="2" charset="-78"/>
+              </a:rPr>
+              <a:t> </a:t>
+            </a:r>
+            <a:r>
+              <a:rPr lang="fa-IR" dirty="0" err="1">
+                <a:effectLst/>
+                <a:latin typeface="Times New Roman" panose="02020603050405020304" pitchFamily="18" charset="0"/>
+                <a:cs typeface="B Lotus" panose="00000400000000000000" pitchFamily="2" charset="-78"/>
+              </a:rPr>
+              <a:t>می‌داند</a:t>
+            </a:r>
+            <a:r>
+              <a:rPr lang="fa-IR" dirty="0">
+                <a:effectLst/>
+                <a:latin typeface="Times New Roman" panose="02020603050405020304" pitchFamily="18" charset="0"/>
+                <a:cs typeface="B Lotus" panose="00000400000000000000" pitchFamily="2" charset="-78"/>
+              </a:rPr>
+              <a:t> که روی چه </a:t>
+            </a:r>
+            <a:r>
+              <a:rPr lang="fa-IR" dirty="0" err="1">
+                <a:effectLst/>
+                <a:latin typeface="Times New Roman" panose="02020603050405020304" pitchFamily="18" charset="0"/>
+                <a:cs typeface="B Lotus" panose="00000400000000000000" pitchFamily="2" charset="-78"/>
+              </a:rPr>
+              <a:t>شاخه‌ای</a:t>
+            </a:r>
+            <a:r>
+              <a:rPr lang="fa-IR" dirty="0">
+                <a:effectLst/>
+                <a:latin typeface="Times New Roman" panose="02020603050405020304" pitchFamily="18" charset="0"/>
+                <a:cs typeface="B Lotus" panose="00000400000000000000" pitchFamily="2" charset="-78"/>
+              </a:rPr>
+              <a:t> کار </a:t>
+            </a:r>
+            <a:r>
+              <a:rPr lang="fa-IR" dirty="0" err="1">
+                <a:effectLst/>
+                <a:latin typeface="Times New Roman" panose="02020603050405020304" pitchFamily="18" charset="0"/>
+                <a:cs typeface="B Lotus" panose="00000400000000000000" pitchFamily="2" charset="-78"/>
+              </a:rPr>
+              <a:t>می‌کنید</a:t>
+            </a:r>
+            <a:r>
+              <a:rPr lang="fa-IR" dirty="0">
+                <a:effectLst/>
+                <a:latin typeface="Times New Roman" panose="02020603050405020304" pitchFamily="18" charset="0"/>
+                <a:cs typeface="B Lotus" panose="00000400000000000000" pitchFamily="2" charset="-78"/>
+              </a:rPr>
+              <a:t>؟</a:t>
+            </a:r>
+          </a:p>
+          <a:p>
+            <a:r>
+              <a:rPr lang="fa-IR" dirty="0">
+                <a:effectLst/>
+                <a:latin typeface="Times New Roman" panose="02020603050405020304" pitchFamily="18" charset="0"/>
+                <a:cs typeface="B Lotus" panose="00000400000000000000" pitchFamily="2" charset="-78"/>
+              </a:rPr>
+              <a:t>ساختن شاخه جدید:</a:t>
+            </a:r>
+          </a:p>
+          <a:p>
+            <a:pPr marL="450000" lvl="1" indent="0">
+              <a:buNone/>
+            </a:pPr>
+            <a:r>
+              <a:rPr lang="fa-IR" dirty="0">
+                <a:effectLst/>
+                <a:latin typeface="Times New Roman" panose="02020603050405020304" pitchFamily="18" charset="0"/>
+                <a:cs typeface="B Lotus" panose="00000400000000000000" pitchFamily="2" charset="-78"/>
+              </a:rPr>
+              <a:t>برای ساخت یک شاخه جدید( </a:t>
+            </a:r>
+            <a:r>
+              <a:rPr lang="fa-IR" dirty="0" err="1">
+                <a:effectLst/>
+                <a:latin typeface="Times New Roman" panose="02020603050405020304" pitchFamily="18" charset="0"/>
+                <a:cs typeface="B Lotus" panose="00000400000000000000" pitchFamily="2" charset="-78"/>
+              </a:rPr>
+              <a:t>اشاره‌گر</a:t>
+            </a:r>
+            <a:r>
+              <a:rPr lang="fa-IR" dirty="0">
+                <a:effectLst/>
+                <a:latin typeface="Times New Roman" panose="02020603050405020304" pitchFamily="18" charset="0"/>
+                <a:cs typeface="B Lotus" panose="00000400000000000000" pitchFamily="2" charset="-78"/>
+              </a:rPr>
+              <a:t> به مکان کنونی </a:t>
+            </a:r>
+            <a:r>
+              <a:rPr lang="en-US" dirty="0">
+                <a:effectLst/>
+                <a:latin typeface="Times New Roman" panose="02020603050405020304" pitchFamily="18" charset="0"/>
+                <a:cs typeface="B Lotus" panose="00000400000000000000" pitchFamily="2" charset="-78"/>
+              </a:rPr>
+              <a:t>HEAD</a:t>
+            </a:r>
+            <a:r>
+              <a:rPr lang="fa-IR" dirty="0">
+                <a:effectLst/>
+                <a:latin typeface="Times New Roman" panose="02020603050405020304" pitchFamily="18" charset="0"/>
+                <a:cs typeface="B Lotus" panose="00000400000000000000" pitchFamily="2" charset="-78"/>
+              </a:rPr>
+              <a:t> ) کافی است از دستور </a:t>
+            </a:r>
+            <a:r>
+              <a:rPr lang="en-US" dirty="0">
+                <a:effectLst/>
+                <a:latin typeface="Consolas" panose="020B0609020204030204" pitchFamily="49" charset="0"/>
+                <a:cs typeface="B Lotus" panose="00000400000000000000" pitchFamily="2" charset="-78"/>
+              </a:rPr>
+              <a:t>git branch &lt;branch name&gt;</a:t>
+            </a:r>
+            <a:r>
+              <a:rPr lang="fa-IR" dirty="0">
+                <a:effectLst/>
+                <a:latin typeface="Consolas" panose="020B0609020204030204" pitchFamily="49" charset="0"/>
+                <a:cs typeface="B Lotus" panose="00000400000000000000" pitchFamily="2" charset="-78"/>
+              </a:rPr>
+              <a:t> </a:t>
+            </a:r>
+            <a:r>
+              <a:rPr lang="fa-IR" dirty="0">
+                <a:effectLst/>
+                <a:latin typeface="Times New Roman" panose="02020603050405020304" pitchFamily="18" charset="0"/>
+                <a:cs typeface="B Lotus" panose="00000400000000000000" pitchFamily="2" charset="-78"/>
+              </a:rPr>
+              <a:t>استفاده کنید تا یک شاخه جدید با نام دلخواه برای شما ساخته شود.</a:t>
+            </a:r>
+          </a:p>
+          <a:p>
+            <a:r>
+              <a:rPr lang="fa-IR" b="1" dirty="0">
+                <a:effectLst/>
+                <a:latin typeface="Times New Roman" panose="02020603050405020304" pitchFamily="18" charset="0"/>
+                <a:cs typeface="B Lotus" panose="00000400000000000000" pitchFamily="2" charset="-78"/>
+              </a:rPr>
+              <a:t>تعویض </a:t>
+            </a:r>
+            <a:r>
+              <a:rPr lang="fa-IR" b="1" dirty="0" err="1">
+                <a:effectLst/>
+                <a:latin typeface="Times New Roman" panose="02020603050405020304" pitchFamily="18" charset="0"/>
+                <a:cs typeface="B Lotus" panose="00000400000000000000" pitchFamily="2" charset="-78"/>
+              </a:rPr>
+              <a:t>شاخه‌ها</a:t>
+            </a:r>
+            <a:r>
+              <a:rPr lang="fa-IR" b="1" dirty="0">
+                <a:effectLst/>
+                <a:latin typeface="Times New Roman" panose="02020603050405020304" pitchFamily="18" charset="0"/>
+                <a:cs typeface="B Lotus" panose="00000400000000000000" pitchFamily="2" charset="-78"/>
+              </a:rPr>
+              <a:t>:</a:t>
+            </a:r>
+          </a:p>
+          <a:p>
+            <a:pPr marL="450000" lvl="1" indent="0">
+              <a:buNone/>
+            </a:pPr>
+            <a:r>
+              <a:rPr lang="fa-IR" dirty="0">
+                <a:effectLst/>
+                <a:latin typeface="Times New Roman" panose="02020603050405020304" pitchFamily="18" charset="0"/>
+                <a:cs typeface="B Lotus" panose="00000400000000000000" pitchFamily="2" charset="-78"/>
+              </a:rPr>
+              <a:t>برای تعویض یا </a:t>
+            </a:r>
+            <a:r>
+              <a:rPr lang="fa-IR" dirty="0" err="1">
+                <a:effectLst/>
+                <a:latin typeface="Times New Roman" panose="02020603050405020304" pitchFamily="18" charset="0"/>
+                <a:cs typeface="B Lotus" panose="00000400000000000000" pitchFamily="2" charset="-78"/>
+              </a:rPr>
+              <a:t>جابه‌جایی</a:t>
+            </a:r>
+            <a:r>
+              <a:rPr lang="fa-IR" dirty="0">
+                <a:effectLst/>
+                <a:latin typeface="Times New Roman" panose="02020603050405020304" pitchFamily="18" charset="0"/>
+                <a:cs typeface="B Lotus" panose="00000400000000000000" pitchFamily="2" charset="-78"/>
+              </a:rPr>
+              <a:t> به یک </a:t>
+            </a:r>
+            <a:r>
+              <a:rPr lang="fa-IR" dirty="0" err="1">
+                <a:effectLst/>
+                <a:latin typeface="Times New Roman" panose="02020603050405020304" pitchFamily="18" charset="0"/>
+                <a:cs typeface="B Lotus" panose="00000400000000000000" pitchFamily="2" charset="-78"/>
+              </a:rPr>
+              <a:t>برنچ</a:t>
+            </a:r>
+            <a:r>
+              <a:rPr lang="fa-IR" dirty="0">
+                <a:effectLst/>
+                <a:latin typeface="Times New Roman" panose="02020603050405020304" pitchFamily="18" charset="0"/>
+                <a:cs typeface="B Lotus" panose="00000400000000000000" pitchFamily="2" charset="-78"/>
+              </a:rPr>
+              <a:t> از پیش ساخته شده دستور </a:t>
+            </a:r>
+            <a:r>
+              <a:rPr lang="en-US" dirty="0">
+                <a:effectLst/>
+                <a:latin typeface="Consolas" panose="020B0609020204030204" pitchFamily="49" charset="0"/>
+                <a:cs typeface="B Lotus" panose="00000400000000000000" pitchFamily="2" charset="-78"/>
+              </a:rPr>
+              <a:t>git checkout</a:t>
+            </a:r>
+            <a:r>
+              <a:rPr lang="fa-IR" dirty="0">
+                <a:effectLst/>
+                <a:latin typeface="Consolas" panose="020B0609020204030204" pitchFamily="49" charset="0"/>
+                <a:cs typeface="B Lotus" panose="00000400000000000000" pitchFamily="2" charset="-78"/>
+              </a:rPr>
+              <a:t> </a:t>
+            </a:r>
+            <a:r>
+              <a:rPr lang="fa-IR" dirty="0">
+                <a:effectLst/>
+                <a:latin typeface="Times New Roman" panose="02020603050405020304" pitchFamily="18" charset="0"/>
+                <a:cs typeface="B Lotus" panose="00000400000000000000" pitchFamily="2" charset="-78"/>
+              </a:rPr>
+              <a:t>را اجرا </a:t>
+            </a:r>
+            <a:r>
+              <a:rPr lang="fa-IR" dirty="0" err="1">
+                <a:effectLst/>
+                <a:latin typeface="Times New Roman" panose="02020603050405020304" pitchFamily="18" charset="0"/>
+                <a:cs typeface="B Lotus" panose="00000400000000000000" pitchFamily="2" charset="-78"/>
+              </a:rPr>
+              <a:t>می‌کنید</a:t>
+            </a:r>
+            <a:r>
+              <a:rPr lang="fa-IR" dirty="0">
+                <a:effectLst/>
+                <a:latin typeface="Times New Roman" panose="02020603050405020304" pitchFamily="18" charset="0"/>
+                <a:cs typeface="B Lotus" panose="00000400000000000000" pitchFamily="2" charset="-78"/>
+              </a:rPr>
+              <a:t>.</a:t>
+            </a:r>
+          </a:p>
+          <a:p>
+            <a:pPr marL="36900" indent="0">
+              <a:buNone/>
+            </a:pPr>
+            <a:endParaRPr lang="fa-IR" dirty="0">
+              <a:effectLst/>
+              <a:latin typeface="Times New Roman" panose="02020603050405020304" pitchFamily="18" charset="0"/>
+              <a:cs typeface="B Lotus" panose="00000400000000000000" pitchFamily="2" charset="-78"/>
+            </a:endParaRPr>
+          </a:p>
+        </p:txBody>
+      </p:sp>
+      <p:sp>
+        <p:nvSpPr>
+          <p:cNvPr id="4" name="Slide Number Placeholder 3">
+            <a:extLst>
+              <a:ext uri="{FF2B5EF4-FFF2-40B4-BE49-F238E27FC236}">
+                <a16:creationId xmlns:a16="http://schemas.microsoft.com/office/drawing/2014/main" id="{36BA0AF3-97A5-4DC3-9A62-D7417A609B1B}"/>
+              </a:ext>
+            </a:extLst>
+          </p:cNvPr>
+          <p:cNvSpPr>
+            <a:spLocks noGrp="1"/>
+          </p:cNvSpPr>
+          <p:nvPr>
+            <p:ph type="sldNum" sz="quarter" idx="12"/>
+          </p:nvPr>
+        </p:nvSpPr>
+        <p:spPr/>
+        <p:txBody>
+          <a:bodyPr/>
+          <a:lstStyle/>
+          <a:p>
+            <a:pPr algn="ctr"/>
+            <a:fld id="{3A98EE3D-8CD1-4C3F-BD1C-C98C9596463C}" type="slidenum">
+              <a:rPr lang="en-US" smtClean="0"/>
+              <a:pPr algn="ctr"/>
+              <a:t>13</a:t>
+            </a:fld>
+            <a:endParaRPr lang="en-US" dirty="0"/>
+          </a:p>
+        </p:txBody>
+      </p:sp>
+      <p:pic>
+        <p:nvPicPr>
+          <p:cNvPr id="6" name="Picture 5">
+            <a:extLst>
+              <a:ext uri="{FF2B5EF4-FFF2-40B4-BE49-F238E27FC236}">
+                <a16:creationId xmlns:a16="http://schemas.microsoft.com/office/drawing/2014/main" id="{63DB239B-A158-40ED-A877-D8D03A31EC82}"/>
+              </a:ext>
+            </a:extLst>
+          </p:cNvPr>
+          <p:cNvPicPr>
+            <a:picLocks noChangeAspect="1"/>
+          </p:cNvPicPr>
+          <p:nvPr/>
+        </p:nvPicPr>
+        <p:blipFill>
+          <a:blip r:embed="rId3"/>
+          <a:stretch>
+            <a:fillRect/>
+          </a:stretch>
+        </p:blipFill>
+        <p:spPr>
+          <a:xfrm>
+            <a:off x="644769" y="1627437"/>
+            <a:ext cx="4821311" cy="2669802"/>
+          </a:xfrm>
+          <a:prstGeom prst="rect">
+            <a:avLst/>
+          </a:prstGeom>
+          <a:solidFill>
+            <a:srgbClr val="FFFFFF">
+              <a:shade val="85000"/>
+            </a:srgbClr>
+          </a:solidFill>
+          <a:ln w="190500" cap="rnd">
+            <a:noFill/>
+          </a:ln>
+          <a:effectLst>
+            <a:outerShdw blurRad="50000" algn="tl" rotWithShape="0">
+              <a:srgbClr val="000000">
+                <a:alpha val="41000"/>
+              </a:srgbClr>
+            </a:outerShdw>
+          </a:effectLst>
+          <a:scene3d>
+            <a:camera prst="orthographicFront"/>
+            <a:lightRig rig="twoPt" dir="t">
+              <a:rot lat="0" lon="0" rev="7800000"/>
+            </a:lightRig>
+          </a:scene3d>
+          <a:sp3d contourW="6350">
+            <a:bevelT w="50800" h="16510"/>
+            <a:contourClr>
+              <a:srgbClr val="C0C0C0"/>
+            </a:contourClr>
+          </a:sp3d>
+        </p:spPr>
+      </p:pic>
+    </p:spTree>
+    <p:extLst>
+      <p:ext uri="{BB962C8B-B14F-4D97-AF65-F5344CB8AC3E}">
+        <p14:creationId xmlns:p14="http://schemas.microsoft.com/office/powerpoint/2010/main" val="4108651822"/>
+      </p:ext>
+    </p:extLst>
+  </p:cSld>
+  <p:clrMapOvr>
+    <a:masterClrMapping/>
+  </p:clrMapOvr>
+</p:sld>
+</file>
+
+<file path=ppt/slides/slide14.xml><?xml version="1.0" encoding="utf-8"?>
+<p:sld xmlns:a="http://schemas.openxmlformats.org/drawingml/2006/main" xmlns:r="http://schemas.openxmlformats.org/officeDocument/2006/relationships" xmlns:p="http://schemas.openxmlformats.org/presentationml/2006/main">
+  <p:cSld>
+    <p:spTree>
+      <p:nvGrpSpPr>
+        <p:cNvPr id="1" name=""/>
+        <p:cNvGrpSpPr/>
+        <p:nvPr/>
+      </p:nvGrpSpPr>
+      <p:grpSpPr>
+        <a:xfrm>
+          <a:off x="0" y="0"/>
+          <a:ext cx="0" cy="0"/>
+          <a:chOff x="0" y="0"/>
+          <a:chExt cx="0" cy="0"/>
+        </a:xfrm>
+      </p:grpSpPr>
+      <p:sp>
+        <p:nvSpPr>
+          <p:cNvPr id="3" name="Content Placeholder 2">
+            <a:extLst>
+              <a:ext uri="{FF2B5EF4-FFF2-40B4-BE49-F238E27FC236}">
+                <a16:creationId xmlns:a16="http://schemas.microsoft.com/office/drawing/2014/main" id="{9885C031-4C93-4242-A788-789F932249B3}"/>
+              </a:ext>
+            </a:extLst>
+          </p:cNvPr>
+          <p:cNvSpPr>
+            <a:spLocks noGrp="1"/>
+          </p:cNvSpPr>
+          <p:nvPr>
+            <p:ph idx="1"/>
+          </p:nvPr>
+        </p:nvSpPr>
+        <p:spPr>
+          <a:xfrm>
+            <a:off x="966355" y="609600"/>
+            <a:ext cx="10301202" cy="5080001"/>
+          </a:xfrm>
+        </p:spPr>
+        <p:txBody>
+          <a:bodyPr/>
+          <a:lstStyle/>
+          <a:p>
+            <a:r>
+              <a:rPr lang="fa-IR" dirty="0">
+                <a:cs typeface="B Lotus" panose="00000400000000000000" pitchFamily="2" charset="-78"/>
+              </a:rPr>
+              <a:t>مزیت استفاده از </a:t>
+            </a:r>
+            <a:r>
+              <a:rPr lang="fa-IR" dirty="0" err="1">
+                <a:cs typeface="B Lotus" panose="00000400000000000000" pitchFamily="2" charset="-78"/>
+              </a:rPr>
+              <a:t>شاخه‌ها</a:t>
+            </a:r>
+            <a:r>
+              <a:rPr lang="fa-IR" dirty="0">
+                <a:cs typeface="B Lotus" panose="00000400000000000000" pitchFamily="2" charset="-78"/>
+              </a:rPr>
+              <a:t> چیست؟</a:t>
+            </a:r>
+          </a:p>
+        </p:txBody>
+      </p:sp>
+      <p:sp>
+        <p:nvSpPr>
+          <p:cNvPr id="5" name="Slide Number Placeholder 4">
+            <a:extLst>
+              <a:ext uri="{FF2B5EF4-FFF2-40B4-BE49-F238E27FC236}">
+                <a16:creationId xmlns:a16="http://schemas.microsoft.com/office/drawing/2014/main" id="{955D1FFB-8D8B-4134-84DD-E42DBE69DBB3}"/>
+              </a:ext>
+            </a:extLst>
+          </p:cNvPr>
+          <p:cNvSpPr>
+            <a:spLocks noGrp="1"/>
+          </p:cNvSpPr>
+          <p:nvPr>
+            <p:ph type="sldNum" sz="quarter" idx="12"/>
+          </p:nvPr>
+        </p:nvSpPr>
+        <p:spPr/>
+        <p:txBody>
+          <a:bodyPr/>
+          <a:lstStyle/>
+          <a:p>
+            <a:fld id="{3A98EE3D-8CD1-4C3F-BD1C-C98C9596463C}" type="slidenum">
+              <a:rPr lang="en-US" smtClean="0">
+                <a:latin typeface="B Tahoma" panose="020B0604030504040204" pitchFamily="34" charset="0"/>
+                <a:ea typeface="B Tahoma" panose="020B0604030504040204" pitchFamily="34" charset="0"/>
+                <a:cs typeface="B Tahoma" panose="020B0604030504040204" pitchFamily="34" charset="0"/>
+              </a:rPr>
+              <a:pPr/>
+              <a:t>14</a:t>
+            </a:fld>
+            <a:endParaRPr lang="en-US" dirty="0">
+              <a:latin typeface="B Tahoma" panose="020B0604030504040204" pitchFamily="34" charset="0"/>
+              <a:ea typeface="B Tahoma" panose="020B0604030504040204" pitchFamily="34" charset="0"/>
+              <a:cs typeface="B Tahoma" panose="020B0604030504040204" pitchFamily="34" charset="0"/>
+            </a:endParaRPr>
+          </a:p>
+        </p:txBody>
+      </p:sp>
+      <p:pic>
+        <p:nvPicPr>
+          <p:cNvPr id="11" name="Picture 10">
+            <a:extLst>
+              <a:ext uri="{FF2B5EF4-FFF2-40B4-BE49-F238E27FC236}">
+                <a16:creationId xmlns:a16="http://schemas.microsoft.com/office/drawing/2014/main" id="{1CB3BDF9-74B2-4BA6-A955-78E33B7E2200}"/>
+              </a:ext>
+            </a:extLst>
+          </p:cNvPr>
+          <p:cNvPicPr>
+            <a:picLocks noChangeAspect="1"/>
+          </p:cNvPicPr>
+          <p:nvPr/>
+        </p:nvPicPr>
+        <p:blipFill>
+          <a:blip r:embed="rId2"/>
+          <a:stretch>
+            <a:fillRect/>
+          </a:stretch>
+        </p:blipFill>
+        <p:spPr>
+          <a:xfrm>
+            <a:off x="2348346" y="244774"/>
+            <a:ext cx="4807702" cy="6371251"/>
+          </a:xfrm>
+          <a:prstGeom prst="rect">
+            <a:avLst/>
+          </a:prstGeom>
+        </p:spPr>
+      </p:pic>
+    </p:spTree>
+    <p:extLst>
+      <p:ext uri="{BB962C8B-B14F-4D97-AF65-F5344CB8AC3E}">
+        <p14:creationId xmlns:p14="http://schemas.microsoft.com/office/powerpoint/2010/main" val="1563069831"/>
+      </p:ext>
+    </p:extLst>
+  </p:cSld>
+  <p:clrMapOvr>
+    <a:masterClrMapping/>
+  </p:clrMapOvr>
+</p:sld>
+</file>
+
+<file path=ppt/slides/slide15.xml><?xml version="1.0" encoding="utf-8"?>
+<p:sld xmlns:a="http://schemas.openxmlformats.org/drawingml/2006/main" xmlns:r="http://schemas.openxmlformats.org/officeDocument/2006/relationships" xmlns:p="http://schemas.openxmlformats.org/presentationml/2006/main">
+  <p:cSld>
+    <p:spTree>
+      <p:nvGrpSpPr>
+        <p:cNvPr id="1" name=""/>
+        <p:cNvGrpSpPr/>
+        <p:nvPr/>
+      </p:nvGrpSpPr>
+      <p:grpSpPr>
+        <a:xfrm>
+          <a:off x="0" y="0"/>
+          <a:ext cx="0" cy="0"/>
+          <a:chOff x="0" y="0"/>
+          <a:chExt cx="0" cy="0"/>
+        </a:xfrm>
+      </p:grpSpPr>
+      <p:sp>
+        <p:nvSpPr>
+          <p:cNvPr id="2" name="Title 1">
+            <a:extLst>
+              <a:ext uri="{FF2B5EF4-FFF2-40B4-BE49-F238E27FC236}">
+                <a16:creationId xmlns:a16="http://schemas.microsoft.com/office/drawing/2014/main" id="{39AEFA51-8BC9-4771-9D23-793B72864BBA}"/>
+              </a:ext>
+            </a:extLst>
+          </p:cNvPr>
+          <p:cNvSpPr>
+            <a:spLocks noGrp="1"/>
+          </p:cNvSpPr>
+          <p:nvPr>
+            <p:ph type="title"/>
+          </p:nvPr>
+        </p:nvSpPr>
+        <p:spPr/>
+        <p:txBody>
+          <a:bodyPr/>
+          <a:lstStyle/>
+          <a:p>
+            <a:r>
+              <a:rPr lang="fa-IR" b="1" dirty="0"/>
+              <a:t>ادغام </a:t>
+            </a:r>
+            <a:r>
+              <a:rPr lang="fa-IR" b="1" dirty="0" err="1"/>
+              <a:t>شاخه‌ها</a:t>
+            </a:r>
+            <a:endParaRPr lang="fa-IR" dirty="0"/>
+          </a:p>
+        </p:txBody>
+      </p:sp>
+      <p:sp>
+        <p:nvSpPr>
+          <p:cNvPr id="3" name="Content Placeholder 2">
+            <a:extLst>
+              <a:ext uri="{FF2B5EF4-FFF2-40B4-BE49-F238E27FC236}">
+                <a16:creationId xmlns:a16="http://schemas.microsoft.com/office/drawing/2014/main" id="{CD52EEEA-A4A9-4896-B279-0B3A4A03E480}"/>
+              </a:ext>
+            </a:extLst>
+          </p:cNvPr>
+          <p:cNvSpPr>
+            <a:spLocks noGrp="1"/>
+          </p:cNvSpPr>
+          <p:nvPr>
+            <p:ph idx="1"/>
+          </p:nvPr>
+        </p:nvSpPr>
+        <p:spPr/>
+        <p:txBody>
+          <a:bodyPr/>
+          <a:lstStyle/>
+          <a:p>
+            <a:r>
+              <a:rPr lang="fa-IR" dirty="0">
+                <a:latin typeface="Times New Roman" panose="02020603050405020304" pitchFamily="18" charset="0"/>
+                <a:cs typeface="B Lotus" panose="00000400000000000000" pitchFamily="2" charset="-78"/>
+              </a:rPr>
+              <a:t>چگونه </a:t>
+            </a:r>
+            <a:r>
+              <a:rPr lang="fa-IR" dirty="0" err="1">
+                <a:latin typeface="Times New Roman" panose="02020603050405020304" pitchFamily="18" charset="0"/>
+                <a:cs typeface="B Lotus" panose="00000400000000000000" pitchFamily="2" charset="-78"/>
+              </a:rPr>
+              <a:t>شاخه‌ها</a:t>
+            </a:r>
+            <a:r>
+              <a:rPr lang="fa-IR" dirty="0">
+                <a:latin typeface="Times New Roman" panose="02020603050405020304" pitchFamily="18" charset="0"/>
+                <a:cs typeface="B Lotus" panose="00000400000000000000" pitchFamily="2" charset="-78"/>
+              </a:rPr>
+              <a:t> را با هم ادغام کنیم؟</a:t>
+            </a:r>
+          </a:p>
+          <a:p>
+            <a:pPr marL="450000" lvl="1" indent="0">
+              <a:buNone/>
+            </a:pPr>
+            <a:r>
+              <a:rPr lang="fa-IR" dirty="0">
+                <a:latin typeface="Times New Roman" panose="02020603050405020304" pitchFamily="18" charset="0"/>
+                <a:cs typeface="B Lotus" panose="00000400000000000000" pitchFamily="2" charset="-78"/>
+              </a:rPr>
+              <a:t>برای ادغام شاخه «الف» با شاخه «ب» ابتدا به شاخه «ب» تغییر شاخه </a:t>
+            </a:r>
+            <a:r>
+              <a:rPr lang="fa-IR" dirty="0" err="1">
+                <a:latin typeface="Times New Roman" panose="02020603050405020304" pitchFamily="18" charset="0"/>
+                <a:cs typeface="B Lotus" panose="00000400000000000000" pitchFamily="2" charset="-78"/>
+              </a:rPr>
+              <a:t>می‌دهیم</a:t>
+            </a:r>
+            <a:r>
+              <a:rPr lang="fa-IR" dirty="0">
+                <a:latin typeface="Times New Roman" panose="02020603050405020304" pitchFamily="18" charset="0"/>
+                <a:cs typeface="B Lotus" panose="00000400000000000000" pitchFamily="2" charset="-78"/>
+              </a:rPr>
+              <a:t> و سپس با استفاده از دستور</a:t>
+            </a:r>
+            <a:br>
+              <a:rPr lang="fa-IR" dirty="0">
+                <a:latin typeface="Times New Roman" panose="02020603050405020304" pitchFamily="18" charset="0"/>
+                <a:cs typeface="B Lotus" panose="00000400000000000000" pitchFamily="2" charset="-78"/>
+              </a:rPr>
+            </a:br>
+            <a:r>
+              <a:rPr lang="fa-IR" dirty="0">
+                <a:latin typeface="Times New Roman" panose="02020603050405020304" pitchFamily="18" charset="0"/>
+                <a:cs typeface="B Lotus" panose="00000400000000000000" pitchFamily="2" charset="-78"/>
+              </a:rPr>
+              <a:t> </a:t>
+            </a:r>
+            <a:r>
+              <a:rPr lang="en-US" dirty="0">
+                <a:latin typeface="Consolas" panose="020B0609020204030204" pitchFamily="49" charset="0"/>
+                <a:cs typeface="B Lotus" panose="00000400000000000000" pitchFamily="2" charset="-78"/>
+              </a:rPr>
+              <a:t>git merge &lt;branch&gt;</a:t>
+            </a:r>
+            <a:r>
+              <a:rPr lang="fa-IR" dirty="0">
+                <a:latin typeface="Consolas" panose="020B0609020204030204" pitchFamily="49" charset="0"/>
+                <a:cs typeface="B Lotus" panose="00000400000000000000" pitchFamily="2" charset="-78"/>
+              </a:rPr>
+              <a:t> </a:t>
+            </a:r>
+            <a:r>
+              <a:rPr lang="fa-IR" dirty="0" err="1">
+                <a:latin typeface="Times New Roman" panose="02020603050405020304" pitchFamily="18" charset="0"/>
+                <a:cs typeface="B Lotus" panose="00000400000000000000" pitchFamily="2" charset="-78"/>
+              </a:rPr>
+              <a:t>شاخه‌ی</a:t>
+            </a:r>
+            <a:r>
+              <a:rPr lang="fa-IR" dirty="0">
+                <a:latin typeface="Times New Roman" panose="02020603050405020304" pitchFamily="18" charset="0"/>
+                <a:cs typeface="B Lotus" panose="00000400000000000000" pitchFamily="2" charset="-78"/>
+              </a:rPr>
+              <a:t> الف را به </a:t>
+            </a:r>
+            <a:r>
+              <a:rPr lang="fa-IR" dirty="0" err="1">
+                <a:latin typeface="Times New Roman" panose="02020603050405020304" pitchFamily="18" charset="0"/>
+                <a:cs typeface="B Lotus" panose="00000400000000000000" pitchFamily="2" charset="-78"/>
+              </a:rPr>
+              <a:t>شاخه‌ی</a:t>
+            </a:r>
+            <a:r>
+              <a:rPr lang="fa-IR" dirty="0">
+                <a:latin typeface="Times New Roman" panose="02020603050405020304" pitchFamily="18" charset="0"/>
+                <a:cs typeface="B Lotus" panose="00000400000000000000" pitchFamily="2" charset="-78"/>
+              </a:rPr>
+              <a:t> ب ادغام </a:t>
+            </a:r>
+            <a:r>
+              <a:rPr lang="fa-IR" dirty="0" err="1">
+                <a:latin typeface="Times New Roman" panose="02020603050405020304" pitchFamily="18" charset="0"/>
+                <a:cs typeface="B Lotus" panose="00000400000000000000" pitchFamily="2" charset="-78"/>
+              </a:rPr>
+              <a:t>می‌کنیم</a:t>
+            </a:r>
+            <a:r>
+              <a:rPr lang="fa-IR" dirty="0">
+                <a:latin typeface="Times New Roman" panose="02020603050405020304" pitchFamily="18" charset="0"/>
+                <a:cs typeface="B Lotus" panose="00000400000000000000" pitchFamily="2" charset="-78"/>
+              </a:rPr>
+              <a:t>.</a:t>
+            </a:r>
+          </a:p>
+        </p:txBody>
+      </p:sp>
+      <p:sp>
+        <p:nvSpPr>
+          <p:cNvPr id="4" name="Slide Number Placeholder 3">
+            <a:extLst>
+              <a:ext uri="{FF2B5EF4-FFF2-40B4-BE49-F238E27FC236}">
+                <a16:creationId xmlns:a16="http://schemas.microsoft.com/office/drawing/2014/main" id="{3B1BDFF9-818C-4776-80A2-FF38C558E8BA}"/>
+              </a:ext>
+            </a:extLst>
+          </p:cNvPr>
+          <p:cNvSpPr>
+            <a:spLocks noGrp="1"/>
+          </p:cNvSpPr>
+          <p:nvPr>
+            <p:ph type="sldNum" sz="quarter" idx="12"/>
+          </p:nvPr>
+        </p:nvSpPr>
+        <p:spPr/>
+        <p:txBody>
+          <a:bodyPr/>
+          <a:lstStyle/>
+          <a:p>
+            <a:pPr algn="ctr"/>
+            <a:fld id="{3A98EE3D-8CD1-4C3F-BD1C-C98C9596463C}" type="slidenum">
+              <a:rPr lang="en-US" smtClean="0"/>
+              <a:pPr algn="ctr"/>
+              <a:t>15</a:t>
+            </a:fld>
+            <a:endParaRPr lang="en-US" dirty="0"/>
+          </a:p>
+        </p:txBody>
+      </p:sp>
+      <p:pic>
+        <p:nvPicPr>
+          <p:cNvPr id="6" name="Picture 5">
+            <a:extLst>
+              <a:ext uri="{FF2B5EF4-FFF2-40B4-BE49-F238E27FC236}">
+                <a16:creationId xmlns:a16="http://schemas.microsoft.com/office/drawing/2014/main" id="{319CD845-AED1-4170-B3A2-3A52A61A5155}"/>
+              </a:ext>
+            </a:extLst>
+          </p:cNvPr>
+          <p:cNvPicPr>
+            <a:picLocks noChangeAspect="1"/>
+          </p:cNvPicPr>
+          <p:nvPr/>
+        </p:nvPicPr>
+        <p:blipFill>
+          <a:blip r:embed="rId3"/>
+          <a:stretch>
+            <a:fillRect/>
+          </a:stretch>
+        </p:blipFill>
+        <p:spPr>
+          <a:xfrm>
+            <a:off x="7268913" y="3446523"/>
+            <a:ext cx="4511538" cy="2148620"/>
+          </a:xfrm>
+          <a:prstGeom prst="rect">
+            <a:avLst/>
+          </a:prstGeom>
+          <a:solidFill>
+            <a:srgbClr val="FFFFFF">
+              <a:shade val="85000"/>
+            </a:srgbClr>
+          </a:solidFill>
+          <a:ln w="190500" cap="rnd">
+            <a:noFill/>
+          </a:ln>
+          <a:effectLst>
+            <a:outerShdw blurRad="50000" algn="tl" rotWithShape="0">
+              <a:srgbClr val="000000">
+                <a:alpha val="41000"/>
+              </a:srgbClr>
+            </a:outerShdw>
+          </a:effectLst>
+          <a:scene3d>
+            <a:camera prst="orthographicFront"/>
+            <a:lightRig rig="twoPt" dir="t">
+              <a:rot lat="0" lon="0" rev="7800000"/>
+            </a:lightRig>
+          </a:scene3d>
+          <a:sp3d contourW="6350">
+            <a:bevelT w="50800" h="16510"/>
+            <a:contourClr>
+              <a:srgbClr val="C0C0C0"/>
+            </a:contourClr>
+          </a:sp3d>
+        </p:spPr>
+      </p:pic>
+      <p:pic>
+        <p:nvPicPr>
+          <p:cNvPr id="8" name="Picture 7">
+            <a:extLst>
+              <a:ext uri="{FF2B5EF4-FFF2-40B4-BE49-F238E27FC236}">
+                <a16:creationId xmlns:a16="http://schemas.microsoft.com/office/drawing/2014/main" id="{14DE7BC8-88F9-458C-900A-A3B6837A4881}"/>
+              </a:ext>
+            </a:extLst>
+          </p:cNvPr>
+          <p:cNvPicPr>
+            <a:picLocks noChangeAspect="1"/>
+          </p:cNvPicPr>
+          <p:nvPr/>
+        </p:nvPicPr>
+        <p:blipFill>
+          <a:blip r:embed="rId4"/>
+          <a:stretch>
+            <a:fillRect/>
+          </a:stretch>
+        </p:blipFill>
+        <p:spPr>
+          <a:xfrm>
+            <a:off x="411549" y="3429000"/>
+            <a:ext cx="5439544" cy="2148620"/>
+          </a:xfrm>
+          <a:prstGeom prst="rect">
+            <a:avLst/>
+          </a:prstGeom>
+          <a:solidFill>
+            <a:srgbClr val="FFFFFF">
+              <a:shade val="85000"/>
+            </a:srgbClr>
+          </a:solidFill>
+          <a:ln w="190500" cap="rnd">
+            <a:noFill/>
+          </a:ln>
+          <a:effectLst>
+            <a:outerShdw blurRad="50000" algn="tl" rotWithShape="0">
+              <a:srgbClr val="000000">
+                <a:alpha val="41000"/>
+              </a:srgbClr>
+            </a:outerShdw>
+          </a:effectLst>
+          <a:scene3d>
+            <a:camera prst="orthographicFront"/>
+            <a:lightRig rig="twoPt" dir="t">
+              <a:rot lat="0" lon="0" rev="7800000"/>
+            </a:lightRig>
+          </a:scene3d>
+          <a:sp3d contourW="6350">
+            <a:bevelT w="50800" h="16510"/>
+            <a:contourClr>
+              <a:srgbClr val="C0C0C0"/>
+            </a:contourClr>
+          </a:sp3d>
+        </p:spPr>
+      </p:pic>
+    </p:spTree>
+    <p:extLst>
+      <p:ext uri="{BB962C8B-B14F-4D97-AF65-F5344CB8AC3E}">
+        <p14:creationId xmlns:p14="http://schemas.microsoft.com/office/powerpoint/2010/main" val="551501351"/>
+      </p:ext>
+    </p:extLst>
+  </p:cSld>
+  <p:clrMapOvr>
+    <a:masterClrMapping/>
+  </p:clrMapOvr>
+</p:sld>
+</file>
+
+<file path=ppt/slides/slide16.xml><?xml version="1.0" encoding="utf-8"?>
+<p:sld xmlns:a="http://schemas.openxmlformats.org/drawingml/2006/main" xmlns:r="http://schemas.openxmlformats.org/officeDocument/2006/relationships" xmlns:p="http://schemas.openxmlformats.org/presentationml/2006/main">
+  <p:cSld>
+    <p:spTree>
+      <p:nvGrpSpPr>
+        <p:cNvPr id="1" name=""/>
+        <p:cNvGrpSpPr/>
+        <p:nvPr/>
+      </p:nvGrpSpPr>
+      <p:grpSpPr>
+        <a:xfrm>
+          <a:off x="0" y="0"/>
+          <a:ext cx="0" cy="0"/>
+          <a:chOff x="0" y="0"/>
+          <a:chExt cx="0" cy="0"/>
+        </a:xfrm>
+      </p:grpSpPr>
+      <p:sp>
+        <p:nvSpPr>
+          <p:cNvPr id="2" name="Title 1">
+            <a:extLst>
+              <a:ext uri="{FF2B5EF4-FFF2-40B4-BE49-F238E27FC236}">
+                <a16:creationId xmlns:a16="http://schemas.microsoft.com/office/drawing/2014/main" id="{7D979B0F-EA6A-4087-9B1B-54671FB9AB6A}"/>
+              </a:ext>
+            </a:extLst>
+          </p:cNvPr>
+          <p:cNvSpPr>
+            <a:spLocks noGrp="1"/>
+          </p:cNvSpPr>
+          <p:nvPr>
+            <p:ph type="title"/>
+          </p:nvPr>
+        </p:nvSpPr>
+        <p:spPr/>
+        <p:txBody>
+          <a:bodyPr/>
+          <a:lstStyle/>
+          <a:p>
+            <a:r>
+              <a:rPr lang="en-US" dirty="0"/>
+              <a:t>Rebase</a:t>
+            </a:r>
+            <a:endParaRPr lang="fa-IR" dirty="0"/>
+          </a:p>
+        </p:txBody>
+      </p:sp>
+      <p:sp>
+        <p:nvSpPr>
+          <p:cNvPr id="3" name="Content Placeholder 2">
+            <a:extLst>
+              <a:ext uri="{FF2B5EF4-FFF2-40B4-BE49-F238E27FC236}">
+                <a16:creationId xmlns:a16="http://schemas.microsoft.com/office/drawing/2014/main" id="{C74EDAF9-145A-4E21-BBA6-89954F52CDF3}"/>
+              </a:ext>
+            </a:extLst>
+          </p:cNvPr>
+          <p:cNvSpPr>
+            <a:spLocks noGrp="1"/>
+          </p:cNvSpPr>
+          <p:nvPr>
+            <p:ph idx="1"/>
+          </p:nvPr>
+        </p:nvSpPr>
+        <p:spPr>
+          <a:xfrm>
+            <a:off x="913795" y="1318729"/>
+            <a:ext cx="10353762" cy="4864581"/>
+          </a:xfrm>
+        </p:spPr>
+        <p:txBody>
+          <a:bodyPr>
+            <a:normAutofit fontScale="85000" lnSpcReduction="20000"/>
+          </a:bodyPr>
+          <a:lstStyle/>
+          <a:p>
+            <a:r>
+              <a:rPr lang="en-US" dirty="0">
+                <a:latin typeface="Times New Roman" panose="02020603050405020304" pitchFamily="18" charset="0"/>
+                <a:cs typeface="B Lotus" panose="00000400000000000000" pitchFamily="2" charset="-78"/>
+              </a:rPr>
+              <a:t>Rebase</a:t>
+            </a:r>
+            <a:r>
+              <a:rPr lang="fa-IR" dirty="0">
+                <a:latin typeface="Times New Roman" panose="02020603050405020304" pitchFamily="18" charset="0"/>
+                <a:cs typeface="B Lotus" panose="00000400000000000000" pitchFamily="2" charset="-78"/>
+              </a:rPr>
+              <a:t> کردن چیست؟</a:t>
+            </a:r>
+          </a:p>
+          <a:p>
+            <a:endParaRPr lang="fa-IR" dirty="0">
+              <a:latin typeface="Times New Roman" panose="02020603050405020304" pitchFamily="18" charset="0"/>
+              <a:cs typeface="B Lotus" panose="00000400000000000000" pitchFamily="2" charset="-78"/>
+            </a:endParaRPr>
+          </a:p>
+          <a:p>
+            <a:endParaRPr lang="fa-IR" dirty="0">
+              <a:latin typeface="Times New Roman" panose="02020603050405020304" pitchFamily="18" charset="0"/>
+              <a:cs typeface="B Lotus" panose="00000400000000000000" pitchFamily="2" charset="-78"/>
+            </a:endParaRPr>
+          </a:p>
+          <a:p>
+            <a:endParaRPr lang="fa-IR" dirty="0">
+              <a:latin typeface="Times New Roman" panose="02020603050405020304" pitchFamily="18" charset="0"/>
+              <a:cs typeface="B Lotus" panose="00000400000000000000" pitchFamily="2" charset="-78"/>
+            </a:endParaRPr>
+          </a:p>
+          <a:p>
+            <a:endParaRPr lang="fa-IR" dirty="0">
+              <a:latin typeface="Times New Roman" panose="02020603050405020304" pitchFamily="18" charset="0"/>
+              <a:cs typeface="B Lotus" panose="00000400000000000000" pitchFamily="2" charset="-78"/>
+            </a:endParaRPr>
+          </a:p>
+          <a:p>
+            <a:endParaRPr lang="fa-IR" dirty="0">
+              <a:latin typeface="Times New Roman" panose="02020603050405020304" pitchFamily="18" charset="0"/>
+              <a:cs typeface="B Lotus" panose="00000400000000000000" pitchFamily="2" charset="-78"/>
+            </a:endParaRPr>
+          </a:p>
+          <a:p>
+            <a:endParaRPr lang="fa-IR" dirty="0">
+              <a:latin typeface="Times New Roman" panose="02020603050405020304" pitchFamily="18" charset="0"/>
+              <a:cs typeface="B Lotus" panose="00000400000000000000" pitchFamily="2" charset="-78"/>
+            </a:endParaRPr>
+          </a:p>
+          <a:p>
+            <a:r>
+              <a:rPr lang="fa-IR" dirty="0">
+                <a:latin typeface="Times New Roman" panose="02020603050405020304" pitchFamily="18" charset="0"/>
+                <a:cs typeface="B Lotus" panose="00000400000000000000" pitchFamily="2" charset="-78"/>
+              </a:rPr>
+              <a:t>چگونه </a:t>
+            </a:r>
+            <a:r>
+              <a:rPr lang="en-US" dirty="0">
+                <a:latin typeface="Times New Roman" panose="02020603050405020304" pitchFamily="18" charset="0"/>
+                <a:cs typeface="B Lotus" panose="00000400000000000000" pitchFamily="2" charset="-78"/>
+              </a:rPr>
+              <a:t>Rebase</a:t>
+            </a:r>
+            <a:r>
+              <a:rPr lang="fa-IR" dirty="0">
+                <a:latin typeface="Times New Roman" panose="02020603050405020304" pitchFamily="18" charset="0"/>
+                <a:cs typeface="B Lotus" panose="00000400000000000000" pitchFamily="2" charset="-78"/>
+              </a:rPr>
+              <a:t> کنیم؟</a:t>
+            </a:r>
+          </a:p>
+          <a:p>
+            <a:pPr lvl="1"/>
+            <a:r>
+              <a:rPr lang="fa-IR" dirty="0">
+                <a:latin typeface="Times New Roman" panose="02020603050405020304" pitchFamily="18" charset="0"/>
+                <a:cs typeface="B Lotus" panose="00000400000000000000" pitchFamily="2" charset="-78"/>
+              </a:rPr>
+              <a:t>برای انجام عمل </a:t>
+            </a:r>
+            <a:r>
+              <a:rPr lang="en-US" dirty="0">
+                <a:latin typeface="Times New Roman" panose="02020603050405020304" pitchFamily="18" charset="0"/>
+                <a:cs typeface="B Lotus" panose="00000400000000000000" pitchFamily="2" charset="-78"/>
+              </a:rPr>
+              <a:t>Rebase</a:t>
+            </a:r>
+            <a:r>
+              <a:rPr lang="fa-IR" dirty="0">
+                <a:latin typeface="Times New Roman" panose="02020603050405020304" pitchFamily="18" charset="0"/>
+                <a:cs typeface="B Lotus" panose="00000400000000000000" pitchFamily="2" charset="-78"/>
+              </a:rPr>
+              <a:t> کافی است که </a:t>
+            </a:r>
+            <a:r>
+              <a:rPr lang="en-US" dirty="0">
+                <a:latin typeface="Times New Roman" panose="02020603050405020304" pitchFamily="18" charset="0"/>
+                <a:cs typeface="B Lotus" panose="00000400000000000000" pitchFamily="2" charset="-78"/>
+              </a:rPr>
+              <a:t>HEAD</a:t>
+            </a:r>
+            <a:r>
+              <a:rPr lang="fa-IR" dirty="0">
+                <a:latin typeface="Times New Roman" panose="02020603050405020304" pitchFamily="18" charset="0"/>
+                <a:cs typeface="B Lotus" panose="00000400000000000000" pitchFamily="2" charset="-78"/>
+              </a:rPr>
+              <a:t> را روی </a:t>
+            </a:r>
+            <a:r>
+              <a:rPr lang="fa-IR" dirty="0" err="1">
+                <a:latin typeface="Times New Roman" panose="02020603050405020304" pitchFamily="18" charset="0"/>
+                <a:cs typeface="B Lotus" panose="00000400000000000000" pitchFamily="2" charset="-78"/>
+              </a:rPr>
+              <a:t>برنچی</a:t>
+            </a:r>
+            <a:r>
+              <a:rPr lang="fa-IR" dirty="0">
+                <a:latin typeface="Times New Roman" panose="02020603050405020304" pitchFamily="18" charset="0"/>
+                <a:cs typeface="B Lotus" panose="00000400000000000000" pitchFamily="2" charset="-78"/>
+              </a:rPr>
+              <a:t> که </a:t>
+            </a:r>
+            <a:r>
+              <a:rPr lang="fa-IR" dirty="0" err="1">
+                <a:latin typeface="Times New Roman" panose="02020603050405020304" pitchFamily="18" charset="0"/>
+                <a:cs typeface="B Lotus" panose="00000400000000000000" pitchFamily="2" charset="-78"/>
+              </a:rPr>
+              <a:t>می‌خواهید</a:t>
+            </a:r>
+            <a:r>
+              <a:rPr lang="fa-IR" dirty="0">
+                <a:latin typeface="Times New Roman" panose="02020603050405020304" pitchFamily="18" charset="0"/>
+                <a:cs typeface="B Lotus" panose="00000400000000000000" pitchFamily="2" charset="-78"/>
+              </a:rPr>
+              <a:t> به </a:t>
+            </a:r>
+            <a:r>
+              <a:rPr lang="fa-IR" dirty="0" err="1">
+                <a:latin typeface="Times New Roman" panose="02020603050405020304" pitchFamily="18" charset="0"/>
+                <a:cs typeface="B Lotus" panose="00000400000000000000" pitchFamily="2" charset="-78"/>
+              </a:rPr>
+              <a:t>برنچ</a:t>
+            </a:r>
+            <a:r>
+              <a:rPr lang="fa-IR" dirty="0">
+                <a:latin typeface="Times New Roman" panose="02020603050405020304" pitchFamily="18" charset="0"/>
+                <a:cs typeface="B Lotus" panose="00000400000000000000" pitchFamily="2" charset="-78"/>
+              </a:rPr>
+              <a:t> دیگری اضافه کنید قرار بدهید و سپس با استفاده از دستور </a:t>
+            </a:r>
+            <a:r>
+              <a:rPr lang="en-US" dirty="0">
+                <a:latin typeface="Times New Roman" panose="02020603050405020304" pitchFamily="18" charset="0"/>
+                <a:cs typeface="B Lotus" panose="00000400000000000000" pitchFamily="2" charset="-78"/>
+              </a:rPr>
+              <a:t>git rebase &lt;branch name&gt;</a:t>
+            </a:r>
+            <a:r>
+              <a:rPr lang="fa-IR" dirty="0">
+                <a:latin typeface="Times New Roman" panose="02020603050405020304" pitchFamily="18" charset="0"/>
+                <a:cs typeface="B Lotus" panose="00000400000000000000" pitchFamily="2" charset="-78"/>
+              </a:rPr>
+              <a:t> </a:t>
+            </a:r>
+            <a:r>
+              <a:rPr lang="fa-IR" dirty="0" err="1">
+                <a:latin typeface="Times New Roman" panose="02020603050405020304" pitchFamily="18" charset="0"/>
+                <a:cs typeface="B Lotus" panose="00000400000000000000" pitchFamily="2" charset="-78"/>
+              </a:rPr>
+              <a:t>برنچ</a:t>
+            </a:r>
+            <a:r>
+              <a:rPr lang="fa-IR" dirty="0">
+                <a:latin typeface="Times New Roman" panose="02020603050405020304" pitchFamily="18" charset="0"/>
+                <a:cs typeface="B Lotus" panose="00000400000000000000" pitchFamily="2" charset="-78"/>
+              </a:rPr>
+              <a:t> کنونی به </a:t>
+            </a:r>
+            <a:r>
+              <a:rPr lang="fa-IR" dirty="0" err="1">
+                <a:latin typeface="Times New Roman" panose="02020603050405020304" pitchFamily="18" charset="0"/>
+                <a:cs typeface="B Lotus" panose="00000400000000000000" pitchFamily="2" charset="-78"/>
+              </a:rPr>
+              <a:t>برنچ</a:t>
+            </a:r>
+            <a:r>
+              <a:rPr lang="fa-IR" dirty="0">
+                <a:latin typeface="Times New Roman" panose="02020603050405020304" pitchFamily="18" charset="0"/>
+                <a:cs typeface="B Lotus" panose="00000400000000000000" pitchFamily="2" charset="-78"/>
+              </a:rPr>
+              <a:t> نامبرده اضافه </a:t>
+            </a:r>
+            <a:r>
+              <a:rPr lang="fa-IR" dirty="0" err="1">
+                <a:latin typeface="Times New Roman" panose="02020603050405020304" pitchFamily="18" charset="0"/>
+                <a:cs typeface="B Lotus" panose="00000400000000000000" pitchFamily="2" charset="-78"/>
+              </a:rPr>
+              <a:t>می‌شود</a:t>
+            </a:r>
+            <a:r>
+              <a:rPr lang="fa-IR" dirty="0">
+                <a:latin typeface="Times New Roman" panose="02020603050405020304" pitchFamily="18" charset="0"/>
+                <a:cs typeface="B Lotus" panose="00000400000000000000" pitchFamily="2" charset="-78"/>
+              </a:rPr>
+              <a:t>.</a:t>
+            </a:r>
+          </a:p>
+          <a:p>
+            <a:pPr lvl="1"/>
+            <a:endParaRPr lang="fa-IR" dirty="0">
+              <a:latin typeface="Times New Roman" panose="02020603050405020304" pitchFamily="18" charset="0"/>
+              <a:cs typeface="B Lotus" panose="00000400000000000000" pitchFamily="2" charset="-78"/>
+            </a:endParaRPr>
+          </a:p>
+          <a:p>
+            <a:r>
+              <a:rPr lang="en-US" b="1" dirty="0">
+                <a:latin typeface="Times New Roman" panose="02020603050405020304" pitchFamily="18" charset="0"/>
+                <a:cs typeface="B Lotus" panose="00000400000000000000" pitchFamily="2" charset="-78"/>
+              </a:rPr>
+              <a:t>Rebase</a:t>
+            </a:r>
+            <a:r>
+              <a:rPr lang="fa-IR" b="1" dirty="0">
+                <a:latin typeface="Times New Roman" panose="02020603050405020304" pitchFamily="18" charset="0"/>
+                <a:cs typeface="B Lotus" panose="00000400000000000000" pitchFamily="2" charset="-78"/>
+              </a:rPr>
+              <a:t> در مقابل ادغام!</a:t>
+            </a:r>
+          </a:p>
+        </p:txBody>
+      </p:sp>
+      <p:sp>
+        <p:nvSpPr>
+          <p:cNvPr id="4" name="Slide Number Placeholder 3">
+            <a:extLst>
+              <a:ext uri="{FF2B5EF4-FFF2-40B4-BE49-F238E27FC236}">
+                <a16:creationId xmlns:a16="http://schemas.microsoft.com/office/drawing/2014/main" id="{690161F4-7B77-4088-BEE2-335DE1C10BED}"/>
+              </a:ext>
+            </a:extLst>
+          </p:cNvPr>
+          <p:cNvSpPr>
+            <a:spLocks noGrp="1"/>
+          </p:cNvSpPr>
+          <p:nvPr>
+            <p:ph type="sldNum" sz="quarter" idx="12"/>
+          </p:nvPr>
+        </p:nvSpPr>
+        <p:spPr/>
+        <p:txBody>
+          <a:bodyPr/>
+          <a:lstStyle/>
+          <a:p>
+            <a:pPr algn="ctr"/>
+            <a:fld id="{3A98EE3D-8CD1-4C3F-BD1C-C98C9596463C}" type="slidenum">
+              <a:rPr lang="en-US" smtClean="0"/>
+              <a:pPr algn="ctr"/>
+              <a:t>16</a:t>
+            </a:fld>
+            <a:endParaRPr lang="en-US" dirty="0"/>
+          </a:p>
+        </p:txBody>
+      </p:sp>
+      <p:pic>
+        <p:nvPicPr>
+          <p:cNvPr id="8" name="Picture 7">
+            <a:extLst>
+              <a:ext uri="{FF2B5EF4-FFF2-40B4-BE49-F238E27FC236}">
+                <a16:creationId xmlns:a16="http://schemas.microsoft.com/office/drawing/2014/main" id="{AF1D255F-D421-428A-8D50-8E3BD1A5E092}"/>
+              </a:ext>
+            </a:extLst>
+          </p:cNvPr>
+          <p:cNvPicPr>
+            <a:picLocks noChangeAspect="1"/>
+          </p:cNvPicPr>
+          <p:nvPr/>
+        </p:nvPicPr>
+        <p:blipFill>
+          <a:blip r:embed="rId3"/>
+          <a:stretch>
+            <a:fillRect/>
+          </a:stretch>
+        </p:blipFill>
+        <p:spPr>
+          <a:xfrm>
+            <a:off x="7257190" y="1848632"/>
+            <a:ext cx="4407877" cy="2110271"/>
+          </a:xfrm>
+          <a:prstGeom prst="rect">
+            <a:avLst/>
+          </a:prstGeom>
+          <a:solidFill>
+            <a:srgbClr val="FFFFFF">
+              <a:shade val="85000"/>
+            </a:srgbClr>
+          </a:solidFill>
+          <a:ln w="190500" cap="rnd">
+            <a:noFill/>
+          </a:ln>
+          <a:effectLst>
+            <a:outerShdw blurRad="50000" algn="tl" rotWithShape="0">
+              <a:srgbClr val="000000">
+                <a:alpha val="41000"/>
+              </a:srgbClr>
+            </a:outerShdw>
+          </a:effectLst>
+          <a:scene3d>
+            <a:camera prst="orthographicFront"/>
+            <a:lightRig rig="twoPt" dir="t">
+              <a:rot lat="0" lon="0" rev="7800000"/>
+            </a:lightRig>
+          </a:scene3d>
+          <a:sp3d contourW="6350">
+            <a:bevelT w="50800" h="16510"/>
+            <a:contourClr>
+              <a:srgbClr val="C0C0C0"/>
+            </a:contourClr>
+          </a:sp3d>
+        </p:spPr>
+      </p:pic>
+      <p:pic>
+        <p:nvPicPr>
+          <p:cNvPr id="10" name="Picture 9">
+            <a:extLst>
+              <a:ext uri="{FF2B5EF4-FFF2-40B4-BE49-F238E27FC236}">
+                <a16:creationId xmlns:a16="http://schemas.microsoft.com/office/drawing/2014/main" id="{3DAAC470-C28E-4F02-A015-D619F00B33FB}"/>
+              </a:ext>
+            </a:extLst>
+          </p:cNvPr>
+          <p:cNvPicPr>
+            <a:picLocks noChangeAspect="1"/>
+          </p:cNvPicPr>
+          <p:nvPr/>
+        </p:nvPicPr>
+        <p:blipFill>
+          <a:blip r:embed="rId4"/>
+          <a:stretch>
+            <a:fillRect/>
+          </a:stretch>
+        </p:blipFill>
+        <p:spPr>
+          <a:xfrm>
+            <a:off x="325834" y="1942416"/>
+            <a:ext cx="6533846" cy="1886648"/>
+          </a:xfrm>
+          <a:prstGeom prst="rect">
+            <a:avLst/>
+          </a:prstGeom>
+          <a:solidFill>
+            <a:srgbClr val="FFFFFF">
+              <a:shade val="85000"/>
+            </a:srgbClr>
+          </a:solidFill>
+          <a:ln w="190500" cap="rnd">
+            <a:noFill/>
+          </a:ln>
+          <a:effectLst>
+            <a:outerShdw blurRad="50000" algn="tl" rotWithShape="0">
+              <a:srgbClr val="000000">
+                <a:alpha val="41000"/>
+              </a:srgbClr>
+            </a:outerShdw>
+          </a:effectLst>
+          <a:scene3d>
+            <a:camera prst="orthographicFront"/>
+            <a:lightRig rig="twoPt" dir="t">
+              <a:rot lat="0" lon="0" rev="7800000"/>
+            </a:lightRig>
+          </a:scene3d>
+          <a:sp3d contourW="6350">
+            <a:bevelT w="50800" h="16510"/>
+            <a:contourClr>
+              <a:srgbClr val="C0C0C0"/>
+            </a:contourClr>
+          </a:sp3d>
+        </p:spPr>
+      </p:pic>
+    </p:spTree>
+    <p:extLst>
+      <p:ext uri="{BB962C8B-B14F-4D97-AF65-F5344CB8AC3E}">
+        <p14:creationId xmlns:p14="http://schemas.microsoft.com/office/powerpoint/2010/main" val="2290964120"/>
+      </p:ext>
+    </p:extLst>
+  </p:cSld>
+  <p:clrMapOvr>
+    <a:masterClrMapping/>
+  </p:clrMapOvr>
+</p:sld>
+</file>
+
+<file path=ppt/slides/slide17.xml><?xml version="1.0" encoding="utf-8"?>
+<p:sld xmlns:a="http://schemas.openxmlformats.org/drawingml/2006/main" xmlns:r="http://schemas.openxmlformats.org/officeDocument/2006/relationships" xmlns:p="http://schemas.openxmlformats.org/presentationml/2006/main">
+  <p:cSld>
+    <p:spTree>
+      <p:nvGrpSpPr>
+        <p:cNvPr id="1" name=""/>
+        <p:cNvGrpSpPr/>
+        <p:nvPr/>
+      </p:nvGrpSpPr>
+      <p:grpSpPr>
+        <a:xfrm>
+          <a:off x="0" y="0"/>
+          <a:ext cx="0" cy="0"/>
+          <a:chOff x="0" y="0"/>
+          <a:chExt cx="0" cy="0"/>
+        </a:xfrm>
+      </p:grpSpPr>
+      <p:pic>
+        <p:nvPicPr>
+          <p:cNvPr id="4" name="Picture 3">
+            <a:extLst>
+              <a:ext uri="{FF2B5EF4-FFF2-40B4-BE49-F238E27FC236}">
+                <a16:creationId xmlns:a16="http://schemas.microsoft.com/office/drawing/2014/main" id="{1B6B9D89-ED56-474F-9169-4B2344D5DB2C}"/>
+              </a:ext>
+              <a:ext uri="{C183D7F6-B498-43B3-948B-1728B52AA6E4}">
+                <adec:decorative xmlns:adec="http://schemas.microsoft.com/office/drawing/2017/decorative" val="1"/>
+              </a:ext>
+            </a:extLst>
+          </p:cNvPr>
+          <p:cNvPicPr>
+            <a:picLocks noChangeAspect="1"/>
+          </p:cNvPicPr>
+          <p:nvPr/>
+        </p:nvPicPr>
+        <p:blipFill rotWithShape="1">
+          <a:blip r:embed="rId2">
+            <a:extLst>
+              <a:ext uri="{28A0092B-C50C-407E-A947-70E740481C1C}">
+                <a14:useLocalDpi xmlns:a14="http://schemas.microsoft.com/office/drawing/2010/main" val="0"/>
+              </a:ext>
+            </a:extLst>
+          </a:blip>
+          <a:srcRect/>
+          <a:stretch/>
+        </p:blipFill>
+        <p:spPr>
+          <a:xfrm>
+            <a:off x="0" y="5"/>
+            <a:ext cx="12192001" cy="6857990"/>
+          </a:xfrm>
+          <a:prstGeom prst="rect">
+            <a:avLst/>
+          </a:prstGeom>
+        </p:spPr>
+      </p:pic>
+      <p:sp useBgFill="1">
+        <p:nvSpPr>
+          <p:cNvPr id="6" name="Rectangle 5">
+            <a:extLst>
+              <a:ext uri="{FF2B5EF4-FFF2-40B4-BE49-F238E27FC236}">
+                <a16:creationId xmlns:a16="http://schemas.microsoft.com/office/drawing/2014/main" id="{D92F34F0-13B6-42BD-8A8A-F19C829C6958}"/>
+              </a:ext>
+            </a:extLst>
+          </p:cNvPr>
+          <p:cNvSpPr/>
+          <p:nvPr/>
+        </p:nvSpPr>
+        <p:spPr>
+          <a:xfrm>
+            <a:off x="1312986" y="873370"/>
+            <a:ext cx="9566029" cy="5111261"/>
+          </a:xfrm>
+          <a:prstGeom prst="rect">
+            <a:avLst/>
+          </a:prstGeom>
+          <a:ln>
+            <a:solidFill>
+              <a:srgbClr val="FFC000"/>
+            </a:solidFill>
+          </a:ln>
+        </p:spPr>
+        <p:style>
+          <a:lnRef idx="2">
+            <a:schemeClr val="accent1">
+              <a:shade val="50000"/>
+            </a:schemeClr>
+          </a:lnRef>
+          <a:fillRef idx="1">
+            <a:schemeClr val="accent1"/>
+          </a:fillRef>
+          <a:effectRef idx="0">
+            <a:schemeClr val="accent1"/>
+          </a:effectRef>
+          <a:fontRef idx="minor">
+            <a:schemeClr val="lt1"/>
+          </a:fontRef>
+        </p:style>
+        <p:txBody>
+          <a:bodyPr rtlCol="1" anchor="ctr"/>
+          <a:lstStyle/>
+          <a:p>
+            <a:pPr algn="ctr"/>
+            <a:endParaRPr lang="fa-IR"/>
+          </a:p>
+        </p:txBody>
+      </p:sp>
+      <p:sp>
+        <p:nvSpPr>
+          <p:cNvPr id="7" name="TextBox 6">
+            <a:extLst>
+              <a:ext uri="{FF2B5EF4-FFF2-40B4-BE49-F238E27FC236}">
+                <a16:creationId xmlns:a16="http://schemas.microsoft.com/office/drawing/2014/main" id="{598288BE-50C0-40F8-88AE-24A97318FF2E}"/>
+              </a:ext>
+            </a:extLst>
+          </p:cNvPr>
+          <p:cNvSpPr txBox="1"/>
+          <p:nvPr/>
+        </p:nvSpPr>
+        <p:spPr>
+          <a:xfrm>
+            <a:off x="3972663" y="1543869"/>
+            <a:ext cx="4246675" cy="3770263"/>
+          </a:xfrm>
+          <a:prstGeom prst="rect">
+            <a:avLst/>
+          </a:prstGeom>
+          <a:noFill/>
+        </p:spPr>
+        <p:txBody>
+          <a:bodyPr wrap="none" rtlCol="1">
+            <a:spAutoFit/>
+          </a:bodyPr>
+          <a:lstStyle/>
+          <a:p>
+            <a:r>
+              <a:rPr lang="fa-IR" sz="23900" dirty="0">
+                <a:cs typeface="0 Hamid" panose="00000400000000000000" pitchFamily="2" charset="-78"/>
+              </a:rPr>
+              <a:t>پایان</a:t>
+            </a:r>
+          </a:p>
+        </p:txBody>
+      </p:sp>
+    </p:spTree>
+    <p:extLst>
+      <p:ext uri="{BB962C8B-B14F-4D97-AF65-F5344CB8AC3E}">
+        <p14:creationId xmlns:p14="http://schemas.microsoft.com/office/powerpoint/2010/main" val="1709810161"/>
+      </p:ext>
+    </p:extLst>
+  </p:cSld>
+  <p:clrMapOvr>
+    <a:masterClrMapping/>
+  </p:clrMapOvr>
+</p:sld>
+</file>
+
 <file path=ppt/slides/slide2.xml><?xml version="1.0" encoding="utf-8"?>
 <p:sld xmlns:a="http://schemas.openxmlformats.org/drawingml/2006/main" xmlns:r="http://schemas.openxmlformats.org/officeDocument/2006/relationships" xmlns:p="http://schemas.openxmlformats.org/presentationml/2006/main">
   <p:cSld>
@@ -15071,7 +18296,7 @@
           </a:effectLst>
           <a:extLst>
             <a:ext uri="{91240B29-F687-4f45-9708-019B960494DF}">
-              <a14:hiddenLine xmlns:a16="http://schemas.microsoft.com/office/drawing/2014/main" xmlns:p14="http://schemas.microsoft.com/office/powerpoint/2010/main" xmlns:a14="http://schemas.microsoft.com/office/drawing/2010/main" xmlns="" w="9525">
+              <a14:hiddenLine xmlns="" xmlns:a14="http://schemas.microsoft.com/office/drawing/2010/main" xmlns:p14="http://schemas.microsoft.com/office/powerpoint/2010/main" xmlns:a16="http://schemas.microsoft.com/office/drawing/2014/main" w="9525">
                 <a:solidFill>
                   <a:srgbClr val="000000"/>
                 </a:solidFill>
@@ -15547,7 +18772,7 @@
         </p:spPr>
         <p:txBody>
           <a:bodyPr anchor="t">
-            <a:normAutofit lnSpcReduction="10000"/>
+            <a:normAutofit/>
           </a:bodyPr>
           <a:lstStyle/>
           <a:p>
@@ -15651,6 +18876,14 @@
               <a:buNone/>
             </a:pPr>
             <a:r>
+              <a:rPr lang="fa-IR" sz="1600" dirty="0">
+                <a:effectLst/>
+                <a:latin typeface="Times New Roman" panose="02020603050405020304" pitchFamily="18" charset="0"/>
+                <a:cs typeface="B Lotus" panose="00000400000000000000" pitchFamily="2" charset="-78"/>
+              </a:rPr>
+              <a:t>شاخه( </a:t>
+            </a:r>
+            <a:r>
               <a:rPr lang="en-US" sz="1600" dirty="0">
                 <a:effectLst/>
                 <a:latin typeface="Times New Roman" panose="02020603050405020304" pitchFamily="18" charset="0"/>
@@ -15658,32 +18891,69 @@
               </a:rPr>
               <a:t>Branch</a:t>
             </a:r>
+            <a:r>
+              <a:rPr lang="fa-IR" sz="1600" dirty="0">
+                <a:effectLst/>
+                <a:latin typeface="Times New Roman" panose="02020603050405020304" pitchFamily="18" charset="0"/>
+                <a:cs typeface="B Lotus" panose="00000400000000000000" pitchFamily="2" charset="-78"/>
+              </a:rPr>
+              <a:t> )</a:t>
+            </a:r>
+            <a:endParaRPr lang="en-US" sz="1600" dirty="0">
+              <a:effectLst/>
+              <a:latin typeface="Times New Roman" panose="02020603050405020304" pitchFamily="18" charset="0"/>
+              <a:cs typeface="B Lotus" panose="00000400000000000000" pitchFamily="2" charset="-78"/>
+            </a:endParaRPr>
           </a:p>
           <a:p>
             <a:pPr marL="36900" indent="0">
               <a:buNone/>
             </a:pPr>
             <a:r>
+              <a:rPr lang="fa-IR" sz="1600" dirty="0">
+                <a:effectLst/>
+                <a:latin typeface="Times New Roman" panose="02020603050405020304" pitchFamily="18" charset="0"/>
+                <a:cs typeface="B Lotus" panose="00000400000000000000" pitchFamily="2" charset="-78"/>
+              </a:rPr>
+              <a:t>ادغام </a:t>
+            </a:r>
+            <a:r>
+              <a:rPr lang="fa-IR" sz="1600" dirty="0" err="1">
+                <a:effectLst/>
+                <a:latin typeface="Times New Roman" panose="02020603050405020304" pitchFamily="18" charset="0"/>
+                <a:cs typeface="B Lotus" panose="00000400000000000000" pitchFamily="2" charset="-78"/>
+              </a:rPr>
+              <a:t>شاخه‌ها</a:t>
+            </a:r>
+            <a:r>
+              <a:rPr lang="fa-IR" sz="1600" dirty="0">
+                <a:effectLst/>
+                <a:latin typeface="Times New Roman" panose="02020603050405020304" pitchFamily="18" charset="0"/>
+                <a:cs typeface="B Lotus" panose="00000400000000000000" pitchFamily="2" charset="-78"/>
+              </a:rPr>
+              <a:t>( </a:t>
+            </a:r>
+            <a:r>
               <a:rPr lang="en-US" sz="1600" dirty="0">
                 <a:effectLst/>
                 <a:latin typeface="Times New Roman" panose="02020603050405020304" pitchFamily="18" charset="0"/>
                 <a:cs typeface="B Lotus" panose="00000400000000000000" pitchFamily="2" charset="-78"/>
               </a:rPr>
-              <a:t>Feature branch</a:t>
-            </a:r>
-          </a:p>
-          <a:p>
-            <a:pPr marL="36900" indent="0">
-              <a:buNone/>
-            </a:pPr>
-            <a:r>
-              <a:rPr lang="en-US" sz="1600" dirty="0">
-                <a:effectLst/>
-                <a:latin typeface="Times New Roman" panose="02020603050405020304" pitchFamily="18" charset="0"/>
-                <a:cs typeface="B Lotus" panose="00000400000000000000" pitchFamily="2" charset="-78"/>
-              </a:rPr>
               <a:t>Merge</a:t>
             </a:r>
+            <a:r>
+              <a:rPr lang="fa-IR" sz="1600" dirty="0">
+                <a:effectLst/>
+                <a:latin typeface="Times New Roman" panose="02020603050405020304" pitchFamily="18" charset="0"/>
+                <a:cs typeface="B Lotus" panose="00000400000000000000" pitchFamily="2" charset="-78"/>
+              </a:rPr>
+              <a:t> )</a:t>
+            </a:r>
+            <a:endParaRPr lang="en-US" sz="1600" dirty="0">
+              <a:effectLst/>
+              <a:latin typeface="Times New Roman" panose="02020603050405020304" pitchFamily="18" charset="0"/>
+              <a:cs typeface="B Lotus" panose="00000400000000000000" pitchFamily="2" charset="-78"/>
+            </a:endParaRPr>
           </a:p>
           <a:p>
             <a:pPr marL="36900" indent="0">
@@ -25166,15 +28436,6 @@
 </file>
 
 <file path=customXml/item2.xml><?xml version="1.0" encoding="utf-8"?>
-<p:properties xmlns:p="http://schemas.microsoft.com/office/2006/metadata/properties" xmlns:xsi="http://www.w3.org/2001/XMLSchema-instance" xmlns:pc="http://schemas.microsoft.com/office/infopath/2007/PartnerControls">
-  <documentManagement>
-    <Status xmlns="71af3243-3dd4-4a8d-8c0d-dd76da1f02a5">Not started</Status>
-    <MediaServiceKeyPoints xmlns="71af3243-3dd4-4a8d-8c0d-dd76da1f02a5" xsi:nil="true"/>
-  </documentManagement>
-</p:properties>
-</file>
-
-<file path=customXml/item3.xml><?xml version="1.0" encoding="utf-8"?>
 <ct:contentTypeSchema xmlns:ct="http://schemas.microsoft.com/office/2006/metadata/contentType" xmlns:ma="http://schemas.microsoft.com/office/2006/metadata/properties/metaAttributes" ct:_="" ma:_="" ma:contentTypeName="Document" ma:contentTypeID="0x01010079F111ED35F8CC479449609E8A0923A6" ma:contentTypeVersion="12" ma:contentTypeDescription="Create a new document." ma:contentTypeScope="" ma:versionID="a410dd7f93c95333ffa1b60ed6adedd1">
   <xsd:schema xmlns:xsd="http://www.w3.org/2001/XMLSchema" xmlns:xs="http://www.w3.org/2001/XMLSchema" xmlns:p="http://schemas.microsoft.com/office/2006/metadata/properties" xmlns:ns2="71af3243-3dd4-4a8d-8c0d-dd76da1f02a5" xmlns:ns3="16c05727-aa75-4e4a-9b5f-8a80a1165891" targetNamespace="http://schemas.microsoft.com/office/2006/metadata/properties" ma:root="true" ma:fieldsID="a936d9baba76aa3866493feff160faab" ns2:_="" ns3:_="">
     <xsd:import namespace="71af3243-3dd4-4a8d-8c0d-dd76da1f02a5"/>
@@ -25395,6 +28656,15 @@
 </ct:contentTypeSchema>
 </file>
 
+<file path=customXml/item3.xml><?xml version="1.0" encoding="utf-8"?>
+<p:properties xmlns:p="http://schemas.microsoft.com/office/2006/metadata/properties" xmlns:xsi="http://www.w3.org/2001/XMLSchema-instance" xmlns:pc="http://schemas.microsoft.com/office/infopath/2007/PartnerControls">
+  <documentManagement>
+    <Status xmlns="71af3243-3dd4-4a8d-8c0d-dd76da1f02a5">Not started</Status>
+    <MediaServiceKeyPoints xmlns="71af3243-3dd4-4a8d-8c0d-dd76da1f02a5" xsi:nil="true"/>
+  </documentManagement>
+</p:properties>
+</file>
+
 <file path=customXml/itemProps1.xml><?xml version="1.0" encoding="utf-8"?>
 <ds:datastoreItem xmlns:ds="http://schemas.openxmlformats.org/officeDocument/2006/customXml" ds:itemID="{64B270AB-C138-415C-897E-3C24487DECF1}">
   <ds:schemaRefs>
@@ -25404,16 +28674,6 @@
 </file>
 
 <file path=customXml/itemProps2.xml><?xml version="1.0" encoding="utf-8"?>
-<ds:datastoreItem xmlns:ds="http://schemas.openxmlformats.org/officeDocument/2006/customXml" ds:itemID="{2C4C00F4-06E9-43E3-AD97-88A857CEFA82}">
-  <ds:schemaRefs>
-    <ds:schemaRef ds:uri="http://schemas.microsoft.com/office/2006/metadata/properties"/>
-    <ds:schemaRef ds:uri="http://schemas.microsoft.com/office/infopath/2007/PartnerControls"/>
-    <ds:schemaRef ds:uri="71af3243-3dd4-4a8d-8c0d-dd76da1f02a5"/>
-  </ds:schemaRefs>
-</ds:datastoreItem>
-</file>
-
-<file path=customXml/itemProps3.xml><?xml version="1.0" encoding="utf-8"?>
 <ds:datastoreItem xmlns:ds="http://schemas.openxmlformats.org/officeDocument/2006/customXml" ds:itemID="{0585E981-8C91-4205-A0C3-C991F42B4C9E}">
   <ds:schemaRefs>
     <ds:schemaRef ds:uri="http://schemas.microsoft.com/office/2006/metadata/contentType"/>
@@ -25430,4 +28690,14 @@
     <ds:schemaRef ds:uri="http://schemas.microsoft.com/internal/obd"/>
   </ds:schemaRefs>
 </ds:datastoreItem>
+</file>
+
+<file path=customXml/itemProps3.xml><?xml version="1.0" encoding="utf-8"?>
+<ds:datastoreItem xmlns:ds="http://schemas.openxmlformats.org/officeDocument/2006/customXml" ds:itemID="{2C4C00F4-06E9-43E3-AD97-88A857CEFA82}">
+  <ds:schemaRefs>
+    <ds:schemaRef ds:uri="http://schemas.microsoft.com/office/2006/metadata/properties"/>
+    <ds:schemaRef ds:uri="http://schemas.microsoft.com/office/infopath/2007/PartnerControls"/>
+    <ds:schemaRef ds:uri="71af3243-3dd4-4a8d-8c0d-dd76da1f02a5"/>
+  </ds:schemaRefs>
+</ds:datastoreItem>
 </file>
</xml_diff>